<commit_message>
CISC 870 Implementation - Nearly ready for delivery, improvements still possible
</commit_message>
<xml_diff>
--- a/CISC870/Paper/FigureCreation.pptx
+++ b/CISC870/Paper/FigureCreation.pptx
@@ -6,6 +6,8 @@
   </p:sldMasterIdLst>
   <p:sldIdLst>
     <p:sldId id="256" r:id="rId2"/>
+    <p:sldId id="257" r:id="rId3"/>
+    <p:sldId id="258" r:id="rId4"/>
   </p:sldIdLst>
   <p:sldSz cx="12192000" cy="6858000"/>
   <p:notesSz cx="6858000" cy="9144000"/>
@@ -104,6 +106,11 @@
       </a:defRPr>
     </a:lvl9pPr>
   </p:defaultTextStyle>
+  <p:extLst>
+    <p:ext uri="{EFAFB233-063F-42B5-8137-9DF3F51BA10A}">
+      <p15:sldGuideLst xmlns:p15="http://schemas.microsoft.com/office/powerpoint/2012/main"/>
+    </p:ext>
+  </p:extLst>
 </p:presentation>
 </file>
 
@@ -3258,7 +3265,7 @@
           <a:p>
             <a:fld id="{E3F1F95A-29A3-4187-BF3A-74A3882354E7}" type="datetimeFigureOut">
               <a:rPr lang="en-US" smtClean="0"/>
-              <a:t>3/29/2017</a:t>
+              <a:t>3/30/2017</a:t>
             </a:fld>
             <a:endParaRPr lang="en-US"/>
           </a:p>
@@ -3428,7 +3435,7 @@
           <a:p>
             <a:fld id="{E3F1F95A-29A3-4187-BF3A-74A3882354E7}" type="datetimeFigureOut">
               <a:rPr lang="en-US" smtClean="0"/>
-              <a:t>3/29/2017</a:t>
+              <a:t>3/30/2017</a:t>
             </a:fld>
             <a:endParaRPr lang="en-US"/>
           </a:p>
@@ -3608,7 +3615,7 @@
           <a:p>
             <a:fld id="{E3F1F95A-29A3-4187-BF3A-74A3882354E7}" type="datetimeFigureOut">
               <a:rPr lang="en-US" smtClean="0"/>
-              <a:t>3/29/2017</a:t>
+              <a:t>3/30/2017</a:t>
             </a:fld>
             <a:endParaRPr lang="en-US"/>
           </a:p>
@@ -3778,7 +3785,7 @@
           <a:p>
             <a:fld id="{E3F1F95A-29A3-4187-BF3A-74A3882354E7}" type="datetimeFigureOut">
               <a:rPr lang="en-US" smtClean="0"/>
-              <a:t>3/29/2017</a:t>
+              <a:t>3/30/2017</a:t>
             </a:fld>
             <a:endParaRPr lang="en-US"/>
           </a:p>
@@ -4024,7 +4031,7 @@
           <a:p>
             <a:fld id="{E3F1F95A-29A3-4187-BF3A-74A3882354E7}" type="datetimeFigureOut">
               <a:rPr lang="en-US" smtClean="0"/>
-              <a:t>3/29/2017</a:t>
+              <a:t>3/30/2017</a:t>
             </a:fld>
             <a:endParaRPr lang="en-US"/>
           </a:p>
@@ -4256,7 +4263,7 @@
           <a:p>
             <a:fld id="{E3F1F95A-29A3-4187-BF3A-74A3882354E7}" type="datetimeFigureOut">
               <a:rPr lang="en-US" smtClean="0"/>
-              <a:t>3/29/2017</a:t>
+              <a:t>3/30/2017</a:t>
             </a:fld>
             <a:endParaRPr lang="en-US"/>
           </a:p>
@@ -4623,7 +4630,7 @@
           <a:p>
             <a:fld id="{E3F1F95A-29A3-4187-BF3A-74A3882354E7}" type="datetimeFigureOut">
               <a:rPr lang="en-US" smtClean="0"/>
-              <a:t>3/29/2017</a:t>
+              <a:t>3/30/2017</a:t>
             </a:fld>
             <a:endParaRPr lang="en-US"/>
           </a:p>
@@ -4741,7 +4748,7 @@
           <a:p>
             <a:fld id="{E3F1F95A-29A3-4187-BF3A-74A3882354E7}" type="datetimeFigureOut">
               <a:rPr lang="en-US" smtClean="0"/>
-              <a:t>3/29/2017</a:t>
+              <a:t>3/30/2017</a:t>
             </a:fld>
             <a:endParaRPr lang="en-US"/>
           </a:p>
@@ -4836,7 +4843,7 @@
           <a:p>
             <a:fld id="{E3F1F95A-29A3-4187-BF3A-74A3882354E7}" type="datetimeFigureOut">
               <a:rPr lang="en-US" smtClean="0"/>
-              <a:t>3/29/2017</a:t>
+              <a:t>3/30/2017</a:t>
             </a:fld>
             <a:endParaRPr lang="en-US"/>
           </a:p>
@@ -5113,7 +5120,7 @@
           <a:p>
             <a:fld id="{E3F1F95A-29A3-4187-BF3A-74A3882354E7}" type="datetimeFigureOut">
               <a:rPr lang="en-US" smtClean="0"/>
-              <a:t>3/29/2017</a:t>
+              <a:t>3/30/2017</a:t>
             </a:fld>
             <a:endParaRPr lang="en-US"/>
           </a:p>
@@ -5366,7 +5373,7 @@
           <a:p>
             <a:fld id="{E3F1F95A-29A3-4187-BF3A-74A3882354E7}" type="datetimeFigureOut">
               <a:rPr lang="en-US" smtClean="0"/>
-              <a:t>3/29/2017</a:t>
+              <a:t>3/30/2017</a:t>
             </a:fld>
             <a:endParaRPr lang="en-US"/>
           </a:p>
@@ -5579,7 +5586,7 @@
           <a:p>
             <a:fld id="{E3F1F95A-29A3-4187-BF3A-74A3882354E7}" type="datetimeFigureOut">
               <a:rPr lang="en-US" smtClean="0"/>
-              <a:t>3/29/2017</a:t>
+              <a:t>3/30/2017</a:t>
             </a:fld>
             <a:endParaRPr lang="en-US"/>
           </a:p>
@@ -6199,6 +6206,1146 @@
 </p:sld>
 </file>
 
+<file path=ppt/slides/slide2.xml><?xml version="1.0" encoding="utf-8"?>
+<p:sld xmlns:a="http://schemas.openxmlformats.org/drawingml/2006/main" xmlns:r="http://schemas.openxmlformats.org/officeDocument/2006/relationships" xmlns:p="http://schemas.openxmlformats.org/presentationml/2006/main">
+  <p:cSld>
+    <p:spTree>
+      <p:nvGrpSpPr>
+        <p:cNvPr id="1" name=""/>
+        <p:cNvGrpSpPr/>
+        <p:nvPr/>
+      </p:nvGrpSpPr>
+      <p:grpSpPr>
+        <a:xfrm>
+          <a:off x="0" y="0"/>
+          <a:ext cx="0" cy="0"/>
+          <a:chOff x="0" y="0"/>
+          <a:chExt cx="0" cy="0"/>
+        </a:xfrm>
+      </p:grpSpPr>
+      <p:grpSp>
+        <p:nvGrpSpPr>
+          <p:cNvPr id="26" name="Group 25"/>
+          <p:cNvGrpSpPr/>
+          <p:nvPr/>
+        </p:nvGrpSpPr>
+        <p:grpSpPr>
+          <a:xfrm>
+            <a:off x="1497875" y="804870"/>
+            <a:ext cx="8168640" cy="5839769"/>
+            <a:chOff x="1497875" y="804870"/>
+            <a:chExt cx="8168640" cy="5839769"/>
+          </a:xfrm>
+        </p:grpSpPr>
+        <p:sp>
+          <p:nvSpPr>
+            <p:cNvPr id="2" name="Rounded Rectangle 1"/>
+            <p:cNvSpPr/>
+            <p:nvPr/>
+          </p:nvSpPr>
+          <p:spPr>
+            <a:xfrm>
+              <a:off x="1497875" y="804870"/>
+              <a:ext cx="8168640" cy="5839769"/>
+            </a:xfrm>
+            <a:prstGeom prst="roundRect">
+              <a:avLst/>
+            </a:prstGeom>
+            <a:noFill/>
+            <a:ln w="76200">
+              <a:solidFill>
+                <a:schemeClr val="tx1"/>
+              </a:solidFill>
+            </a:ln>
+          </p:spPr>
+          <p:style>
+            <a:lnRef idx="2">
+              <a:schemeClr val="accent1">
+                <a:shade val="50000"/>
+              </a:schemeClr>
+            </a:lnRef>
+            <a:fillRef idx="1">
+              <a:schemeClr val="accent1"/>
+            </a:fillRef>
+            <a:effectRef idx="0">
+              <a:schemeClr val="accent1"/>
+            </a:effectRef>
+            <a:fontRef idx="minor">
+              <a:schemeClr val="lt1"/>
+            </a:fontRef>
+          </p:style>
+          <p:txBody>
+            <a:bodyPr rtlCol="0" anchor="ctr"/>
+            <a:lstStyle/>
+            <a:p>
+              <a:pPr algn="ctr"/>
+              <a:endParaRPr lang="en-CA"/>
+            </a:p>
+          </p:txBody>
+        </p:sp>
+        <p:sp>
+          <p:nvSpPr>
+            <p:cNvPr id="3" name="TextBox 2"/>
+            <p:cNvSpPr txBox="1"/>
+            <p:nvPr/>
+          </p:nvSpPr>
+          <p:spPr>
+            <a:xfrm>
+              <a:off x="3270068" y="889367"/>
+              <a:ext cx="4615544" cy="646331"/>
+            </a:xfrm>
+            <a:prstGeom prst="rect">
+              <a:avLst/>
+            </a:prstGeom>
+            <a:noFill/>
+          </p:spPr>
+          <p:txBody>
+            <a:bodyPr wrap="square" rtlCol="0" anchor="ctr">
+              <a:spAutoFit/>
+            </a:bodyPr>
+            <a:lstStyle/>
+            <a:p>
+              <a:pPr algn="ctr"/>
+              <a:r>
+                <a:rPr lang="en-US" sz="3600" dirty="0" smtClean="0"/>
+                <a:t>Overall functionality</a:t>
+              </a:r>
+              <a:endParaRPr lang="en-CA" sz="3600" dirty="0"/>
+            </a:p>
+          </p:txBody>
+        </p:sp>
+        <p:sp>
+          <p:nvSpPr>
+            <p:cNvPr id="4" name="Rounded Rectangle 3"/>
+            <p:cNvSpPr/>
+            <p:nvPr/>
+          </p:nvSpPr>
+          <p:spPr>
+            <a:xfrm>
+              <a:off x="6932023" y="1698171"/>
+              <a:ext cx="2368728" cy="4659086"/>
+            </a:xfrm>
+            <a:prstGeom prst="roundRect">
+              <a:avLst/>
+            </a:prstGeom>
+            <a:noFill/>
+            <a:ln w="76200">
+              <a:solidFill>
+                <a:schemeClr val="tx1"/>
+              </a:solidFill>
+            </a:ln>
+          </p:spPr>
+          <p:style>
+            <a:lnRef idx="2">
+              <a:schemeClr val="accent1">
+                <a:shade val="50000"/>
+              </a:schemeClr>
+            </a:lnRef>
+            <a:fillRef idx="1">
+              <a:schemeClr val="accent1"/>
+            </a:fillRef>
+            <a:effectRef idx="0">
+              <a:schemeClr val="accent1"/>
+            </a:effectRef>
+            <a:fontRef idx="minor">
+              <a:schemeClr val="lt1"/>
+            </a:fontRef>
+          </p:style>
+          <p:txBody>
+            <a:bodyPr rtlCol="0" anchor="ctr"/>
+            <a:lstStyle/>
+            <a:p>
+              <a:pPr algn="ctr"/>
+              <a:endParaRPr lang="en-CA"/>
+            </a:p>
+          </p:txBody>
+        </p:sp>
+        <p:sp>
+          <p:nvSpPr>
+            <p:cNvPr id="5" name="Rounded Rectangle 4"/>
+            <p:cNvSpPr/>
+            <p:nvPr/>
+          </p:nvSpPr>
+          <p:spPr>
+            <a:xfrm>
+              <a:off x="4397830" y="1698171"/>
+              <a:ext cx="2368728" cy="4659086"/>
+            </a:xfrm>
+            <a:prstGeom prst="roundRect">
+              <a:avLst/>
+            </a:prstGeom>
+            <a:noFill/>
+            <a:ln w="76200">
+              <a:solidFill>
+                <a:schemeClr val="tx1"/>
+              </a:solidFill>
+            </a:ln>
+          </p:spPr>
+          <p:style>
+            <a:lnRef idx="2">
+              <a:schemeClr val="accent1">
+                <a:shade val="50000"/>
+              </a:schemeClr>
+            </a:lnRef>
+            <a:fillRef idx="1">
+              <a:schemeClr val="accent1"/>
+            </a:fillRef>
+            <a:effectRef idx="0">
+              <a:schemeClr val="accent1"/>
+            </a:effectRef>
+            <a:fontRef idx="minor">
+              <a:schemeClr val="lt1"/>
+            </a:fontRef>
+          </p:style>
+          <p:txBody>
+            <a:bodyPr rtlCol="0" anchor="ctr"/>
+            <a:lstStyle/>
+            <a:p>
+              <a:pPr algn="ctr"/>
+              <a:endParaRPr lang="en-CA"/>
+            </a:p>
+          </p:txBody>
+        </p:sp>
+        <p:sp>
+          <p:nvSpPr>
+            <p:cNvPr id="6" name="Rounded Rectangle 5"/>
+            <p:cNvSpPr/>
+            <p:nvPr/>
+          </p:nvSpPr>
+          <p:spPr>
+            <a:xfrm>
+              <a:off x="1863637" y="1698171"/>
+              <a:ext cx="2368728" cy="4659086"/>
+            </a:xfrm>
+            <a:prstGeom prst="roundRect">
+              <a:avLst/>
+            </a:prstGeom>
+            <a:noFill/>
+            <a:ln w="76200">
+              <a:solidFill>
+                <a:schemeClr val="tx1"/>
+              </a:solidFill>
+            </a:ln>
+          </p:spPr>
+          <p:style>
+            <a:lnRef idx="2">
+              <a:schemeClr val="accent1">
+                <a:shade val="50000"/>
+              </a:schemeClr>
+            </a:lnRef>
+            <a:fillRef idx="1">
+              <a:schemeClr val="accent1"/>
+            </a:fillRef>
+            <a:effectRef idx="0">
+              <a:schemeClr val="accent1"/>
+            </a:effectRef>
+            <a:fontRef idx="minor">
+              <a:schemeClr val="lt1"/>
+            </a:fontRef>
+          </p:style>
+          <p:txBody>
+            <a:bodyPr rtlCol="0" anchor="ctr"/>
+            <a:lstStyle/>
+            <a:p>
+              <a:pPr algn="ctr"/>
+              <a:endParaRPr lang="en-CA"/>
+            </a:p>
+          </p:txBody>
+        </p:sp>
+        <p:sp>
+          <p:nvSpPr>
+            <p:cNvPr id="8" name="TextBox 7"/>
+            <p:cNvSpPr txBox="1"/>
+            <p:nvPr/>
+          </p:nvSpPr>
+          <p:spPr>
+            <a:xfrm>
+              <a:off x="1981201" y="1677029"/>
+              <a:ext cx="2133599" cy="584775"/>
+            </a:xfrm>
+            <a:prstGeom prst="rect">
+              <a:avLst/>
+            </a:prstGeom>
+            <a:noFill/>
+          </p:spPr>
+          <p:txBody>
+            <a:bodyPr wrap="square" rtlCol="0" anchor="ctr">
+              <a:spAutoFit/>
+            </a:bodyPr>
+            <a:lstStyle/>
+            <a:p>
+              <a:pPr algn="ctr"/>
+              <a:r>
+                <a:rPr lang="en-US" sz="3200" dirty="0" smtClean="0"/>
+                <a:t>Perception</a:t>
+              </a:r>
+              <a:endParaRPr lang="en-CA" sz="3200" dirty="0"/>
+            </a:p>
+          </p:txBody>
+        </p:sp>
+        <p:sp>
+          <p:nvSpPr>
+            <p:cNvPr id="9" name="TextBox 8"/>
+            <p:cNvSpPr txBox="1"/>
+            <p:nvPr/>
+          </p:nvSpPr>
+          <p:spPr>
+            <a:xfrm>
+              <a:off x="4574177" y="1698171"/>
+              <a:ext cx="2133599" cy="584775"/>
+            </a:xfrm>
+            <a:prstGeom prst="rect">
+              <a:avLst/>
+            </a:prstGeom>
+            <a:noFill/>
+          </p:spPr>
+          <p:txBody>
+            <a:bodyPr wrap="square" rtlCol="0" anchor="ctr">
+              <a:spAutoFit/>
+            </a:bodyPr>
+            <a:lstStyle/>
+            <a:p>
+              <a:pPr algn="ctr"/>
+              <a:r>
+                <a:rPr lang="en-US" sz="3200" dirty="0" smtClean="0"/>
+                <a:t>Modelling</a:t>
+              </a:r>
+              <a:endParaRPr lang="en-CA" sz="3200" dirty="0"/>
+            </a:p>
+          </p:txBody>
+        </p:sp>
+        <p:sp>
+          <p:nvSpPr>
+            <p:cNvPr id="10" name="TextBox 9"/>
+            <p:cNvSpPr txBox="1"/>
+            <p:nvPr/>
+          </p:nvSpPr>
+          <p:spPr>
+            <a:xfrm>
+              <a:off x="7049587" y="1677028"/>
+              <a:ext cx="2133599" cy="584775"/>
+            </a:xfrm>
+            <a:prstGeom prst="rect">
+              <a:avLst/>
+            </a:prstGeom>
+            <a:noFill/>
+          </p:spPr>
+          <p:txBody>
+            <a:bodyPr wrap="square" rtlCol="0" anchor="ctr">
+              <a:spAutoFit/>
+            </a:bodyPr>
+            <a:lstStyle/>
+            <a:p>
+              <a:pPr algn="ctr"/>
+              <a:r>
+                <a:rPr lang="en-US" sz="3200" dirty="0" smtClean="0"/>
+                <a:t>Behavior</a:t>
+              </a:r>
+              <a:endParaRPr lang="en-CA" sz="3200" dirty="0"/>
+            </a:p>
+          </p:txBody>
+        </p:sp>
+        <p:grpSp>
+          <p:nvGrpSpPr>
+            <p:cNvPr id="13" name="Group 12"/>
+            <p:cNvGrpSpPr/>
+            <p:nvPr/>
+          </p:nvGrpSpPr>
+          <p:grpSpPr>
+            <a:xfrm>
+              <a:off x="2016033" y="2544905"/>
+              <a:ext cx="2133599" cy="860146"/>
+              <a:chOff x="2016033" y="2544905"/>
+              <a:chExt cx="2133599" cy="860146"/>
+            </a:xfrm>
+          </p:grpSpPr>
+          <p:sp>
+            <p:nvSpPr>
+              <p:cNvPr id="11" name="Rounded Rectangle 10"/>
+              <p:cNvSpPr/>
+              <p:nvPr/>
+            </p:nvSpPr>
+            <p:spPr>
+              <a:xfrm>
+                <a:off x="2016033" y="2544905"/>
+                <a:ext cx="2063934" cy="860146"/>
+              </a:xfrm>
+              <a:prstGeom prst="roundRect">
+                <a:avLst/>
+              </a:prstGeom>
+              <a:noFill/>
+              <a:ln w="38100">
+                <a:solidFill>
+                  <a:schemeClr val="tx1"/>
+                </a:solidFill>
+              </a:ln>
+            </p:spPr>
+            <p:style>
+              <a:lnRef idx="2">
+                <a:schemeClr val="accent1">
+                  <a:shade val="50000"/>
+                </a:schemeClr>
+              </a:lnRef>
+              <a:fillRef idx="1">
+                <a:schemeClr val="accent1"/>
+              </a:fillRef>
+              <a:effectRef idx="0">
+                <a:schemeClr val="accent1"/>
+              </a:effectRef>
+              <a:fontRef idx="minor">
+                <a:schemeClr val="lt1"/>
+              </a:fontRef>
+            </p:style>
+            <p:txBody>
+              <a:bodyPr rtlCol="0" anchor="ctr"/>
+              <a:lstStyle/>
+              <a:p>
+                <a:pPr algn="ctr"/>
+                <a:endParaRPr lang="en-CA" dirty="0"/>
+              </a:p>
+            </p:txBody>
+          </p:sp>
+          <p:sp>
+            <p:nvSpPr>
+              <p:cNvPr id="12" name="TextBox 11"/>
+              <p:cNvSpPr txBox="1"/>
+              <p:nvPr/>
+            </p:nvSpPr>
+            <p:spPr>
+              <a:xfrm>
+                <a:off x="2016033" y="2544905"/>
+                <a:ext cx="2133599" cy="830997"/>
+              </a:xfrm>
+              <a:prstGeom prst="rect">
+                <a:avLst/>
+              </a:prstGeom>
+              <a:noFill/>
+            </p:spPr>
+            <p:txBody>
+              <a:bodyPr wrap="square" rtlCol="0" anchor="ctr">
+                <a:spAutoFit/>
+              </a:bodyPr>
+              <a:lstStyle/>
+              <a:p>
+                <a:pPr algn="ctr"/>
+                <a:r>
+                  <a:rPr lang="en-US" sz="2400" dirty="0" smtClean="0"/>
+                  <a:t>Measurement type</a:t>
+                </a:r>
+                <a:endParaRPr lang="en-CA" sz="2400" dirty="0"/>
+              </a:p>
+            </p:txBody>
+          </p:sp>
+        </p:grpSp>
+        <p:grpSp>
+          <p:nvGrpSpPr>
+            <p:cNvPr id="14" name="Group 13"/>
+            <p:cNvGrpSpPr/>
+            <p:nvPr/>
+          </p:nvGrpSpPr>
+          <p:grpSpPr>
+            <a:xfrm>
+              <a:off x="4438109" y="2410693"/>
+              <a:ext cx="2279463" cy="3740726"/>
+              <a:chOff x="1938748" y="2512682"/>
+              <a:chExt cx="2279463" cy="1088396"/>
+            </a:xfrm>
+          </p:grpSpPr>
+          <p:sp>
+            <p:nvSpPr>
+              <p:cNvPr id="15" name="Rounded Rectangle 14"/>
+              <p:cNvSpPr/>
+              <p:nvPr/>
+            </p:nvSpPr>
+            <p:spPr>
+              <a:xfrm>
+                <a:off x="2020388" y="2512682"/>
+                <a:ext cx="2124892" cy="1088396"/>
+              </a:xfrm>
+              <a:prstGeom prst="roundRect">
+                <a:avLst/>
+              </a:prstGeom>
+              <a:noFill/>
+              <a:ln w="38100">
+                <a:solidFill>
+                  <a:schemeClr val="tx1"/>
+                </a:solidFill>
+              </a:ln>
+            </p:spPr>
+            <p:style>
+              <a:lnRef idx="2">
+                <a:schemeClr val="accent1">
+                  <a:shade val="50000"/>
+                </a:schemeClr>
+              </a:lnRef>
+              <a:fillRef idx="1">
+                <a:schemeClr val="accent1"/>
+              </a:fillRef>
+              <a:effectRef idx="0">
+                <a:schemeClr val="accent1"/>
+              </a:effectRef>
+              <a:fontRef idx="minor">
+                <a:schemeClr val="lt1"/>
+              </a:fontRef>
+            </p:style>
+            <p:txBody>
+              <a:bodyPr rtlCol="0" anchor="ctr"/>
+              <a:lstStyle/>
+              <a:p>
+                <a:pPr algn="ctr"/>
+                <a:endParaRPr lang="en-CA" dirty="0"/>
+              </a:p>
+            </p:txBody>
+          </p:sp>
+          <p:sp>
+            <p:nvSpPr>
+              <p:cNvPr id="16" name="TextBox 15"/>
+              <p:cNvSpPr txBox="1"/>
+              <p:nvPr/>
+            </p:nvSpPr>
+            <p:spPr>
+              <a:xfrm>
+                <a:off x="1938748" y="2531741"/>
+                <a:ext cx="2279463" cy="241786"/>
+              </a:xfrm>
+              <a:prstGeom prst="rect">
+                <a:avLst/>
+              </a:prstGeom>
+              <a:noFill/>
+            </p:spPr>
+            <p:txBody>
+              <a:bodyPr wrap="square" rtlCol="0" anchor="ctr">
+                <a:spAutoFit/>
+              </a:bodyPr>
+              <a:lstStyle/>
+              <a:p>
+                <a:pPr algn="ctr"/>
+                <a:r>
+                  <a:rPr lang="en-US" sz="2400" dirty="0" smtClean="0"/>
+                  <a:t>Model from features method</a:t>
+                </a:r>
+                <a:endParaRPr lang="en-CA" sz="2400" dirty="0"/>
+              </a:p>
+            </p:txBody>
+          </p:sp>
+        </p:grpSp>
+        <p:grpSp>
+          <p:nvGrpSpPr>
+            <p:cNvPr id="17" name="Group 16"/>
+            <p:cNvGrpSpPr/>
+            <p:nvPr/>
+          </p:nvGrpSpPr>
+          <p:grpSpPr>
+            <a:xfrm>
+              <a:off x="4511042" y="3695225"/>
+              <a:ext cx="2133599" cy="1641908"/>
+              <a:chOff x="2041073" y="2154024"/>
+              <a:chExt cx="2133599" cy="1641908"/>
+            </a:xfrm>
+          </p:grpSpPr>
+          <p:sp>
+            <p:nvSpPr>
+              <p:cNvPr id="18" name="Rounded Rectangle 17"/>
+              <p:cNvSpPr/>
+              <p:nvPr/>
+            </p:nvSpPr>
+            <p:spPr>
+              <a:xfrm>
+                <a:off x="2114924" y="2154024"/>
+                <a:ext cx="1994600" cy="1641908"/>
+              </a:xfrm>
+              <a:prstGeom prst="roundRect">
+                <a:avLst/>
+              </a:prstGeom>
+              <a:noFill/>
+              <a:ln w="38100">
+                <a:solidFill>
+                  <a:schemeClr val="tx1"/>
+                </a:solidFill>
+              </a:ln>
+            </p:spPr>
+            <p:style>
+              <a:lnRef idx="2">
+                <a:schemeClr val="accent1">
+                  <a:shade val="50000"/>
+                </a:schemeClr>
+              </a:lnRef>
+              <a:fillRef idx="1">
+                <a:schemeClr val="accent1"/>
+              </a:fillRef>
+              <a:effectRef idx="0">
+                <a:schemeClr val="accent1"/>
+              </a:effectRef>
+              <a:fontRef idx="minor">
+                <a:schemeClr val="lt1"/>
+              </a:fontRef>
+            </p:style>
+            <p:txBody>
+              <a:bodyPr rtlCol="0" anchor="ctr"/>
+              <a:lstStyle/>
+              <a:p>
+                <a:pPr algn="ctr"/>
+                <a:endParaRPr lang="en-CA" dirty="0"/>
+              </a:p>
+            </p:txBody>
+          </p:sp>
+          <p:sp>
+            <p:nvSpPr>
+              <p:cNvPr id="19" name="TextBox 18"/>
+              <p:cNvSpPr txBox="1"/>
+              <p:nvPr/>
+            </p:nvSpPr>
+            <p:spPr>
+              <a:xfrm>
+                <a:off x="2041073" y="2208962"/>
+                <a:ext cx="2133599" cy="1569660"/>
+              </a:xfrm>
+              <a:prstGeom prst="rect">
+                <a:avLst/>
+              </a:prstGeom>
+              <a:noFill/>
+            </p:spPr>
+            <p:txBody>
+              <a:bodyPr wrap="square" rtlCol="0" anchor="ctr">
+                <a:spAutoFit/>
+              </a:bodyPr>
+              <a:lstStyle/>
+              <a:p>
+                <a:pPr algn="ctr"/>
+                <a:r>
+                  <a:rPr lang="en-US" sz="2400" dirty="0" smtClean="0"/>
+                  <a:t>Environmental features from measurements method</a:t>
+                </a:r>
+                <a:endParaRPr lang="en-CA" sz="2400" dirty="0"/>
+              </a:p>
+            </p:txBody>
+          </p:sp>
+        </p:grpSp>
+        <p:grpSp>
+          <p:nvGrpSpPr>
+            <p:cNvPr id="20" name="Group 19"/>
+            <p:cNvGrpSpPr/>
+            <p:nvPr/>
+          </p:nvGrpSpPr>
+          <p:grpSpPr>
+            <a:xfrm>
+              <a:off x="7049051" y="3788269"/>
+              <a:ext cx="2133599" cy="1200329"/>
+              <a:chOff x="2041073" y="2393627"/>
+              <a:chExt cx="2133599" cy="1200329"/>
+            </a:xfrm>
+          </p:grpSpPr>
+          <p:sp>
+            <p:nvSpPr>
+              <p:cNvPr id="21" name="Rounded Rectangle 20"/>
+              <p:cNvSpPr/>
+              <p:nvPr/>
+            </p:nvSpPr>
+            <p:spPr>
+              <a:xfrm>
+                <a:off x="2220545" y="2393627"/>
+                <a:ext cx="1783358" cy="1162702"/>
+              </a:xfrm>
+              <a:prstGeom prst="roundRect">
+                <a:avLst/>
+              </a:prstGeom>
+              <a:noFill/>
+              <a:ln w="38100">
+                <a:solidFill>
+                  <a:schemeClr val="tx1"/>
+                </a:solidFill>
+              </a:ln>
+            </p:spPr>
+            <p:style>
+              <a:lnRef idx="2">
+                <a:schemeClr val="accent1">
+                  <a:shade val="50000"/>
+                </a:schemeClr>
+              </a:lnRef>
+              <a:fillRef idx="1">
+                <a:schemeClr val="accent1"/>
+              </a:fillRef>
+              <a:effectRef idx="0">
+                <a:schemeClr val="accent1"/>
+              </a:effectRef>
+              <a:fontRef idx="minor">
+                <a:schemeClr val="lt1"/>
+              </a:fontRef>
+            </p:style>
+            <p:txBody>
+              <a:bodyPr rtlCol="0" anchor="ctr"/>
+              <a:lstStyle/>
+              <a:p>
+                <a:pPr algn="ctr"/>
+                <a:endParaRPr lang="en-CA" dirty="0"/>
+              </a:p>
+            </p:txBody>
+          </p:sp>
+          <p:sp>
+            <p:nvSpPr>
+              <p:cNvPr id="22" name="TextBox 21"/>
+              <p:cNvSpPr txBox="1"/>
+              <p:nvPr/>
+            </p:nvSpPr>
+            <p:spPr>
+              <a:xfrm>
+                <a:off x="2041073" y="2393627"/>
+                <a:ext cx="2133599" cy="1200329"/>
+              </a:xfrm>
+              <a:prstGeom prst="rect">
+                <a:avLst/>
+              </a:prstGeom>
+              <a:noFill/>
+            </p:spPr>
+            <p:txBody>
+              <a:bodyPr wrap="square" rtlCol="0" anchor="ctr">
+                <a:spAutoFit/>
+              </a:bodyPr>
+              <a:lstStyle/>
+              <a:p>
+                <a:pPr algn="ctr"/>
+                <a:r>
+                  <a:rPr lang="en-US" sz="2400" dirty="0" smtClean="0"/>
+                  <a:t>Behaviors to implement functionality</a:t>
+                </a:r>
+                <a:endParaRPr lang="en-CA" sz="2400" dirty="0"/>
+              </a:p>
+            </p:txBody>
+          </p:sp>
+        </p:grpSp>
+        <p:grpSp>
+          <p:nvGrpSpPr>
+            <p:cNvPr id="23" name="Group 22"/>
+            <p:cNvGrpSpPr/>
+            <p:nvPr/>
+          </p:nvGrpSpPr>
+          <p:grpSpPr>
+            <a:xfrm>
+              <a:off x="6949424" y="2410692"/>
+              <a:ext cx="2351328" cy="3740726"/>
+              <a:chOff x="1940912" y="1843918"/>
+              <a:chExt cx="2351328" cy="3740726"/>
+            </a:xfrm>
+          </p:grpSpPr>
+          <p:sp>
+            <p:nvSpPr>
+              <p:cNvPr id="24" name="Rounded Rectangle 23"/>
+              <p:cNvSpPr/>
+              <p:nvPr/>
+            </p:nvSpPr>
+            <p:spPr>
+              <a:xfrm>
+                <a:off x="2098767" y="1843918"/>
+                <a:ext cx="2026914" cy="3740726"/>
+              </a:xfrm>
+              <a:prstGeom prst="roundRect">
+                <a:avLst/>
+              </a:prstGeom>
+              <a:noFill/>
+              <a:ln w="38100">
+                <a:solidFill>
+                  <a:schemeClr val="tx1"/>
+                </a:solidFill>
+              </a:ln>
+            </p:spPr>
+            <p:style>
+              <a:lnRef idx="2">
+                <a:schemeClr val="accent1">
+                  <a:shade val="50000"/>
+                </a:schemeClr>
+              </a:lnRef>
+              <a:fillRef idx="1">
+                <a:schemeClr val="accent1"/>
+              </a:fillRef>
+              <a:effectRef idx="0">
+                <a:schemeClr val="accent1"/>
+              </a:effectRef>
+              <a:fontRef idx="minor">
+                <a:schemeClr val="lt1"/>
+              </a:fontRef>
+            </p:style>
+            <p:txBody>
+              <a:bodyPr rtlCol="0" anchor="ctr"/>
+              <a:lstStyle/>
+              <a:p>
+                <a:pPr algn="ctr"/>
+                <a:endParaRPr lang="en-CA" dirty="0"/>
+              </a:p>
+            </p:txBody>
+          </p:sp>
+          <p:sp>
+            <p:nvSpPr>
+              <p:cNvPr id="25" name="TextBox 24"/>
+              <p:cNvSpPr txBox="1"/>
+              <p:nvPr/>
+            </p:nvSpPr>
+            <p:spPr>
+              <a:xfrm>
+                <a:off x="1940912" y="1890970"/>
+                <a:ext cx="2351328" cy="1200329"/>
+              </a:xfrm>
+              <a:prstGeom prst="rect">
+                <a:avLst/>
+              </a:prstGeom>
+              <a:noFill/>
+            </p:spPr>
+            <p:txBody>
+              <a:bodyPr wrap="square" rtlCol="0" anchor="ctr">
+                <a:spAutoFit/>
+              </a:bodyPr>
+              <a:lstStyle/>
+              <a:p>
+                <a:pPr algn="ctr"/>
+                <a:r>
+                  <a:rPr lang="en-US" sz="2400" dirty="0" smtClean="0"/>
+                  <a:t>Behavior arbitration from model method</a:t>
+                </a:r>
+                <a:endParaRPr lang="en-CA" sz="2400" dirty="0"/>
+              </a:p>
+            </p:txBody>
+          </p:sp>
+        </p:grpSp>
+      </p:grpSp>
+    </p:spTree>
+    <p:extLst>
+      <p:ext uri="{BB962C8B-B14F-4D97-AF65-F5344CB8AC3E}">
+        <p14:creationId xmlns:p14="http://schemas.microsoft.com/office/powerpoint/2010/main" val="4246947224"/>
+      </p:ext>
+    </p:extLst>
+  </p:cSld>
+  <p:clrMapOvr>
+    <a:masterClrMapping/>
+  </p:clrMapOvr>
+</p:sld>
+</file>
+
+<file path=ppt/slides/slide3.xml><?xml version="1.0" encoding="utf-8"?>
+<p:sld xmlns:a="http://schemas.openxmlformats.org/drawingml/2006/main" xmlns:r="http://schemas.openxmlformats.org/officeDocument/2006/relationships" xmlns:p="http://schemas.openxmlformats.org/presentationml/2006/main">
+  <p:cSld>
+    <p:spTree>
+      <p:nvGrpSpPr>
+        <p:cNvPr id="1" name=""/>
+        <p:cNvGrpSpPr/>
+        <p:nvPr/>
+      </p:nvGrpSpPr>
+      <p:grpSpPr>
+        <a:xfrm>
+          <a:off x="0" y="0"/>
+          <a:ext cx="0" cy="0"/>
+          <a:chOff x="0" y="0"/>
+          <a:chExt cx="0" cy="0"/>
+        </a:xfrm>
+      </p:grpSpPr>
+      <p:sp>
+        <p:nvSpPr>
+          <p:cNvPr id="2" name="TextBox 1"/>
+          <p:cNvSpPr txBox="1"/>
+          <p:nvPr/>
+        </p:nvSpPr>
+        <p:spPr>
+          <a:xfrm>
+            <a:off x="1071155" y="3204754"/>
+            <a:ext cx="1445623" cy="715089"/>
+          </a:xfrm>
+          <a:prstGeom prst="roundRect">
+            <a:avLst/>
+          </a:prstGeom>
+          <a:noFill/>
+          <a:ln w="28575">
+            <a:solidFill>
+              <a:schemeClr val="tx1"/>
+            </a:solidFill>
+          </a:ln>
+        </p:spPr>
+        <p:txBody>
+          <a:bodyPr wrap="square" rtlCol="0">
+            <a:spAutoFit/>
+          </a:bodyPr>
+          <a:lstStyle/>
+          <a:p>
+            <a:pPr algn="ctr"/>
+            <a:r>
+              <a:rPr lang="en-US" dirty="0" smtClean="0"/>
+              <a:t>Overall functionality</a:t>
+            </a:r>
+            <a:endParaRPr lang="en-CA" dirty="0"/>
+          </a:p>
+        </p:txBody>
+      </p:sp>
+      <p:sp>
+        <p:nvSpPr>
+          <p:cNvPr id="3" name="TextBox 2"/>
+          <p:cNvSpPr txBox="1"/>
+          <p:nvPr/>
+        </p:nvSpPr>
+        <p:spPr>
+          <a:xfrm>
+            <a:off x="3513909" y="4476204"/>
+            <a:ext cx="1445623" cy="408623"/>
+          </a:xfrm>
+          <a:prstGeom prst="roundRect">
+            <a:avLst/>
+          </a:prstGeom>
+          <a:noFill/>
+          <a:ln w="28575">
+            <a:solidFill>
+              <a:schemeClr val="tx1"/>
+            </a:solidFill>
+          </a:ln>
+        </p:spPr>
+        <p:txBody>
+          <a:bodyPr wrap="square" rtlCol="0">
+            <a:spAutoFit/>
+          </a:bodyPr>
+          <a:lstStyle/>
+          <a:p>
+            <a:pPr algn="ctr"/>
+            <a:r>
+              <a:rPr lang="en-US" dirty="0" smtClean="0"/>
+              <a:t>Perception</a:t>
+            </a:r>
+            <a:endParaRPr lang="en-CA" dirty="0"/>
+          </a:p>
+        </p:txBody>
+      </p:sp>
+      <p:sp>
+        <p:nvSpPr>
+          <p:cNvPr id="4" name="TextBox 3"/>
+          <p:cNvSpPr txBox="1"/>
+          <p:nvPr/>
+        </p:nvSpPr>
+        <p:spPr>
+          <a:xfrm>
+            <a:off x="3513909" y="3357986"/>
+            <a:ext cx="1445623" cy="408623"/>
+          </a:xfrm>
+          <a:prstGeom prst="roundRect">
+            <a:avLst/>
+          </a:prstGeom>
+          <a:noFill/>
+          <a:ln w="28575">
+            <a:solidFill>
+              <a:schemeClr val="tx1"/>
+            </a:solidFill>
+          </a:ln>
+        </p:spPr>
+        <p:txBody>
+          <a:bodyPr wrap="square" rtlCol="0">
+            <a:spAutoFit/>
+          </a:bodyPr>
+          <a:lstStyle/>
+          <a:p>
+            <a:pPr algn="ctr"/>
+            <a:r>
+              <a:rPr lang="en-US" dirty="0" smtClean="0"/>
+              <a:t>Modelling</a:t>
+            </a:r>
+            <a:endParaRPr lang="en-CA" dirty="0"/>
+          </a:p>
+        </p:txBody>
+      </p:sp>
+      <p:sp>
+        <p:nvSpPr>
+          <p:cNvPr id="5" name="TextBox 4"/>
+          <p:cNvSpPr txBox="1"/>
+          <p:nvPr/>
+        </p:nvSpPr>
+        <p:spPr>
+          <a:xfrm>
+            <a:off x="3513909" y="2239768"/>
+            <a:ext cx="1445623" cy="408623"/>
+          </a:xfrm>
+          <a:prstGeom prst="roundRect">
+            <a:avLst/>
+          </a:prstGeom>
+          <a:noFill/>
+          <a:ln w="28575">
+            <a:solidFill>
+              <a:schemeClr val="tx1"/>
+            </a:solidFill>
+          </a:ln>
+        </p:spPr>
+        <p:txBody>
+          <a:bodyPr wrap="square" rtlCol="0">
+            <a:spAutoFit/>
+          </a:bodyPr>
+          <a:lstStyle/>
+          <a:p>
+            <a:pPr algn="ctr"/>
+            <a:r>
+              <a:rPr lang="en-US" dirty="0" smtClean="0"/>
+              <a:t>Behavior</a:t>
+            </a:r>
+            <a:endParaRPr lang="en-CA" dirty="0"/>
+          </a:p>
+        </p:txBody>
+      </p:sp>
+      <p:cxnSp>
+        <p:nvCxnSpPr>
+          <p:cNvPr id="7" name="Straight Arrow Connector 6"/>
+          <p:cNvCxnSpPr>
+            <a:stCxn id="2" idx="3"/>
+            <a:endCxn id="4" idx="1"/>
+          </p:cNvCxnSpPr>
+          <p:nvPr/>
+        </p:nvCxnSpPr>
+        <p:spPr>
+          <a:xfrm flipV="1">
+            <a:off x="2516778" y="3562298"/>
+            <a:ext cx="997131" cy="1"/>
+          </a:xfrm>
+          <a:prstGeom prst="straightConnector1">
+            <a:avLst/>
+          </a:prstGeom>
+          <a:ln w="38100">
+            <a:solidFill>
+              <a:schemeClr val="tx1"/>
+            </a:solidFill>
+            <a:tailEnd type="triangle"/>
+          </a:ln>
+        </p:spPr>
+        <p:style>
+          <a:lnRef idx="1">
+            <a:schemeClr val="accent1"/>
+          </a:lnRef>
+          <a:fillRef idx="0">
+            <a:schemeClr val="accent1"/>
+          </a:fillRef>
+          <a:effectRef idx="0">
+            <a:schemeClr val="accent1"/>
+          </a:effectRef>
+          <a:fontRef idx="minor">
+            <a:schemeClr val="tx1"/>
+          </a:fontRef>
+        </p:style>
+      </p:cxnSp>
+      <p:cxnSp>
+        <p:nvCxnSpPr>
+          <p:cNvPr id="9" name="Elbow Connector 8"/>
+          <p:cNvCxnSpPr>
+            <a:stCxn id="2" idx="3"/>
+            <a:endCxn id="3" idx="1"/>
+          </p:cNvCxnSpPr>
+          <p:nvPr/>
+        </p:nvCxnSpPr>
+        <p:spPr>
+          <a:xfrm>
+            <a:off x="2516778" y="3562299"/>
+            <a:ext cx="997131" cy="1118217"/>
+          </a:xfrm>
+          <a:prstGeom prst="bentConnector3">
+            <a:avLst/>
+          </a:prstGeom>
+          <a:ln w="38100">
+            <a:solidFill>
+              <a:schemeClr val="tx1"/>
+            </a:solidFill>
+            <a:tailEnd type="triangle"/>
+          </a:ln>
+        </p:spPr>
+        <p:style>
+          <a:lnRef idx="1">
+            <a:schemeClr val="accent1"/>
+          </a:lnRef>
+          <a:fillRef idx="0">
+            <a:schemeClr val="accent1"/>
+          </a:fillRef>
+          <a:effectRef idx="0">
+            <a:schemeClr val="accent1"/>
+          </a:effectRef>
+          <a:fontRef idx="minor">
+            <a:schemeClr val="tx1"/>
+          </a:fontRef>
+        </p:style>
+      </p:cxnSp>
+      <p:cxnSp>
+        <p:nvCxnSpPr>
+          <p:cNvPr id="11" name="Elbow Connector 10"/>
+          <p:cNvCxnSpPr>
+            <a:stCxn id="2" idx="3"/>
+            <a:endCxn id="5" idx="1"/>
+          </p:cNvCxnSpPr>
+          <p:nvPr/>
+        </p:nvCxnSpPr>
+        <p:spPr>
+          <a:xfrm flipV="1">
+            <a:off x="2516778" y="2444080"/>
+            <a:ext cx="997131" cy="1118219"/>
+          </a:xfrm>
+          <a:prstGeom prst="bentConnector3">
+            <a:avLst/>
+          </a:prstGeom>
+          <a:ln w="38100">
+            <a:solidFill>
+              <a:schemeClr val="tx1"/>
+            </a:solidFill>
+            <a:tailEnd type="triangle"/>
+          </a:ln>
+        </p:spPr>
+        <p:style>
+          <a:lnRef idx="1">
+            <a:schemeClr val="accent1"/>
+          </a:lnRef>
+          <a:fillRef idx="0">
+            <a:schemeClr val="accent1"/>
+          </a:fillRef>
+          <a:effectRef idx="0">
+            <a:schemeClr val="accent1"/>
+          </a:effectRef>
+          <a:fontRef idx="minor">
+            <a:schemeClr val="tx1"/>
+          </a:fontRef>
+        </p:style>
+      </p:cxnSp>
+      <p:sp>
+        <p:nvSpPr>
+          <p:cNvPr id="12" name="TextBox 11"/>
+          <p:cNvSpPr txBox="1"/>
+          <p:nvPr/>
+        </p:nvSpPr>
+        <p:spPr>
+          <a:xfrm>
+            <a:off x="5956663" y="4476204"/>
+            <a:ext cx="1672046" cy="715089"/>
+          </a:xfrm>
+          <a:prstGeom prst="roundRect">
+            <a:avLst/>
+          </a:prstGeom>
+          <a:noFill/>
+          <a:ln w="28575">
+            <a:solidFill>
+              <a:schemeClr val="tx1"/>
+            </a:solidFill>
+          </a:ln>
+        </p:spPr>
+        <p:txBody>
+          <a:bodyPr wrap="square" rtlCol="0">
+            <a:spAutoFit/>
+          </a:bodyPr>
+          <a:lstStyle/>
+          <a:p>
+            <a:pPr algn="ctr"/>
+            <a:r>
+              <a:rPr lang="en-US" dirty="0" smtClean="0"/>
+              <a:t>Measurement types</a:t>
+            </a:r>
+            <a:endParaRPr lang="en-CA" dirty="0"/>
+          </a:p>
+        </p:txBody>
+      </p:sp>
+    </p:spTree>
+    <p:extLst>
+      <p:ext uri="{BB962C8B-B14F-4D97-AF65-F5344CB8AC3E}">
+        <p14:creationId xmlns:p14="http://schemas.microsoft.com/office/powerpoint/2010/main" val="157938821"/>
+      </p:ext>
+    </p:extLst>
+  </p:cSld>
+  <p:clrMapOvr>
+    <a:masterClrMapping/>
+  </p:clrMapOvr>
+</p:sld>
+</file>
+
 <file path=ppt/theme/theme1.xml><?xml version="1.0" encoding="utf-8"?>
 <a:theme xmlns:a="http://schemas.openxmlformats.org/drawingml/2006/main" name="Office Theme">
   <a:themeElements>

</xml_diff>

<commit_message>
CISC 848 Implementation Report - pdf saved and ready for delivery
</commit_message>
<xml_diff>
--- a/CISC870/Paper/FigureCreation.pptx
+++ b/CISC870/Paper/FigureCreation.pptx
@@ -7,7 +7,8 @@
   <p:sldIdLst>
     <p:sldId id="256" r:id="rId2"/>
     <p:sldId id="257" r:id="rId3"/>
-    <p:sldId id="258" r:id="rId4"/>
+    <p:sldId id="259" r:id="rId4"/>
+    <p:sldId id="258" r:id="rId5"/>
   </p:sldIdLst>
   <p:sldSz cx="12192000" cy="6858000"/>
   <p:notesSz cx="6858000" cy="9144000"/>
@@ -3265,7 +3266,7 @@
           <a:p>
             <a:fld id="{E3F1F95A-29A3-4187-BF3A-74A3882354E7}" type="datetimeFigureOut">
               <a:rPr lang="en-US" smtClean="0"/>
-              <a:t>3/30/2017</a:t>
+              <a:t>4/9/2017</a:t>
             </a:fld>
             <a:endParaRPr lang="en-US"/>
           </a:p>
@@ -3435,7 +3436,7 @@
           <a:p>
             <a:fld id="{E3F1F95A-29A3-4187-BF3A-74A3882354E7}" type="datetimeFigureOut">
               <a:rPr lang="en-US" smtClean="0"/>
-              <a:t>3/30/2017</a:t>
+              <a:t>4/9/2017</a:t>
             </a:fld>
             <a:endParaRPr lang="en-US"/>
           </a:p>
@@ -3615,7 +3616,7 @@
           <a:p>
             <a:fld id="{E3F1F95A-29A3-4187-BF3A-74A3882354E7}" type="datetimeFigureOut">
               <a:rPr lang="en-US" smtClean="0"/>
-              <a:t>3/30/2017</a:t>
+              <a:t>4/9/2017</a:t>
             </a:fld>
             <a:endParaRPr lang="en-US"/>
           </a:p>
@@ -3785,7 +3786,7 @@
           <a:p>
             <a:fld id="{E3F1F95A-29A3-4187-BF3A-74A3882354E7}" type="datetimeFigureOut">
               <a:rPr lang="en-US" smtClean="0"/>
-              <a:t>3/30/2017</a:t>
+              <a:t>4/9/2017</a:t>
             </a:fld>
             <a:endParaRPr lang="en-US"/>
           </a:p>
@@ -4031,7 +4032,7 @@
           <a:p>
             <a:fld id="{E3F1F95A-29A3-4187-BF3A-74A3882354E7}" type="datetimeFigureOut">
               <a:rPr lang="en-US" smtClean="0"/>
-              <a:t>3/30/2017</a:t>
+              <a:t>4/9/2017</a:t>
             </a:fld>
             <a:endParaRPr lang="en-US"/>
           </a:p>
@@ -4263,7 +4264,7 @@
           <a:p>
             <a:fld id="{E3F1F95A-29A3-4187-BF3A-74A3882354E7}" type="datetimeFigureOut">
               <a:rPr lang="en-US" smtClean="0"/>
-              <a:t>3/30/2017</a:t>
+              <a:t>4/9/2017</a:t>
             </a:fld>
             <a:endParaRPr lang="en-US"/>
           </a:p>
@@ -4630,7 +4631,7 @@
           <a:p>
             <a:fld id="{E3F1F95A-29A3-4187-BF3A-74A3882354E7}" type="datetimeFigureOut">
               <a:rPr lang="en-US" smtClean="0"/>
-              <a:t>3/30/2017</a:t>
+              <a:t>4/9/2017</a:t>
             </a:fld>
             <a:endParaRPr lang="en-US"/>
           </a:p>
@@ -4748,7 +4749,7 @@
           <a:p>
             <a:fld id="{E3F1F95A-29A3-4187-BF3A-74A3882354E7}" type="datetimeFigureOut">
               <a:rPr lang="en-US" smtClean="0"/>
-              <a:t>3/30/2017</a:t>
+              <a:t>4/9/2017</a:t>
             </a:fld>
             <a:endParaRPr lang="en-US"/>
           </a:p>
@@ -4843,7 +4844,7 @@
           <a:p>
             <a:fld id="{E3F1F95A-29A3-4187-BF3A-74A3882354E7}" type="datetimeFigureOut">
               <a:rPr lang="en-US" smtClean="0"/>
-              <a:t>3/30/2017</a:t>
+              <a:t>4/9/2017</a:t>
             </a:fld>
             <a:endParaRPr lang="en-US"/>
           </a:p>
@@ -5120,7 +5121,7 @@
           <a:p>
             <a:fld id="{E3F1F95A-29A3-4187-BF3A-74A3882354E7}" type="datetimeFigureOut">
               <a:rPr lang="en-US" smtClean="0"/>
-              <a:t>3/30/2017</a:t>
+              <a:t>4/9/2017</a:t>
             </a:fld>
             <a:endParaRPr lang="en-US"/>
           </a:p>
@@ -5373,7 +5374,7 @@
           <a:p>
             <a:fld id="{E3F1F95A-29A3-4187-BF3A-74A3882354E7}" type="datetimeFigureOut">
               <a:rPr lang="en-US" smtClean="0"/>
-              <a:t>3/30/2017</a:t>
+              <a:t>4/9/2017</a:t>
             </a:fld>
             <a:endParaRPr lang="en-US"/>
           </a:p>
@@ -5586,7 +5587,7 @@
           <a:p>
             <a:fld id="{E3F1F95A-29A3-4187-BF3A-74A3882354E7}" type="datetimeFigureOut">
               <a:rPr lang="en-US" smtClean="0"/>
-              <a:t>3/30/2017</a:t>
+              <a:t>4/9/2017</a:t>
             </a:fld>
             <a:endParaRPr lang="en-US"/>
           </a:p>
@@ -6225,7 +6226,7 @@
       </p:grpSpPr>
       <p:grpSp>
         <p:nvGrpSpPr>
-          <p:cNvPr id="26" name="Group 25"/>
+          <p:cNvPr id="28" name="Group 27"/>
           <p:cNvGrpSpPr/>
           <p:nvPr/>
         </p:nvGrpSpPr>
@@ -6322,8 +6323,8 @@
           </p:nvSpPr>
           <p:spPr>
             <a:xfrm>
-              <a:off x="6932023" y="1698171"/>
-              <a:ext cx="2368728" cy="4659086"/>
+              <a:off x="6932022" y="1698171"/>
+              <a:ext cx="2481943" cy="4659086"/>
             </a:xfrm>
             <a:prstGeom prst="roundRect">
               <a:avLst/>
@@ -6522,7 +6523,7 @@
           </p:nvSpPr>
           <p:spPr>
             <a:xfrm>
-              <a:off x="7049587" y="1677028"/>
+              <a:off x="7104284" y="1709539"/>
               <a:ext cx="2133599" cy="584775"/>
             </a:xfrm>
             <a:prstGeom prst="rect">
@@ -6547,16 +6548,16 @@
         </p:sp>
         <p:grpSp>
           <p:nvGrpSpPr>
-            <p:cNvPr id="13" name="Group 12"/>
+            <p:cNvPr id="27" name="Group 26"/>
             <p:cNvGrpSpPr/>
             <p:nvPr/>
           </p:nvGrpSpPr>
           <p:grpSpPr>
             <a:xfrm>
-              <a:off x="2016033" y="2544905"/>
-              <a:ext cx="2133599" cy="860146"/>
-              <a:chOff x="2016033" y="2544905"/>
-              <a:chExt cx="2133599" cy="860146"/>
+              <a:off x="2016033" y="2544904"/>
+              <a:ext cx="2133599" cy="3699141"/>
+              <a:chOff x="2016033" y="2544904"/>
+              <a:chExt cx="2133599" cy="3699141"/>
             </a:xfrm>
           </p:grpSpPr>
           <p:sp>
@@ -6567,8 +6568,8 @@
             </p:nvSpPr>
             <p:spPr>
               <a:xfrm>
-                <a:off x="2016033" y="2544905"/>
-                <a:ext cx="2063934" cy="860146"/>
+                <a:off x="2016033" y="2544904"/>
+                <a:ext cx="2063934" cy="3699141"/>
               </a:xfrm>
               <a:prstGeom prst="roundRect">
                 <a:avLst/>
@@ -6613,7 +6614,7 @@
             </p:nvSpPr>
             <p:spPr>
               <a:xfrm>
-                <a:off x="2016033" y="2544905"/>
+                <a:off x="2016033" y="2544904"/>
                 <a:ext cx="2133599" cy="830997"/>
               </a:xfrm>
               <a:prstGeom prst="rect">
@@ -6629,7 +6630,7 @@
               <a:p>
                 <a:pPr algn="ctr"/>
                 <a:r>
-                  <a:rPr lang="en-US" sz="2400" dirty="0" smtClean="0"/>
+                  <a:rPr lang="en-US" sz="2400" dirty="0"/>
                   <a:t>Measurement type</a:t>
                 </a:r>
                 <a:endParaRPr lang="en-CA" sz="2400" dirty="0"/>
@@ -6645,10 +6646,10 @@
           </p:nvGrpSpPr>
           <p:grpSpPr>
             <a:xfrm>
-              <a:off x="4438109" y="2410693"/>
-              <a:ext cx="2279463" cy="3740726"/>
-              <a:chOff x="1938748" y="2512682"/>
-              <a:chExt cx="2279463" cy="1088396"/>
+              <a:off x="4438107" y="2376816"/>
+              <a:ext cx="2279463" cy="3774604"/>
+              <a:chOff x="1938746" y="2502825"/>
+              <a:chExt cx="2279463" cy="1098253"/>
             </a:xfrm>
           </p:grpSpPr>
           <p:sp>
@@ -6705,7 +6706,7 @@
             </p:nvSpPr>
             <p:spPr>
               <a:xfrm>
-                <a:off x="1938748" y="2531741"/>
+                <a:off x="1938746" y="2502825"/>
                 <a:ext cx="2279463" cy="241786"/>
               </a:xfrm>
               <a:prstGeom prst="rect">
@@ -6722,7 +6723,7 @@
                 <a:pPr algn="ctr"/>
                 <a:r>
                   <a:rPr lang="en-US" sz="2400" dirty="0" smtClean="0"/>
-                  <a:t>Model from features method</a:t>
+                  <a:t>Features to model method</a:t>
                 </a:r>
                 <a:endParaRPr lang="en-CA" sz="2400" dirty="0"/>
               </a:p>
@@ -6737,10 +6738,10 @@
           </p:nvGrpSpPr>
           <p:grpSpPr>
             <a:xfrm>
-              <a:off x="4511042" y="3695225"/>
-              <a:ext cx="2133599" cy="1641908"/>
-              <a:chOff x="2041073" y="2154024"/>
-              <a:chExt cx="2133599" cy="1641908"/>
+              <a:off x="4511040" y="3207814"/>
+              <a:ext cx="2133599" cy="2879477"/>
+              <a:chOff x="2041071" y="1765994"/>
+              <a:chExt cx="2133599" cy="2780096"/>
             </a:xfrm>
           </p:grpSpPr>
           <p:sp>
@@ -6751,8 +6752,8 @@
             </p:nvSpPr>
             <p:spPr>
               <a:xfrm>
-                <a:off x="2114924" y="2154024"/>
-                <a:ext cx="1994600" cy="1641908"/>
+                <a:off x="2114924" y="1765994"/>
+                <a:ext cx="1994600" cy="2780096"/>
               </a:xfrm>
               <a:prstGeom prst="roundRect">
                 <a:avLst/>
@@ -6797,8 +6798,8 @@
             </p:nvSpPr>
             <p:spPr>
               <a:xfrm>
-                <a:off x="2041073" y="2208962"/>
-                <a:ext cx="2133599" cy="1569660"/>
+                <a:off x="2041071" y="1765994"/>
+                <a:ext cx="2133599" cy="1200329"/>
               </a:xfrm>
               <a:prstGeom prst="rect">
                 <a:avLst/>
@@ -6814,7 +6815,7 @@
                 <a:pPr algn="ctr"/>
                 <a:r>
                   <a:rPr lang="en-US" sz="2400" dirty="0" smtClean="0"/>
-                  <a:t>Environmental features from measurements method</a:t>
+                  <a:t>Measurement to features method</a:t>
                 </a:r>
                 <a:endParaRPr lang="en-CA" sz="2400" dirty="0"/>
               </a:p>
@@ -6823,16 +6824,16 @@
         </p:grpSp>
         <p:grpSp>
           <p:nvGrpSpPr>
-            <p:cNvPr id="20" name="Group 19"/>
+            <p:cNvPr id="7" name="Group 6"/>
             <p:cNvGrpSpPr/>
             <p:nvPr/>
           </p:nvGrpSpPr>
           <p:grpSpPr>
             <a:xfrm>
-              <a:off x="7049051" y="3788269"/>
-              <a:ext cx="2133599" cy="1200329"/>
-              <a:chOff x="2041073" y="2393627"/>
-              <a:chExt cx="2133599" cy="1200329"/>
+              <a:off x="7138578" y="3307195"/>
+              <a:ext cx="2065013" cy="2727845"/>
+              <a:chOff x="7138578" y="3456446"/>
+              <a:chExt cx="2065013" cy="2578594"/>
             </a:xfrm>
           </p:grpSpPr>
           <p:sp>
@@ -6843,8 +6844,8 @@
             </p:nvSpPr>
             <p:spPr>
               <a:xfrm>
-                <a:off x="2220545" y="2393627"/>
-                <a:ext cx="1783358" cy="1162702"/>
+                <a:off x="7138578" y="3456446"/>
+                <a:ext cx="2065013" cy="2578594"/>
               </a:xfrm>
               <a:prstGeom prst="roundRect">
                 <a:avLst/>
@@ -6889,8 +6890,8 @@
             </p:nvSpPr>
             <p:spPr>
               <a:xfrm>
-                <a:off x="2041073" y="2393627"/>
-                <a:ext cx="2133599" cy="1200329"/>
+                <a:off x="7138578" y="3456446"/>
+                <a:ext cx="2049824" cy="1134654"/>
               </a:xfrm>
               <a:prstGeom prst="rect">
                 <a:avLst/>
@@ -6906,7 +6907,7 @@
                 <a:pPr algn="ctr"/>
                 <a:r>
                   <a:rPr lang="en-US" sz="2400" dirty="0" smtClean="0"/>
-                  <a:t>Behaviors to implement functionality</a:t>
+                  <a:t>Behaviors implementing functionality</a:t>
                 </a:r>
                 <a:endParaRPr lang="en-CA" sz="2400" dirty="0"/>
               </a:p>
@@ -6921,9 +6922,9 @@
           </p:nvGrpSpPr>
           <p:grpSpPr>
             <a:xfrm>
-              <a:off x="6949424" y="2410692"/>
+              <a:off x="7003015" y="2410692"/>
               <a:ext cx="2351328" cy="3740726"/>
-              <a:chOff x="1940912" y="1843918"/>
+              <a:chOff x="1994503" y="1843918"/>
               <a:chExt cx="2351328" cy="3740726"/>
             </a:xfrm>
           </p:grpSpPr>
@@ -6935,8 +6936,8 @@
             </p:nvSpPr>
             <p:spPr>
               <a:xfrm>
-                <a:off x="2098767" y="1843918"/>
-                <a:ext cx="2026914" cy="3740726"/>
+                <a:off x="2032908" y="1843918"/>
+                <a:ext cx="2259331" cy="3740726"/>
               </a:xfrm>
               <a:prstGeom prst="roundRect">
                 <a:avLst/>
@@ -6981,8 +6982,8 @@
             </p:nvSpPr>
             <p:spPr>
               <a:xfrm>
-                <a:off x="1940912" y="1890970"/>
-                <a:ext cx="2351328" cy="1200329"/>
+                <a:off x="1994503" y="1887079"/>
+                <a:ext cx="2351328" cy="830997"/>
               </a:xfrm>
               <a:prstGeom prst="rect">
                 <a:avLst/>
@@ -6998,7 +6999,7 @@
                 <a:pPr algn="ctr"/>
                 <a:r>
                   <a:rPr lang="en-US" sz="2400" dirty="0" smtClean="0"/>
-                  <a:t>Behavior arbitration from model method</a:t>
+                  <a:t>Model to behavior control</a:t>
                 </a:r>
                 <a:endParaRPr lang="en-CA" sz="2400" dirty="0"/>
               </a:p>
@@ -7020,6 +7021,964 @@
 </file>
 
 <file path=ppt/slides/slide3.xml><?xml version="1.0" encoding="utf-8"?>
+<p:sld xmlns:a="http://schemas.openxmlformats.org/drawingml/2006/main" xmlns:r="http://schemas.openxmlformats.org/officeDocument/2006/relationships" xmlns:p="http://schemas.openxmlformats.org/presentationml/2006/main">
+  <p:cSld>
+    <p:spTree>
+      <p:nvGrpSpPr>
+        <p:cNvPr id="1" name=""/>
+        <p:cNvGrpSpPr/>
+        <p:nvPr/>
+      </p:nvGrpSpPr>
+      <p:grpSpPr>
+        <a:xfrm>
+          <a:off x="0" y="0"/>
+          <a:ext cx="0" cy="0"/>
+          <a:chOff x="0" y="0"/>
+          <a:chExt cx="0" cy="0"/>
+        </a:xfrm>
+      </p:grpSpPr>
+      <p:sp>
+        <p:nvSpPr>
+          <p:cNvPr id="3" name="Rounded Rectangle 2"/>
+          <p:cNvSpPr/>
+          <p:nvPr/>
+        </p:nvSpPr>
+        <p:spPr>
+          <a:xfrm>
+            <a:off x="1497875" y="804870"/>
+            <a:ext cx="8168640" cy="5839769"/>
+          </a:xfrm>
+          <a:prstGeom prst="roundRect">
+            <a:avLst/>
+          </a:prstGeom>
+          <a:noFill/>
+          <a:ln w="76200">
+            <a:solidFill>
+              <a:schemeClr val="tx1"/>
+            </a:solidFill>
+          </a:ln>
+        </p:spPr>
+        <p:style>
+          <a:lnRef idx="2">
+            <a:schemeClr val="accent1">
+              <a:shade val="50000"/>
+            </a:schemeClr>
+          </a:lnRef>
+          <a:fillRef idx="1">
+            <a:schemeClr val="accent1"/>
+          </a:fillRef>
+          <a:effectRef idx="0">
+            <a:schemeClr val="accent1"/>
+          </a:effectRef>
+          <a:fontRef idx="minor">
+            <a:schemeClr val="lt1"/>
+          </a:fontRef>
+        </p:style>
+        <p:txBody>
+          <a:bodyPr rtlCol="0" anchor="ctr"/>
+          <a:lstStyle/>
+          <a:p>
+            <a:pPr algn="ctr"/>
+            <a:endParaRPr lang="en-CA"/>
+          </a:p>
+        </p:txBody>
+      </p:sp>
+      <p:sp>
+        <p:nvSpPr>
+          <p:cNvPr id="4" name="TextBox 3"/>
+          <p:cNvSpPr txBox="1"/>
+          <p:nvPr/>
+        </p:nvSpPr>
+        <p:spPr>
+          <a:xfrm>
+            <a:off x="3270068" y="889367"/>
+            <a:ext cx="4615544" cy="646331"/>
+          </a:xfrm>
+          <a:prstGeom prst="rect">
+            <a:avLst/>
+          </a:prstGeom>
+          <a:noFill/>
+        </p:spPr>
+        <p:txBody>
+          <a:bodyPr wrap="square" rtlCol="0" anchor="ctr">
+            <a:spAutoFit/>
+          </a:bodyPr>
+          <a:lstStyle/>
+          <a:p>
+            <a:pPr algn="ctr"/>
+            <a:r>
+              <a:rPr lang="en-US" sz="3600" dirty="0" smtClean="0"/>
+              <a:t>Overall functionality</a:t>
+            </a:r>
+            <a:endParaRPr lang="en-CA" sz="3600" dirty="0"/>
+          </a:p>
+        </p:txBody>
+      </p:sp>
+      <p:sp>
+        <p:nvSpPr>
+          <p:cNvPr id="5" name="Rounded Rectangle 4"/>
+          <p:cNvSpPr/>
+          <p:nvPr/>
+        </p:nvSpPr>
+        <p:spPr>
+          <a:xfrm>
+            <a:off x="6932022" y="1698171"/>
+            <a:ext cx="2481943" cy="4659086"/>
+          </a:xfrm>
+          <a:prstGeom prst="roundRect">
+            <a:avLst/>
+          </a:prstGeom>
+          <a:noFill/>
+          <a:ln w="76200">
+            <a:solidFill>
+              <a:schemeClr val="tx1"/>
+            </a:solidFill>
+          </a:ln>
+        </p:spPr>
+        <p:style>
+          <a:lnRef idx="2">
+            <a:schemeClr val="accent1">
+              <a:shade val="50000"/>
+            </a:schemeClr>
+          </a:lnRef>
+          <a:fillRef idx="1">
+            <a:schemeClr val="accent1"/>
+          </a:fillRef>
+          <a:effectRef idx="0">
+            <a:schemeClr val="accent1"/>
+          </a:effectRef>
+          <a:fontRef idx="minor">
+            <a:schemeClr val="lt1"/>
+          </a:fontRef>
+        </p:style>
+        <p:txBody>
+          <a:bodyPr rtlCol="0" anchor="ctr"/>
+          <a:lstStyle/>
+          <a:p>
+            <a:pPr algn="ctr"/>
+            <a:endParaRPr lang="en-CA"/>
+          </a:p>
+        </p:txBody>
+      </p:sp>
+      <p:sp>
+        <p:nvSpPr>
+          <p:cNvPr id="6" name="Rounded Rectangle 5"/>
+          <p:cNvSpPr/>
+          <p:nvPr/>
+        </p:nvSpPr>
+        <p:spPr>
+          <a:xfrm>
+            <a:off x="4397830" y="1698171"/>
+            <a:ext cx="2368728" cy="4659086"/>
+          </a:xfrm>
+          <a:prstGeom prst="roundRect">
+            <a:avLst/>
+          </a:prstGeom>
+          <a:noFill/>
+          <a:ln w="76200">
+            <a:solidFill>
+              <a:schemeClr val="tx1"/>
+            </a:solidFill>
+          </a:ln>
+        </p:spPr>
+        <p:style>
+          <a:lnRef idx="2">
+            <a:schemeClr val="accent1">
+              <a:shade val="50000"/>
+            </a:schemeClr>
+          </a:lnRef>
+          <a:fillRef idx="1">
+            <a:schemeClr val="accent1"/>
+          </a:fillRef>
+          <a:effectRef idx="0">
+            <a:schemeClr val="accent1"/>
+          </a:effectRef>
+          <a:fontRef idx="minor">
+            <a:schemeClr val="lt1"/>
+          </a:fontRef>
+        </p:style>
+        <p:txBody>
+          <a:bodyPr rtlCol="0" anchor="ctr"/>
+          <a:lstStyle/>
+          <a:p>
+            <a:pPr algn="ctr"/>
+            <a:endParaRPr lang="en-CA"/>
+          </a:p>
+        </p:txBody>
+      </p:sp>
+      <p:sp>
+        <p:nvSpPr>
+          <p:cNvPr id="7" name="Rounded Rectangle 6"/>
+          <p:cNvSpPr/>
+          <p:nvPr/>
+        </p:nvSpPr>
+        <p:spPr>
+          <a:xfrm>
+            <a:off x="1863637" y="1698171"/>
+            <a:ext cx="2368728" cy="2072640"/>
+          </a:xfrm>
+          <a:prstGeom prst="roundRect">
+            <a:avLst/>
+          </a:prstGeom>
+          <a:noFill/>
+          <a:ln w="76200">
+            <a:solidFill>
+              <a:schemeClr val="tx1"/>
+            </a:solidFill>
+          </a:ln>
+        </p:spPr>
+        <p:style>
+          <a:lnRef idx="2">
+            <a:schemeClr val="accent1">
+              <a:shade val="50000"/>
+            </a:schemeClr>
+          </a:lnRef>
+          <a:fillRef idx="1">
+            <a:schemeClr val="accent1"/>
+          </a:fillRef>
+          <a:effectRef idx="0">
+            <a:schemeClr val="accent1"/>
+          </a:effectRef>
+          <a:fontRef idx="minor">
+            <a:schemeClr val="lt1"/>
+          </a:fontRef>
+        </p:style>
+        <p:txBody>
+          <a:bodyPr rtlCol="0" anchor="ctr"/>
+          <a:lstStyle/>
+          <a:p>
+            <a:pPr algn="ctr"/>
+            <a:endParaRPr lang="en-CA"/>
+          </a:p>
+        </p:txBody>
+      </p:sp>
+      <p:sp>
+        <p:nvSpPr>
+          <p:cNvPr id="8" name="TextBox 7"/>
+          <p:cNvSpPr txBox="1"/>
+          <p:nvPr/>
+        </p:nvSpPr>
+        <p:spPr>
+          <a:xfrm>
+            <a:off x="1981201" y="1677029"/>
+            <a:ext cx="2133599" cy="584775"/>
+          </a:xfrm>
+          <a:prstGeom prst="rect">
+            <a:avLst/>
+          </a:prstGeom>
+          <a:noFill/>
+        </p:spPr>
+        <p:txBody>
+          <a:bodyPr wrap="square" rtlCol="0" anchor="ctr">
+            <a:spAutoFit/>
+          </a:bodyPr>
+          <a:lstStyle/>
+          <a:p>
+            <a:pPr algn="ctr"/>
+            <a:r>
+              <a:rPr lang="en-US" sz="3200" dirty="0" smtClean="0"/>
+              <a:t>Perception</a:t>
+            </a:r>
+            <a:endParaRPr lang="en-CA" sz="3200" dirty="0"/>
+          </a:p>
+        </p:txBody>
+      </p:sp>
+      <p:sp>
+        <p:nvSpPr>
+          <p:cNvPr id="9" name="TextBox 8"/>
+          <p:cNvSpPr txBox="1"/>
+          <p:nvPr/>
+        </p:nvSpPr>
+        <p:spPr>
+          <a:xfrm>
+            <a:off x="4574177" y="1698171"/>
+            <a:ext cx="2133599" cy="584775"/>
+          </a:xfrm>
+          <a:prstGeom prst="rect">
+            <a:avLst/>
+          </a:prstGeom>
+          <a:noFill/>
+        </p:spPr>
+        <p:txBody>
+          <a:bodyPr wrap="square" rtlCol="0" anchor="ctr">
+            <a:spAutoFit/>
+          </a:bodyPr>
+          <a:lstStyle/>
+          <a:p>
+            <a:pPr algn="ctr"/>
+            <a:r>
+              <a:rPr lang="en-US" sz="3200" dirty="0" smtClean="0"/>
+              <a:t>Modelling</a:t>
+            </a:r>
+            <a:endParaRPr lang="en-CA" sz="3200" dirty="0"/>
+          </a:p>
+        </p:txBody>
+      </p:sp>
+      <p:sp>
+        <p:nvSpPr>
+          <p:cNvPr id="10" name="TextBox 9"/>
+          <p:cNvSpPr txBox="1"/>
+          <p:nvPr/>
+        </p:nvSpPr>
+        <p:spPr>
+          <a:xfrm>
+            <a:off x="7104284" y="1709539"/>
+            <a:ext cx="2133599" cy="584775"/>
+          </a:xfrm>
+          <a:prstGeom prst="rect">
+            <a:avLst/>
+          </a:prstGeom>
+          <a:noFill/>
+        </p:spPr>
+        <p:txBody>
+          <a:bodyPr wrap="square" rtlCol="0" anchor="ctr">
+            <a:spAutoFit/>
+          </a:bodyPr>
+          <a:lstStyle/>
+          <a:p>
+            <a:pPr algn="ctr"/>
+            <a:r>
+              <a:rPr lang="en-US" sz="3200" dirty="0" smtClean="0"/>
+              <a:t>Behavior</a:t>
+            </a:r>
+            <a:endParaRPr lang="en-CA" sz="3200" dirty="0"/>
+          </a:p>
+        </p:txBody>
+      </p:sp>
+      <p:grpSp>
+        <p:nvGrpSpPr>
+          <p:cNvPr id="11" name="Group 10"/>
+          <p:cNvGrpSpPr/>
+          <p:nvPr/>
+        </p:nvGrpSpPr>
+        <p:grpSpPr>
+          <a:xfrm>
+            <a:off x="2016033" y="2544904"/>
+            <a:ext cx="2133599" cy="903691"/>
+            <a:chOff x="2016033" y="2544904"/>
+            <a:chExt cx="2133599" cy="903691"/>
+          </a:xfrm>
+        </p:grpSpPr>
+        <p:sp>
+          <p:nvSpPr>
+            <p:cNvPr id="24" name="Rounded Rectangle 23"/>
+            <p:cNvSpPr/>
+            <p:nvPr/>
+          </p:nvSpPr>
+          <p:spPr>
+            <a:xfrm>
+              <a:off x="2016033" y="2544905"/>
+              <a:ext cx="2063934" cy="903690"/>
+            </a:xfrm>
+            <a:prstGeom prst="roundRect">
+              <a:avLst/>
+            </a:prstGeom>
+            <a:noFill/>
+            <a:ln w="38100">
+              <a:solidFill>
+                <a:schemeClr val="tx1"/>
+              </a:solidFill>
+            </a:ln>
+          </p:spPr>
+          <p:style>
+            <a:lnRef idx="2">
+              <a:schemeClr val="accent1">
+                <a:shade val="50000"/>
+              </a:schemeClr>
+            </a:lnRef>
+            <a:fillRef idx="1">
+              <a:schemeClr val="accent1"/>
+            </a:fillRef>
+            <a:effectRef idx="0">
+              <a:schemeClr val="accent1"/>
+            </a:effectRef>
+            <a:fontRef idx="minor">
+              <a:schemeClr val="lt1"/>
+            </a:fontRef>
+          </p:style>
+          <p:txBody>
+            <a:bodyPr rtlCol="0" anchor="ctr"/>
+            <a:lstStyle/>
+            <a:p>
+              <a:pPr algn="ctr"/>
+              <a:endParaRPr lang="en-CA" dirty="0"/>
+            </a:p>
+          </p:txBody>
+        </p:sp>
+        <p:sp>
+          <p:nvSpPr>
+            <p:cNvPr id="25" name="TextBox 24"/>
+            <p:cNvSpPr txBox="1"/>
+            <p:nvPr/>
+          </p:nvSpPr>
+          <p:spPr>
+            <a:xfrm>
+              <a:off x="2016033" y="2544904"/>
+              <a:ext cx="2133599" cy="830997"/>
+            </a:xfrm>
+            <a:prstGeom prst="rect">
+              <a:avLst/>
+            </a:prstGeom>
+            <a:noFill/>
+          </p:spPr>
+          <p:txBody>
+            <a:bodyPr wrap="square" rtlCol="0" anchor="ctr">
+              <a:spAutoFit/>
+            </a:bodyPr>
+            <a:lstStyle/>
+            <a:p>
+              <a:pPr algn="ctr"/>
+              <a:r>
+                <a:rPr lang="en-US" sz="2400" dirty="0"/>
+                <a:t>Measurement type</a:t>
+              </a:r>
+              <a:endParaRPr lang="en-CA" sz="2400" dirty="0"/>
+            </a:p>
+          </p:txBody>
+        </p:sp>
+      </p:grpSp>
+      <p:grpSp>
+        <p:nvGrpSpPr>
+          <p:cNvPr id="12" name="Group 11"/>
+          <p:cNvGrpSpPr/>
+          <p:nvPr/>
+        </p:nvGrpSpPr>
+        <p:grpSpPr>
+          <a:xfrm>
+            <a:off x="4428313" y="2390775"/>
+            <a:ext cx="2279463" cy="894075"/>
+            <a:chOff x="1928952" y="2512682"/>
+            <a:chExt cx="2279463" cy="631384"/>
+          </a:xfrm>
+        </p:grpSpPr>
+        <p:sp>
+          <p:nvSpPr>
+            <p:cNvPr id="22" name="Rounded Rectangle 21"/>
+            <p:cNvSpPr/>
+            <p:nvPr/>
+          </p:nvSpPr>
+          <p:spPr>
+            <a:xfrm>
+              <a:off x="2020388" y="2512682"/>
+              <a:ext cx="2124892" cy="631384"/>
+            </a:xfrm>
+            <a:prstGeom prst="roundRect">
+              <a:avLst/>
+            </a:prstGeom>
+            <a:noFill/>
+            <a:ln w="38100">
+              <a:solidFill>
+                <a:schemeClr val="tx1"/>
+              </a:solidFill>
+            </a:ln>
+          </p:spPr>
+          <p:style>
+            <a:lnRef idx="2">
+              <a:schemeClr val="accent1">
+                <a:shade val="50000"/>
+              </a:schemeClr>
+            </a:lnRef>
+            <a:fillRef idx="1">
+              <a:schemeClr val="accent1"/>
+            </a:fillRef>
+            <a:effectRef idx="0">
+              <a:schemeClr val="accent1"/>
+            </a:effectRef>
+            <a:fontRef idx="minor">
+              <a:schemeClr val="lt1"/>
+            </a:fontRef>
+          </p:style>
+          <p:txBody>
+            <a:bodyPr rtlCol="0" anchor="ctr"/>
+            <a:lstStyle/>
+            <a:p>
+              <a:pPr algn="ctr"/>
+              <a:endParaRPr lang="en-CA" dirty="0"/>
+            </a:p>
+          </p:txBody>
+        </p:sp>
+        <p:sp>
+          <p:nvSpPr>
+            <p:cNvPr id="23" name="TextBox 22"/>
+            <p:cNvSpPr txBox="1"/>
+            <p:nvPr/>
+          </p:nvSpPr>
+          <p:spPr>
+            <a:xfrm>
+              <a:off x="1928952" y="2673159"/>
+              <a:ext cx="2279463" cy="241786"/>
+            </a:xfrm>
+            <a:prstGeom prst="rect">
+              <a:avLst/>
+            </a:prstGeom>
+            <a:noFill/>
+          </p:spPr>
+          <p:txBody>
+            <a:bodyPr wrap="square" rtlCol="0" anchor="ctr">
+              <a:spAutoFit/>
+            </a:bodyPr>
+            <a:lstStyle/>
+            <a:p>
+              <a:pPr algn="ctr"/>
+              <a:r>
+                <a:rPr lang="en-US" sz="2400" dirty="0" smtClean="0"/>
+                <a:t>Features to model method</a:t>
+              </a:r>
+              <a:endParaRPr lang="en-CA" sz="2400" dirty="0"/>
+            </a:p>
+          </p:txBody>
+        </p:sp>
+      </p:grpSp>
+      <p:grpSp>
+        <p:nvGrpSpPr>
+          <p:cNvPr id="13" name="Group 12"/>
+          <p:cNvGrpSpPr/>
+          <p:nvPr/>
+        </p:nvGrpSpPr>
+        <p:grpSpPr>
+          <a:xfrm>
+            <a:off x="4501244" y="4531792"/>
+            <a:ext cx="2133599" cy="1252920"/>
+            <a:chOff x="1968138" y="3606408"/>
+            <a:chExt cx="2133599" cy="1209677"/>
+          </a:xfrm>
+        </p:grpSpPr>
+        <p:sp>
+          <p:nvSpPr>
+            <p:cNvPr id="20" name="Rounded Rectangle 19"/>
+            <p:cNvSpPr/>
+            <p:nvPr/>
+          </p:nvSpPr>
+          <p:spPr>
+            <a:xfrm>
+              <a:off x="2037637" y="3615756"/>
+              <a:ext cx="1994600" cy="1200329"/>
+            </a:xfrm>
+            <a:prstGeom prst="roundRect">
+              <a:avLst/>
+            </a:prstGeom>
+            <a:noFill/>
+            <a:ln w="38100">
+              <a:solidFill>
+                <a:schemeClr val="tx1"/>
+              </a:solidFill>
+            </a:ln>
+          </p:spPr>
+          <p:style>
+            <a:lnRef idx="2">
+              <a:schemeClr val="accent1">
+                <a:shade val="50000"/>
+              </a:schemeClr>
+            </a:lnRef>
+            <a:fillRef idx="1">
+              <a:schemeClr val="accent1"/>
+            </a:fillRef>
+            <a:effectRef idx="0">
+              <a:schemeClr val="accent1"/>
+            </a:effectRef>
+            <a:fontRef idx="minor">
+              <a:schemeClr val="lt1"/>
+            </a:fontRef>
+          </p:style>
+          <p:txBody>
+            <a:bodyPr rtlCol="0" anchor="ctr"/>
+            <a:lstStyle/>
+            <a:p>
+              <a:pPr algn="ctr"/>
+              <a:endParaRPr lang="en-CA" dirty="0"/>
+            </a:p>
+          </p:txBody>
+        </p:sp>
+        <p:sp>
+          <p:nvSpPr>
+            <p:cNvPr id="21" name="TextBox 20"/>
+            <p:cNvSpPr txBox="1"/>
+            <p:nvPr/>
+          </p:nvSpPr>
+          <p:spPr>
+            <a:xfrm>
+              <a:off x="1968138" y="3606408"/>
+              <a:ext cx="2133599" cy="1200329"/>
+            </a:xfrm>
+            <a:prstGeom prst="rect">
+              <a:avLst/>
+            </a:prstGeom>
+            <a:noFill/>
+          </p:spPr>
+          <p:txBody>
+            <a:bodyPr wrap="square" rtlCol="0" anchor="ctr">
+              <a:spAutoFit/>
+            </a:bodyPr>
+            <a:lstStyle/>
+            <a:p>
+              <a:pPr algn="ctr"/>
+              <a:r>
+                <a:rPr lang="en-US" sz="2400" dirty="0" smtClean="0"/>
+                <a:t>Measurement to features method</a:t>
+              </a:r>
+              <a:endParaRPr lang="en-CA" sz="2400" dirty="0"/>
+            </a:p>
+          </p:txBody>
+        </p:sp>
+      </p:grpSp>
+      <p:grpSp>
+        <p:nvGrpSpPr>
+          <p:cNvPr id="14" name="Group 13"/>
+          <p:cNvGrpSpPr/>
+          <p:nvPr/>
+        </p:nvGrpSpPr>
+        <p:grpSpPr>
+          <a:xfrm>
+            <a:off x="7138576" y="4716895"/>
+            <a:ext cx="2065013" cy="1200329"/>
+            <a:chOff x="7138578" y="3456446"/>
+            <a:chExt cx="2065013" cy="1134654"/>
+          </a:xfrm>
+        </p:grpSpPr>
+        <p:sp>
+          <p:nvSpPr>
+            <p:cNvPr id="18" name="Rounded Rectangle 17"/>
+            <p:cNvSpPr/>
+            <p:nvPr/>
+          </p:nvSpPr>
+          <p:spPr>
+            <a:xfrm>
+              <a:off x="7138578" y="3456446"/>
+              <a:ext cx="2065013" cy="1134654"/>
+            </a:xfrm>
+            <a:prstGeom prst="roundRect">
+              <a:avLst/>
+            </a:prstGeom>
+            <a:noFill/>
+            <a:ln w="38100">
+              <a:solidFill>
+                <a:schemeClr val="tx1"/>
+              </a:solidFill>
+            </a:ln>
+          </p:spPr>
+          <p:style>
+            <a:lnRef idx="2">
+              <a:schemeClr val="accent1">
+                <a:shade val="50000"/>
+              </a:schemeClr>
+            </a:lnRef>
+            <a:fillRef idx="1">
+              <a:schemeClr val="accent1"/>
+            </a:fillRef>
+            <a:effectRef idx="0">
+              <a:schemeClr val="accent1"/>
+            </a:effectRef>
+            <a:fontRef idx="minor">
+              <a:schemeClr val="lt1"/>
+            </a:fontRef>
+          </p:style>
+          <p:txBody>
+            <a:bodyPr rtlCol="0" anchor="ctr"/>
+            <a:lstStyle/>
+            <a:p>
+              <a:pPr algn="ctr"/>
+              <a:endParaRPr lang="en-CA" dirty="0"/>
+            </a:p>
+          </p:txBody>
+        </p:sp>
+        <p:sp>
+          <p:nvSpPr>
+            <p:cNvPr id="19" name="TextBox 18"/>
+            <p:cNvSpPr txBox="1"/>
+            <p:nvPr/>
+          </p:nvSpPr>
+          <p:spPr>
+            <a:xfrm>
+              <a:off x="7138578" y="3456446"/>
+              <a:ext cx="2049824" cy="1134654"/>
+            </a:xfrm>
+            <a:prstGeom prst="rect">
+              <a:avLst/>
+            </a:prstGeom>
+            <a:noFill/>
+          </p:spPr>
+          <p:txBody>
+            <a:bodyPr wrap="square" rtlCol="0" anchor="ctr">
+              <a:spAutoFit/>
+            </a:bodyPr>
+            <a:lstStyle/>
+            <a:p>
+              <a:pPr algn="ctr"/>
+              <a:r>
+                <a:rPr lang="en-US" sz="2400" dirty="0" smtClean="0"/>
+                <a:t>Behaviors implementing functionality</a:t>
+              </a:r>
+              <a:endParaRPr lang="en-CA" sz="2400" dirty="0"/>
+            </a:p>
+          </p:txBody>
+        </p:sp>
+      </p:grpSp>
+      <p:grpSp>
+        <p:nvGrpSpPr>
+          <p:cNvPr id="15" name="Group 14"/>
+          <p:cNvGrpSpPr/>
+          <p:nvPr/>
+        </p:nvGrpSpPr>
+        <p:grpSpPr>
+          <a:xfrm>
+            <a:off x="7012836" y="3023000"/>
+            <a:ext cx="2351328" cy="965209"/>
+            <a:chOff x="1994503" y="1843918"/>
+            <a:chExt cx="2351328" cy="965209"/>
+          </a:xfrm>
+        </p:grpSpPr>
+        <p:sp>
+          <p:nvSpPr>
+            <p:cNvPr id="16" name="Rounded Rectangle 15"/>
+            <p:cNvSpPr/>
+            <p:nvPr/>
+          </p:nvSpPr>
+          <p:spPr>
+            <a:xfrm>
+              <a:off x="2032908" y="1843918"/>
+              <a:ext cx="2259331" cy="965209"/>
+            </a:xfrm>
+            <a:prstGeom prst="roundRect">
+              <a:avLst/>
+            </a:prstGeom>
+            <a:noFill/>
+            <a:ln w="38100">
+              <a:solidFill>
+                <a:schemeClr val="tx1"/>
+              </a:solidFill>
+            </a:ln>
+          </p:spPr>
+          <p:style>
+            <a:lnRef idx="2">
+              <a:schemeClr val="accent1">
+                <a:shade val="50000"/>
+              </a:schemeClr>
+            </a:lnRef>
+            <a:fillRef idx="1">
+              <a:schemeClr val="accent1"/>
+            </a:fillRef>
+            <a:effectRef idx="0">
+              <a:schemeClr val="accent1"/>
+            </a:effectRef>
+            <a:fontRef idx="minor">
+              <a:schemeClr val="lt1"/>
+            </a:fontRef>
+          </p:style>
+          <p:txBody>
+            <a:bodyPr rtlCol="0" anchor="ctr"/>
+            <a:lstStyle/>
+            <a:p>
+              <a:pPr algn="ctr"/>
+              <a:endParaRPr lang="en-CA" dirty="0"/>
+            </a:p>
+          </p:txBody>
+        </p:sp>
+        <p:sp>
+          <p:nvSpPr>
+            <p:cNvPr id="17" name="TextBox 16"/>
+            <p:cNvSpPr txBox="1"/>
+            <p:nvPr/>
+          </p:nvSpPr>
+          <p:spPr>
+            <a:xfrm>
+              <a:off x="1994503" y="1887079"/>
+              <a:ext cx="2351328" cy="830997"/>
+            </a:xfrm>
+            <a:prstGeom prst="rect">
+              <a:avLst/>
+            </a:prstGeom>
+            <a:noFill/>
+          </p:spPr>
+          <p:txBody>
+            <a:bodyPr wrap="square" rtlCol="0" anchor="ctr">
+              <a:spAutoFit/>
+            </a:bodyPr>
+            <a:lstStyle/>
+            <a:p>
+              <a:pPr algn="ctr"/>
+              <a:r>
+                <a:rPr lang="en-US" sz="2400" dirty="0" smtClean="0"/>
+                <a:t>Model to behavior control</a:t>
+              </a:r>
+              <a:endParaRPr lang="en-CA" sz="2400" dirty="0"/>
+            </a:p>
+          </p:txBody>
+        </p:sp>
+      </p:grpSp>
+      <p:sp>
+        <p:nvSpPr>
+          <p:cNvPr id="26" name="Bent-Up Arrow 25"/>
+          <p:cNvSpPr/>
+          <p:nvPr/>
+        </p:nvSpPr>
+        <p:spPr>
+          <a:xfrm rot="5400000">
+            <a:off x="2715809" y="3648885"/>
+            <a:ext cx="2056494" cy="1653371"/>
+          </a:xfrm>
+          <a:prstGeom prst="bentUpArrow">
+            <a:avLst>
+              <a:gd name="adj1" fmla="val 12085"/>
+              <a:gd name="adj2" fmla="val 25000"/>
+              <a:gd name="adj3" fmla="val 21296"/>
+            </a:avLst>
+          </a:prstGeom>
+          <a:solidFill>
+            <a:schemeClr val="tx1"/>
+          </a:solidFill>
+          <a:ln>
+            <a:solidFill>
+              <a:schemeClr val="tx1"/>
+            </a:solidFill>
+          </a:ln>
+        </p:spPr>
+        <p:style>
+          <a:lnRef idx="2">
+            <a:schemeClr val="accent1">
+              <a:shade val="50000"/>
+            </a:schemeClr>
+          </a:lnRef>
+          <a:fillRef idx="1">
+            <a:schemeClr val="accent1"/>
+          </a:fillRef>
+          <a:effectRef idx="0">
+            <a:schemeClr val="accent1"/>
+          </a:effectRef>
+          <a:fontRef idx="minor">
+            <a:schemeClr val="lt1"/>
+          </a:fontRef>
+        </p:style>
+        <p:txBody>
+          <a:bodyPr rtlCol="0" anchor="ctr"/>
+          <a:lstStyle/>
+          <a:p>
+            <a:pPr algn="ctr"/>
+            <a:endParaRPr lang="en-CA"/>
+          </a:p>
+        </p:txBody>
+      </p:sp>
+      <p:sp>
+        <p:nvSpPr>
+          <p:cNvPr id="27" name="TextBox 26"/>
+          <p:cNvSpPr txBox="1"/>
+          <p:nvPr/>
+        </p:nvSpPr>
+        <p:spPr>
+          <a:xfrm>
+            <a:off x="1985265" y="5204624"/>
+            <a:ext cx="2211350" cy="461665"/>
+          </a:xfrm>
+          <a:prstGeom prst="rect">
+            <a:avLst/>
+          </a:prstGeom>
+          <a:noFill/>
+        </p:spPr>
+        <p:txBody>
+          <a:bodyPr wrap="square" rtlCol="0">
+            <a:spAutoFit/>
+          </a:bodyPr>
+          <a:lstStyle/>
+          <a:p>
+            <a:r>
+              <a:rPr lang="en-US" sz="2400" dirty="0" smtClean="0"/>
+              <a:t>Measurements</a:t>
+            </a:r>
+            <a:endParaRPr lang="en-CA" sz="2400" dirty="0"/>
+          </a:p>
+        </p:txBody>
+      </p:sp>
+      <p:sp>
+        <p:nvSpPr>
+          <p:cNvPr id="28" name="Up Arrow 27"/>
+          <p:cNvSpPr/>
+          <p:nvPr/>
+        </p:nvSpPr>
+        <p:spPr>
+          <a:xfrm>
+            <a:off x="6017623" y="3284850"/>
+            <a:ext cx="348343" cy="1246942"/>
+          </a:xfrm>
+          <a:prstGeom prst="upArrow">
+            <a:avLst/>
+          </a:prstGeom>
+          <a:solidFill>
+            <a:schemeClr val="tx1"/>
+          </a:solidFill>
+          <a:ln>
+            <a:solidFill>
+              <a:schemeClr val="tx1"/>
+            </a:solidFill>
+          </a:ln>
+        </p:spPr>
+        <p:style>
+          <a:lnRef idx="2">
+            <a:schemeClr val="accent1">
+              <a:shade val="50000"/>
+            </a:schemeClr>
+          </a:lnRef>
+          <a:fillRef idx="1">
+            <a:schemeClr val="accent1"/>
+          </a:fillRef>
+          <a:effectRef idx="0">
+            <a:schemeClr val="accent1"/>
+          </a:effectRef>
+          <a:fontRef idx="minor">
+            <a:schemeClr val="lt1"/>
+          </a:fontRef>
+        </p:style>
+        <p:txBody>
+          <a:bodyPr rtlCol="0" anchor="ctr"/>
+          <a:lstStyle/>
+          <a:p>
+            <a:pPr algn="ctr"/>
+            <a:endParaRPr lang="en-CA"/>
+          </a:p>
+        </p:txBody>
+      </p:sp>
+      <p:sp>
+        <p:nvSpPr>
+          <p:cNvPr id="29" name="TextBox 28"/>
+          <p:cNvSpPr txBox="1"/>
+          <p:nvPr/>
+        </p:nvSpPr>
+        <p:spPr>
+          <a:xfrm>
+            <a:off x="4881553" y="3649416"/>
+            <a:ext cx="1300276" cy="461665"/>
+          </a:xfrm>
+          <a:prstGeom prst="rect">
+            <a:avLst/>
+          </a:prstGeom>
+          <a:noFill/>
+        </p:spPr>
+        <p:txBody>
+          <a:bodyPr wrap="square" rtlCol="0">
+            <a:spAutoFit/>
+          </a:bodyPr>
+          <a:lstStyle/>
+          <a:p>
+            <a:r>
+              <a:rPr lang="en-US" sz="2400" dirty="0" smtClean="0"/>
+              <a:t>Features</a:t>
+            </a:r>
+            <a:endParaRPr lang="en-CA" sz="2400" dirty="0"/>
+          </a:p>
+        </p:txBody>
+      </p:sp>
+    </p:spTree>
+    <p:extLst>
+      <p:ext uri="{BB962C8B-B14F-4D97-AF65-F5344CB8AC3E}">
+        <p14:creationId xmlns:p14="http://schemas.microsoft.com/office/powerpoint/2010/main" val="432915576"/>
+      </p:ext>
+    </p:extLst>
+  </p:cSld>
+  <p:clrMapOvr>
+    <a:masterClrMapping/>
+  </p:clrMapOvr>
+</p:sld>
+</file>
+
+<file path=ppt/slides/slide4.xml><?xml version="1.0" encoding="utf-8"?>
 <p:sld xmlns:a="http://schemas.openxmlformats.org/drawingml/2006/main" xmlns:r="http://schemas.openxmlformats.org/officeDocument/2006/relationships" xmlns:p="http://schemas.openxmlformats.org/presentationml/2006/main">
   <p:cSld>
     <p:spTree>

</xml_diff>

<commit_message>
CISC 848 Paper - Sent off; CISC 870 Paper - at 2000 words
</commit_message>
<xml_diff>
--- a/CISC870/Paper/FigureCreation.pptx
+++ b/CISC870/Paper/FigureCreation.pptx
@@ -8,7 +8,9 @@
     <p:sldId id="256" r:id="rId2"/>
     <p:sldId id="257" r:id="rId3"/>
     <p:sldId id="259" r:id="rId4"/>
-    <p:sldId id="258" r:id="rId5"/>
+    <p:sldId id="260" r:id="rId5"/>
+    <p:sldId id="261" r:id="rId6"/>
+    <p:sldId id="258" r:id="rId7"/>
   </p:sldIdLst>
   <p:sldSz cx="12192000" cy="6858000"/>
   <p:notesSz cx="6858000" cy="9144000"/>
@@ -3266,7 +3268,7 @@
           <a:p>
             <a:fld id="{E3F1F95A-29A3-4187-BF3A-74A3882354E7}" type="datetimeFigureOut">
               <a:rPr lang="en-US" smtClean="0"/>
-              <a:t>4/9/2017</a:t>
+              <a:t>4/10/2017</a:t>
             </a:fld>
             <a:endParaRPr lang="en-US"/>
           </a:p>
@@ -3436,7 +3438,7 @@
           <a:p>
             <a:fld id="{E3F1F95A-29A3-4187-BF3A-74A3882354E7}" type="datetimeFigureOut">
               <a:rPr lang="en-US" smtClean="0"/>
-              <a:t>4/9/2017</a:t>
+              <a:t>4/10/2017</a:t>
             </a:fld>
             <a:endParaRPr lang="en-US"/>
           </a:p>
@@ -3616,7 +3618,7 @@
           <a:p>
             <a:fld id="{E3F1F95A-29A3-4187-BF3A-74A3882354E7}" type="datetimeFigureOut">
               <a:rPr lang="en-US" smtClean="0"/>
-              <a:t>4/9/2017</a:t>
+              <a:t>4/10/2017</a:t>
             </a:fld>
             <a:endParaRPr lang="en-US"/>
           </a:p>
@@ -3786,7 +3788,7 @@
           <a:p>
             <a:fld id="{E3F1F95A-29A3-4187-BF3A-74A3882354E7}" type="datetimeFigureOut">
               <a:rPr lang="en-US" smtClean="0"/>
-              <a:t>4/9/2017</a:t>
+              <a:t>4/10/2017</a:t>
             </a:fld>
             <a:endParaRPr lang="en-US"/>
           </a:p>
@@ -4032,7 +4034,7 @@
           <a:p>
             <a:fld id="{E3F1F95A-29A3-4187-BF3A-74A3882354E7}" type="datetimeFigureOut">
               <a:rPr lang="en-US" smtClean="0"/>
-              <a:t>4/9/2017</a:t>
+              <a:t>4/10/2017</a:t>
             </a:fld>
             <a:endParaRPr lang="en-US"/>
           </a:p>
@@ -4264,7 +4266,7 @@
           <a:p>
             <a:fld id="{E3F1F95A-29A3-4187-BF3A-74A3882354E7}" type="datetimeFigureOut">
               <a:rPr lang="en-US" smtClean="0"/>
-              <a:t>4/9/2017</a:t>
+              <a:t>4/10/2017</a:t>
             </a:fld>
             <a:endParaRPr lang="en-US"/>
           </a:p>
@@ -4631,7 +4633,7 @@
           <a:p>
             <a:fld id="{E3F1F95A-29A3-4187-BF3A-74A3882354E7}" type="datetimeFigureOut">
               <a:rPr lang="en-US" smtClean="0"/>
-              <a:t>4/9/2017</a:t>
+              <a:t>4/10/2017</a:t>
             </a:fld>
             <a:endParaRPr lang="en-US"/>
           </a:p>
@@ -4749,7 +4751,7 @@
           <a:p>
             <a:fld id="{E3F1F95A-29A3-4187-BF3A-74A3882354E7}" type="datetimeFigureOut">
               <a:rPr lang="en-US" smtClean="0"/>
-              <a:t>4/9/2017</a:t>
+              <a:t>4/10/2017</a:t>
             </a:fld>
             <a:endParaRPr lang="en-US"/>
           </a:p>
@@ -4844,7 +4846,7 @@
           <a:p>
             <a:fld id="{E3F1F95A-29A3-4187-BF3A-74A3882354E7}" type="datetimeFigureOut">
               <a:rPr lang="en-US" smtClean="0"/>
-              <a:t>4/9/2017</a:t>
+              <a:t>4/10/2017</a:t>
             </a:fld>
             <a:endParaRPr lang="en-US"/>
           </a:p>
@@ -5121,7 +5123,7 @@
           <a:p>
             <a:fld id="{E3F1F95A-29A3-4187-BF3A-74A3882354E7}" type="datetimeFigureOut">
               <a:rPr lang="en-US" smtClean="0"/>
-              <a:t>4/9/2017</a:t>
+              <a:t>4/10/2017</a:t>
             </a:fld>
             <a:endParaRPr lang="en-US"/>
           </a:p>
@@ -5374,7 +5376,7 @@
           <a:p>
             <a:fld id="{E3F1F95A-29A3-4187-BF3A-74A3882354E7}" type="datetimeFigureOut">
               <a:rPr lang="en-US" smtClean="0"/>
-              <a:t>4/9/2017</a:t>
+              <a:t>4/10/2017</a:t>
             </a:fld>
             <a:endParaRPr lang="en-US"/>
           </a:p>
@@ -5587,7 +5589,7 @@
           <a:p>
             <a:fld id="{E3F1F95A-29A3-4187-BF3A-74A3882354E7}" type="datetimeFigureOut">
               <a:rPr lang="en-US" smtClean="0"/>
-              <a:t>4/9/2017</a:t>
+              <a:t>4/10/2017</a:t>
             </a:fld>
             <a:endParaRPr lang="en-US"/>
           </a:p>
@@ -7037,16 +7039,1317 @@
           <a:chExt cx="0" cy="0"/>
         </a:xfrm>
       </p:grpSpPr>
+      <p:grpSp>
+        <p:nvGrpSpPr>
+          <p:cNvPr id="39" name="Group 38"/>
+          <p:cNvGrpSpPr/>
+          <p:nvPr/>
+        </p:nvGrpSpPr>
+        <p:grpSpPr>
+          <a:xfrm>
+            <a:off x="-563877" y="804870"/>
+            <a:ext cx="11844016" cy="5839769"/>
+            <a:chOff x="-563877" y="804870"/>
+            <a:chExt cx="11844016" cy="5839769"/>
+          </a:xfrm>
+        </p:grpSpPr>
+        <p:sp>
+          <p:nvSpPr>
+            <p:cNvPr id="3" name="Rounded Rectangle 2"/>
+            <p:cNvSpPr/>
+            <p:nvPr/>
+          </p:nvSpPr>
+          <p:spPr>
+            <a:xfrm>
+              <a:off x="-281938" y="804870"/>
+              <a:ext cx="11280138" cy="5839769"/>
+            </a:xfrm>
+            <a:prstGeom prst="roundRect">
+              <a:avLst/>
+            </a:prstGeom>
+            <a:noFill/>
+            <a:ln w="76200">
+              <a:solidFill>
+                <a:schemeClr val="tx1"/>
+              </a:solidFill>
+            </a:ln>
+          </p:spPr>
+          <p:style>
+            <a:lnRef idx="2">
+              <a:schemeClr val="accent1">
+                <a:shade val="50000"/>
+              </a:schemeClr>
+            </a:lnRef>
+            <a:fillRef idx="1">
+              <a:schemeClr val="accent1"/>
+            </a:fillRef>
+            <a:effectRef idx="0">
+              <a:schemeClr val="accent1"/>
+            </a:effectRef>
+            <a:fontRef idx="minor">
+              <a:schemeClr val="lt1"/>
+            </a:fontRef>
+          </p:style>
+          <p:txBody>
+            <a:bodyPr rtlCol="0" anchor="ctr"/>
+            <a:lstStyle/>
+            <a:p>
+              <a:pPr algn="ctr"/>
+              <a:endParaRPr lang="en-CA"/>
+            </a:p>
+          </p:txBody>
+        </p:sp>
+        <p:sp>
+          <p:nvSpPr>
+            <p:cNvPr id="4" name="TextBox 3"/>
+            <p:cNvSpPr txBox="1"/>
+            <p:nvPr/>
+          </p:nvSpPr>
+          <p:spPr>
+            <a:xfrm>
+              <a:off x="3270068" y="889367"/>
+              <a:ext cx="4615544" cy="646331"/>
+            </a:xfrm>
+            <a:prstGeom prst="rect">
+              <a:avLst/>
+            </a:prstGeom>
+            <a:noFill/>
+          </p:spPr>
+          <p:txBody>
+            <a:bodyPr wrap="square" rtlCol="0" anchor="ctr">
+              <a:spAutoFit/>
+            </a:bodyPr>
+            <a:lstStyle/>
+            <a:p>
+              <a:pPr algn="ctr"/>
+              <a:r>
+                <a:rPr lang="en-US" sz="3600" dirty="0" smtClean="0"/>
+                <a:t>Overall functionality</a:t>
+              </a:r>
+              <a:endParaRPr lang="en-CA" sz="3600" dirty="0"/>
+            </a:p>
+          </p:txBody>
+        </p:sp>
+        <p:sp>
+          <p:nvSpPr>
+            <p:cNvPr id="5" name="Rounded Rectangle 4"/>
+            <p:cNvSpPr/>
+            <p:nvPr/>
+          </p:nvSpPr>
+          <p:spPr>
+            <a:xfrm>
+              <a:off x="6932022" y="1698171"/>
+              <a:ext cx="2734491" cy="4659086"/>
+            </a:xfrm>
+            <a:prstGeom prst="roundRect">
+              <a:avLst/>
+            </a:prstGeom>
+            <a:noFill/>
+            <a:ln w="76200">
+              <a:solidFill>
+                <a:schemeClr val="tx1"/>
+              </a:solidFill>
+            </a:ln>
+          </p:spPr>
+          <p:style>
+            <a:lnRef idx="2">
+              <a:schemeClr val="accent1">
+                <a:shade val="50000"/>
+              </a:schemeClr>
+            </a:lnRef>
+            <a:fillRef idx="1">
+              <a:schemeClr val="accent1"/>
+            </a:fillRef>
+            <a:effectRef idx="0">
+              <a:schemeClr val="accent1"/>
+            </a:effectRef>
+            <a:fontRef idx="minor">
+              <a:schemeClr val="lt1"/>
+            </a:fontRef>
+          </p:style>
+          <p:txBody>
+            <a:bodyPr rtlCol="0" anchor="ctr"/>
+            <a:lstStyle/>
+            <a:p>
+              <a:pPr algn="ctr"/>
+              <a:endParaRPr lang="en-CA"/>
+            </a:p>
+          </p:txBody>
+        </p:sp>
+        <p:sp>
+          <p:nvSpPr>
+            <p:cNvPr id="6" name="Rounded Rectangle 5"/>
+            <p:cNvSpPr/>
+            <p:nvPr/>
+          </p:nvSpPr>
+          <p:spPr>
+            <a:xfrm>
+              <a:off x="4397830" y="1698171"/>
+              <a:ext cx="2368728" cy="4659086"/>
+            </a:xfrm>
+            <a:prstGeom prst="roundRect">
+              <a:avLst/>
+            </a:prstGeom>
+            <a:noFill/>
+            <a:ln w="76200">
+              <a:solidFill>
+                <a:schemeClr val="tx1"/>
+              </a:solidFill>
+            </a:ln>
+          </p:spPr>
+          <p:style>
+            <a:lnRef idx="2">
+              <a:schemeClr val="accent1">
+                <a:shade val="50000"/>
+              </a:schemeClr>
+            </a:lnRef>
+            <a:fillRef idx="1">
+              <a:schemeClr val="accent1"/>
+            </a:fillRef>
+            <a:effectRef idx="0">
+              <a:schemeClr val="accent1"/>
+            </a:effectRef>
+            <a:fontRef idx="minor">
+              <a:schemeClr val="lt1"/>
+            </a:fontRef>
+          </p:style>
+          <p:txBody>
+            <a:bodyPr rtlCol="0" anchor="ctr"/>
+            <a:lstStyle/>
+            <a:p>
+              <a:pPr algn="ctr"/>
+              <a:endParaRPr lang="en-CA"/>
+            </a:p>
+          </p:txBody>
+        </p:sp>
+        <p:sp>
+          <p:nvSpPr>
+            <p:cNvPr id="7" name="Rounded Rectangle 6"/>
+            <p:cNvSpPr/>
+            <p:nvPr/>
+          </p:nvSpPr>
+          <p:spPr>
+            <a:xfrm>
+              <a:off x="1529789" y="1701364"/>
+              <a:ext cx="2730702" cy="2072640"/>
+            </a:xfrm>
+            <a:prstGeom prst="roundRect">
+              <a:avLst/>
+            </a:prstGeom>
+            <a:noFill/>
+            <a:ln w="76200">
+              <a:solidFill>
+                <a:schemeClr val="tx1"/>
+              </a:solidFill>
+            </a:ln>
+          </p:spPr>
+          <p:style>
+            <a:lnRef idx="2">
+              <a:schemeClr val="accent1">
+                <a:shade val="50000"/>
+              </a:schemeClr>
+            </a:lnRef>
+            <a:fillRef idx="1">
+              <a:schemeClr val="accent1"/>
+            </a:fillRef>
+            <a:effectRef idx="0">
+              <a:schemeClr val="accent1"/>
+            </a:effectRef>
+            <a:fontRef idx="minor">
+              <a:schemeClr val="lt1"/>
+            </a:fontRef>
+          </p:style>
+          <p:txBody>
+            <a:bodyPr rtlCol="0" anchor="ctr"/>
+            <a:lstStyle/>
+            <a:p>
+              <a:pPr algn="ctr"/>
+              <a:endParaRPr lang="en-CA"/>
+            </a:p>
+          </p:txBody>
+        </p:sp>
+        <p:sp>
+          <p:nvSpPr>
+            <p:cNvPr id="8" name="TextBox 7"/>
+            <p:cNvSpPr txBox="1"/>
+            <p:nvPr/>
+          </p:nvSpPr>
+          <p:spPr>
+            <a:xfrm>
+              <a:off x="1828340" y="1680222"/>
+              <a:ext cx="2133599" cy="584775"/>
+            </a:xfrm>
+            <a:prstGeom prst="rect">
+              <a:avLst/>
+            </a:prstGeom>
+            <a:noFill/>
+          </p:spPr>
+          <p:txBody>
+            <a:bodyPr wrap="square" rtlCol="0" anchor="ctr">
+              <a:spAutoFit/>
+            </a:bodyPr>
+            <a:lstStyle/>
+            <a:p>
+              <a:pPr algn="ctr"/>
+              <a:r>
+                <a:rPr lang="en-US" sz="3200" dirty="0" smtClean="0"/>
+                <a:t>Perception</a:t>
+              </a:r>
+              <a:endParaRPr lang="en-CA" sz="3200" dirty="0"/>
+            </a:p>
+          </p:txBody>
+        </p:sp>
+        <p:sp>
+          <p:nvSpPr>
+            <p:cNvPr id="9" name="TextBox 8"/>
+            <p:cNvSpPr txBox="1"/>
+            <p:nvPr/>
+          </p:nvSpPr>
+          <p:spPr>
+            <a:xfrm>
+              <a:off x="4574177" y="1698171"/>
+              <a:ext cx="2133599" cy="584775"/>
+            </a:xfrm>
+            <a:prstGeom prst="rect">
+              <a:avLst/>
+            </a:prstGeom>
+            <a:noFill/>
+          </p:spPr>
+          <p:txBody>
+            <a:bodyPr wrap="square" rtlCol="0" anchor="ctr">
+              <a:spAutoFit/>
+            </a:bodyPr>
+            <a:lstStyle/>
+            <a:p>
+              <a:pPr algn="ctr"/>
+              <a:r>
+                <a:rPr lang="en-US" sz="3200" dirty="0" smtClean="0"/>
+                <a:t>Modelling</a:t>
+              </a:r>
+              <a:endParaRPr lang="en-CA" sz="3200" dirty="0"/>
+            </a:p>
+          </p:txBody>
+        </p:sp>
+        <p:sp>
+          <p:nvSpPr>
+            <p:cNvPr id="10" name="TextBox 9"/>
+            <p:cNvSpPr txBox="1"/>
+            <p:nvPr/>
+          </p:nvSpPr>
+          <p:spPr>
+            <a:xfrm>
+              <a:off x="7104284" y="1709539"/>
+              <a:ext cx="2133599" cy="584775"/>
+            </a:xfrm>
+            <a:prstGeom prst="rect">
+              <a:avLst/>
+            </a:prstGeom>
+            <a:noFill/>
+          </p:spPr>
+          <p:txBody>
+            <a:bodyPr wrap="square" rtlCol="0" anchor="ctr">
+              <a:spAutoFit/>
+            </a:bodyPr>
+            <a:lstStyle/>
+            <a:p>
+              <a:pPr algn="ctr"/>
+              <a:r>
+                <a:rPr lang="en-US" sz="3200" dirty="0" smtClean="0"/>
+                <a:t>Behavior</a:t>
+              </a:r>
+              <a:endParaRPr lang="en-CA" sz="3200" dirty="0"/>
+            </a:p>
+          </p:txBody>
+        </p:sp>
+        <p:grpSp>
+          <p:nvGrpSpPr>
+            <p:cNvPr id="11" name="Group 10"/>
+            <p:cNvGrpSpPr/>
+            <p:nvPr/>
+          </p:nvGrpSpPr>
+          <p:grpSpPr>
+            <a:xfrm>
+              <a:off x="1871108" y="2298409"/>
+              <a:ext cx="2133599" cy="903691"/>
+              <a:chOff x="2016033" y="2544904"/>
+              <a:chExt cx="2133599" cy="903691"/>
+            </a:xfrm>
+          </p:grpSpPr>
+          <p:sp>
+            <p:nvSpPr>
+              <p:cNvPr id="24" name="Rounded Rectangle 23"/>
+              <p:cNvSpPr/>
+              <p:nvPr/>
+            </p:nvSpPr>
+            <p:spPr>
+              <a:xfrm>
+                <a:off x="2016033" y="2544905"/>
+                <a:ext cx="2063934" cy="903690"/>
+              </a:xfrm>
+              <a:prstGeom prst="roundRect">
+                <a:avLst/>
+              </a:prstGeom>
+              <a:noFill/>
+              <a:ln w="38100">
+                <a:solidFill>
+                  <a:schemeClr val="tx1"/>
+                </a:solidFill>
+              </a:ln>
+            </p:spPr>
+            <p:style>
+              <a:lnRef idx="2">
+                <a:schemeClr val="accent1">
+                  <a:shade val="50000"/>
+                </a:schemeClr>
+              </a:lnRef>
+              <a:fillRef idx="1">
+                <a:schemeClr val="accent1"/>
+              </a:fillRef>
+              <a:effectRef idx="0">
+                <a:schemeClr val="accent1"/>
+              </a:effectRef>
+              <a:fontRef idx="minor">
+                <a:schemeClr val="lt1"/>
+              </a:fontRef>
+            </p:style>
+            <p:txBody>
+              <a:bodyPr rtlCol="0" anchor="ctr"/>
+              <a:lstStyle/>
+              <a:p>
+                <a:pPr algn="ctr"/>
+                <a:endParaRPr lang="en-CA" dirty="0"/>
+              </a:p>
+            </p:txBody>
+          </p:sp>
+          <p:sp>
+            <p:nvSpPr>
+              <p:cNvPr id="25" name="TextBox 24"/>
+              <p:cNvSpPr txBox="1"/>
+              <p:nvPr/>
+            </p:nvSpPr>
+            <p:spPr>
+              <a:xfrm>
+                <a:off x="2016033" y="2544904"/>
+                <a:ext cx="2133599" cy="830997"/>
+              </a:xfrm>
+              <a:prstGeom prst="rect">
+                <a:avLst/>
+              </a:prstGeom>
+              <a:noFill/>
+            </p:spPr>
+            <p:txBody>
+              <a:bodyPr wrap="square" rtlCol="0" anchor="ctr">
+                <a:spAutoFit/>
+              </a:bodyPr>
+              <a:lstStyle/>
+              <a:p>
+                <a:pPr algn="ctr"/>
+                <a:r>
+                  <a:rPr lang="en-US" sz="2400" dirty="0"/>
+                  <a:t>Measurement type</a:t>
+                </a:r>
+                <a:endParaRPr lang="en-CA" sz="2400" dirty="0"/>
+              </a:p>
+            </p:txBody>
+          </p:sp>
+        </p:grpSp>
+        <p:grpSp>
+          <p:nvGrpSpPr>
+            <p:cNvPr id="12" name="Group 11"/>
+            <p:cNvGrpSpPr/>
+            <p:nvPr/>
+          </p:nvGrpSpPr>
+          <p:grpSpPr>
+            <a:xfrm>
+              <a:off x="4438108" y="2377272"/>
+              <a:ext cx="2279463" cy="894075"/>
+              <a:chOff x="1928952" y="2512682"/>
+              <a:chExt cx="2279463" cy="631384"/>
+            </a:xfrm>
+          </p:grpSpPr>
+          <p:sp>
+            <p:nvSpPr>
+              <p:cNvPr id="22" name="Rounded Rectangle 21"/>
+              <p:cNvSpPr/>
+              <p:nvPr/>
+            </p:nvSpPr>
+            <p:spPr>
+              <a:xfrm>
+                <a:off x="2020388" y="2512682"/>
+                <a:ext cx="2124892" cy="631384"/>
+              </a:xfrm>
+              <a:prstGeom prst="roundRect">
+                <a:avLst/>
+              </a:prstGeom>
+              <a:noFill/>
+              <a:ln w="38100">
+                <a:solidFill>
+                  <a:schemeClr val="tx1"/>
+                </a:solidFill>
+              </a:ln>
+            </p:spPr>
+            <p:style>
+              <a:lnRef idx="2">
+                <a:schemeClr val="accent1">
+                  <a:shade val="50000"/>
+                </a:schemeClr>
+              </a:lnRef>
+              <a:fillRef idx="1">
+                <a:schemeClr val="accent1"/>
+              </a:fillRef>
+              <a:effectRef idx="0">
+                <a:schemeClr val="accent1"/>
+              </a:effectRef>
+              <a:fontRef idx="minor">
+                <a:schemeClr val="lt1"/>
+              </a:fontRef>
+            </p:style>
+            <p:txBody>
+              <a:bodyPr rtlCol="0" anchor="ctr"/>
+              <a:lstStyle/>
+              <a:p>
+                <a:pPr algn="ctr"/>
+                <a:endParaRPr lang="en-CA" dirty="0"/>
+              </a:p>
+            </p:txBody>
+          </p:sp>
+          <p:sp>
+            <p:nvSpPr>
+              <p:cNvPr id="23" name="TextBox 22"/>
+              <p:cNvSpPr txBox="1"/>
+              <p:nvPr/>
+            </p:nvSpPr>
+            <p:spPr>
+              <a:xfrm>
+                <a:off x="1928952" y="2673159"/>
+                <a:ext cx="2279463" cy="241786"/>
+              </a:xfrm>
+              <a:prstGeom prst="rect">
+                <a:avLst/>
+              </a:prstGeom>
+              <a:noFill/>
+            </p:spPr>
+            <p:txBody>
+              <a:bodyPr wrap="square" rtlCol="0" anchor="ctr">
+                <a:spAutoFit/>
+              </a:bodyPr>
+              <a:lstStyle/>
+              <a:p>
+                <a:pPr algn="ctr"/>
+                <a:r>
+                  <a:rPr lang="en-US" sz="2400" dirty="0" smtClean="0"/>
+                  <a:t>Features to model method</a:t>
+                </a:r>
+                <a:endParaRPr lang="en-CA" sz="2400" dirty="0"/>
+              </a:p>
+            </p:txBody>
+          </p:sp>
+        </p:grpSp>
+        <p:grpSp>
+          <p:nvGrpSpPr>
+            <p:cNvPr id="13" name="Group 12"/>
+            <p:cNvGrpSpPr/>
+            <p:nvPr/>
+          </p:nvGrpSpPr>
+          <p:grpSpPr>
+            <a:xfrm>
+              <a:off x="4501073" y="4723819"/>
+              <a:ext cx="2133599" cy="1252920"/>
+              <a:chOff x="1968138" y="3606408"/>
+              <a:chExt cx="2133599" cy="1209677"/>
+            </a:xfrm>
+          </p:grpSpPr>
+          <p:sp>
+            <p:nvSpPr>
+              <p:cNvPr id="20" name="Rounded Rectangle 19"/>
+              <p:cNvSpPr/>
+              <p:nvPr/>
+            </p:nvSpPr>
+            <p:spPr>
+              <a:xfrm>
+                <a:off x="2037637" y="3615756"/>
+                <a:ext cx="1994600" cy="1200329"/>
+              </a:xfrm>
+              <a:prstGeom prst="roundRect">
+                <a:avLst/>
+              </a:prstGeom>
+              <a:noFill/>
+              <a:ln w="38100">
+                <a:solidFill>
+                  <a:schemeClr val="tx1"/>
+                </a:solidFill>
+              </a:ln>
+            </p:spPr>
+            <p:style>
+              <a:lnRef idx="2">
+                <a:schemeClr val="accent1">
+                  <a:shade val="50000"/>
+                </a:schemeClr>
+              </a:lnRef>
+              <a:fillRef idx="1">
+                <a:schemeClr val="accent1"/>
+              </a:fillRef>
+              <a:effectRef idx="0">
+                <a:schemeClr val="accent1"/>
+              </a:effectRef>
+              <a:fontRef idx="minor">
+                <a:schemeClr val="lt1"/>
+              </a:fontRef>
+            </p:style>
+            <p:txBody>
+              <a:bodyPr rtlCol="0" anchor="ctr"/>
+              <a:lstStyle/>
+              <a:p>
+                <a:pPr algn="ctr"/>
+                <a:endParaRPr lang="en-CA" dirty="0"/>
+              </a:p>
+            </p:txBody>
+          </p:sp>
+          <p:sp>
+            <p:nvSpPr>
+              <p:cNvPr id="21" name="TextBox 20"/>
+              <p:cNvSpPr txBox="1"/>
+              <p:nvPr/>
+            </p:nvSpPr>
+            <p:spPr>
+              <a:xfrm>
+                <a:off x="1968138" y="3606408"/>
+                <a:ext cx="2133599" cy="1200329"/>
+              </a:xfrm>
+              <a:prstGeom prst="rect">
+                <a:avLst/>
+              </a:prstGeom>
+              <a:noFill/>
+            </p:spPr>
+            <p:txBody>
+              <a:bodyPr wrap="square" rtlCol="0" anchor="ctr">
+                <a:spAutoFit/>
+              </a:bodyPr>
+              <a:lstStyle/>
+              <a:p>
+                <a:pPr algn="ctr"/>
+                <a:r>
+                  <a:rPr lang="en-US" sz="2400" dirty="0" smtClean="0"/>
+                  <a:t>Measurement to features method</a:t>
+                </a:r>
+                <a:endParaRPr lang="en-CA" sz="2400" dirty="0"/>
+              </a:p>
+            </p:txBody>
+          </p:sp>
+        </p:grpSp>
+        <p:grpSp>
+          <p:nvGrpSpPr>
+            <p:cNvPr id="14" name="Group 13"/>
+            <p:cNvGrpSpPr/>
+            <p:nvPr/>
+          </p:nvGrpSpPr>
+          <p:grpSpPr>
+            <a:xfrm>
+              <a:off x="7266760" y="4951921"/>
+              <a:ext cx="2065013" cy="1200330"/>
+              <a:chOff x="7138578" y="3456446"/>
+              <a:chExt cx="2065013" cy="1134655"/>
+            </a:xfrm>
+          </p:grpSpPr>
+          <p:sp>
+            <p:nvSpPr>
+              <p:cNvPr id="18" name="Rounded Rectangle 17"/>
+              <p:cNvSpPr/>
+              <p:nvPr/>
+            </p:nvSpPr>
+            <p:spPr>
+              <a:xfrm>
+                <a:off x="7138578" y="3456446"/>
+                <a:ext cx="2065013" cy="1134654"/>
+              </a:xfrm>
+              <a:prstGeom prst="roundRect">
+                <a:avLst/>
+              </a:prstGeom>
+              <a:noFill/>
+              <a:ln w="38100">
+                <a:solidFill>
+                  <a:schemeClr val="tx1"/>
+                </a:solidFill>
+              </a:ln>
+            </p:spPr>
+            <p:style>
+              <a:lnRef idx="2">
+                <a:schemeClr val="accent1">
+                  <a:shade val="50000"/>
+                </a:schemeClr>
+              </a:lnRef>
+              <a:fillRef idx="1">
+                <a:schemeClr val="accent1"/>
+              </a:fillRef>
+              <a:effectRef idx="0">
+                <a:schemeClr val="accent1"/>
+              </a:effectRef>
+              <a:fontRef idx="minor">
+                <a:schemeClr val="lt1"/>
+              </a:fontRef>
+            </p:style>
+            <p:txBody>
+              <a:bodyPr rtlCol="0" anchor="ctr"/>
+              <a:lstStyle/>
+              <a:p>
+                <a:pPr algn="ctr"/>
+                <a:endParaRPr lang="en-CA" dirty="0"/>
+              </a:p>
+            </p:txBody>
+          </p:sp>
+          <p:sp>
+            <p:nvSpPr>
+              <p:cNvPr id="19" name="TextBox 18"/>
+              <p:cNvSpPr txBox="1"/>
+              <p:nvPr/>
+            </p:nvSpPr>
+            <p:spPr>
+              <a:xfrm>
+                <a:off x="7138578" y="3456447"/>
+                <a:ext cx="2049824" cy="1134654"/>
+              </a:xfrm>
+              <a:prstGeom prst="rect">
+                <a:avLst/>
+              </a:prstGeom>
+              <a:noFill/>
+            </p:spPr>
+            <p:txBody>
+              <a:bodyPr wrap="square" rtlCol="0" anchor="ctr">
+                <a:spAutoFit/>
+              </a:bodyPr>
+              <a:lstStyle/>
+              <a:p>
+                <a:pPr algn="ctr"/>
+                <a:r>
+                  <a:rPr lang="en-US" sz="2400" dirty="0" smtClean="0"/>
+                  <a:t>Behavior set </a:t>
+                </a:r>
+                <a:r>
+                  <a:rPr lang="en-US" sz="2400" dirty="0" smtClean="0"/>
+                  <a:t>implementing functionality</a:t>
+                </a:r>
+                <a:endParaRPr lang="en-CA" sz="2400" dirty="0"/>
+              </a:p>
+            </p:txBody>
+          </p:sp>
+        </p:grpSp>
+        <p:grpSp>
+          <p:nvGrpSpPr>
+            <p:cNvPr id="15" name="Group 14"/>
+            <p:cNvGrpSpPr/>
+            <p:nvPr/>
+          </p:nvGrpSpPr>
+          <p:grpSpPr>
+            <a:xfrm>
+              <a:off x="7123602" y="3069696"/>
+              <a:ext cx="2351328" cy="965209"/>
+              <a:chOff x="1994503" y="1843918"/>
+              <a:chExt cx="2351328" cy="965209"/>
+            </a:xfrm>
+          </p:grpSpPr>
+          <p:sp>
+            <p:nvSpPr>
+              <p:cNvPr id="16" name="Rounded Rectangle 15"/>
+              <p:cNvSpPr/>
+              <p:nvPr/>
+            </p:nvSpPr>
+            <p:spPr>
+              <a:xfrm>
+                <a:off x="2032908" y="1843918"/>
+                <a:ext cx="2259331" cy="965209"/>
+              </a:xfrm>
+              <a:prstGeom prst="roundRect">
+                <a:avLst/>
+              </a:prstGeom>
+              <a:noFill/>
+              <a:ln w="38100">
+                <a:solidFill>
+                  <a:schemeClr val="tx1"/>
+                </a:solidFill>
+              </a:ln>
+            </p:spPr>
+            <p:style>
+              <a:lnRef idx="2">
+                <a:schemeClr val="accent1">
+                  <a:shade val="50000"/>
+                </a:schemeClr>
+              </a:lnRef>
+              <a:fillRef idx="1">
+                <a:schemeClr val="accent1"/>
+              </a:fillRef>
+              <a:effectRef idx="0">
+                <a:schemeClr val="accent1"/>
+              </a:effectRef>
+              <a:fontRef idx="minor">
+                <a:schemeClr val="lt1"/>
+              </a:fontRef>
+            </p:style>
+            <p:txBody>
+              <a:bodyPr rtlCol="0" anchor="ctr"/>
+              <a:lstStyle/>
+              <a:p>
+                <a:pPr algn="ctr"/>
+                <a:endParaRPr lang="en-CA" dirty="0"/>
+              </a:p>
+            </p:txBody>
+          </p:sp>
+          <p:sp>
+            <p:nvSpPr>
+              <p:cNvPr id="17" name="TextBox 16"/>
+              <p:cNvSpPr txBox="1"/>
+              <p:nvPr/>
+            </p:nvSpPr>
+            <p:spPr>
+              <a:xfrm>
+                <a:off x="1994503" y="1887079"/>
+                <a:ext cx="2351328" cy="830997"/>
+              </a:xfrm>
+              <a:prstGeom prst="rect">
+                <a:avLst/>
+              </a:prstGeom>
+              <a:noFill/>
+            </p:spPr>
+            <p:txBody>
+              <a:bodyPr wrap="square" rtlCol="0" anchor="ctr">
+                <a:spAutoFit/>
+              </a:bodyPr>
+              <a:lstStyle/>
+              <a:p>
+                <a:pPr algn="ctr"/>
+                <a:r>
+                  <a:rPr lang="en-US" sz="2400" dirty="0" smtClean="0"/>
+                  <a:t>Model to </a:t>
+                </a:r>
+                <a:r>
+                  <a:rPr lang="en-US" sz="2400" dirty="0" smtClean="0"/>
+                  <a:t>output behavior </a:t>
+                </a:r>
+                <a:r>
+                  <a:rPr lang="en-US" sz="2400" dirty="0" smtClean="0"/>
+                  <a:t>control</a:t>
+                </a:r>
+                <a:endParaRPr lang="en-CA" sz="2400" dirty="0"/>
+              </a:p>
+            </p:txBody>
+          </p:sp>
+        </p:grpSp>
+        <p:sp>
+          <p:nvSpPr>
+            <p:cNvPr id="26" name="Bent-Up Arrow 25"/>
+            <p:cNvSpPr/>
+            <p:nvPr/>
+          </p:nvSpPr>
+          <p:spPr>
+            <a:xfrm rot="5400000">
+              <a:off x="2457850" y="3512850"/>
+              <a:ext cx="2423639" cy="1802140"/>
+            </a:xfrm>
+            <a:prstGeom prst="bentUpArrow">
+              <a:avLst>
+                <a:gd name="adj1" fmla="val 12085"/>
+                <a:gd name="adj2" fmla="val 14992"/>
+                <a:gd name="adj3" fmla="val 21296"/>
+              </a:avLst>
+            </a:prstGeom>
+            <a:solidFill>
+              <a:schemeClr val="tx1"/>
+            </a:solidFill>
+            <a:ln>
+              <a:solidFill>
+                <a:schemeClr val="tx1"/>
+              </a:solidFill>
+            </a:ln>
+          </p:spPr>
+          <p:style>
+            <a:lnRef idx="2">
+              <a:schemeClr val="accent1">
+                <a:shade val="50000"/>
+              </a:schemeClr>
+            </a:lnRef>
+            <a:fillRef idx="1">
+              <a:schemeClr val="accent1"/>
+            </a:fillRef>
+            <a:effectRef idx="0">
+              <a:schemeClr val="accent1"/>
+            </a:effectRef>
+            <a:fontRef idx="minor">
+              <a:schemeClr val="lt1"/>
+            </a:fontRef>
+          </p:style>
+          <p:txBody>
+            <a:bodyPr rtlCol="0" anchor="ctr"/>
+            <a:lstStyle/>
+            <a:p>
+              <a:pPr algn="ctr"/>
+              <a:endParaRPr lang="en-CA"/>
+            </a:p>
+          </p:txBody>
+        </p:sp>
+        <p:sp>
+          <p:nvSpPr>
+            <p:cNvPr id="27" name="TextBox 26"/>
+            <p:cNvSpPr txBox="1"/>
+            <p:nvPr/>
+          </p:nvSpPr>
+          <p:spPr>
+            <a:xfrm>
+              <a:off x="1985094" y="5552212"/>
+              <a:ext cx="2211350" cy="461665"/>
+            </a:xfrm>
+            <a:prstGeom prst="rect">
+              <a:avLst/>
+            </a:prstGeom>
+            <a:noFill/>
+          </p:spPr>
+          <p:txBody>
+            <a:bodyPr wrap="square" rtlCol="0">
+              <a:spAutoFit/>
+            </a:bodyPr>
+            <a:lstStyle/>
+            <a:p>
+              <a:r>
+                <a:rPr lang="en-US" sz="2400" dirty="0" smtClean="0"/>
+                <a:t>Measurements</a:t>
+              </a:r>
+              <a:endParaRPr lang="en-CA" sz="2400" dirty="0"/>
+            </a:p>
+          </p:txBody>
+        </p:sp>
+        <p:sp>
+          <p:nvSpPr>
+            <p:cNvPr id="28" name="Up Arrow 27"/>
+            <p:cNvSpPr/>
+            <p:nvPr/>
+          </p:nvSpPr>
+          <p:spPr>
+            <a:xfrm>
+              <a:off x="6017623" y="3237006"/>
+              <a:ext cx="348343" cy="1496495"/>
+            </a:xfrm>
+            <a:prstGeom prst="upArrow">
+              <a:avLst/>
+            </a:prstGeom>
+            <a:solidFill>
+              <a:schemeClr val="tx1"/>
+            </a:solidFill>
+            <a:ln>
+              <a:solidFill>
+                <a:schemeClr val="tx1"/>
+              </a:solidFill>
+            </a:ln>
+          </p:spPr>
+          <p:style>
+            <a:lnRef idx="2">
+              <a:schemeClr val="accent1">
+                <a:shade val="50000"/>
+              </a:schemeClr>
+            </a:lnRef>
+            <a:fillRef idx="1">
+              <a:schemeClr val="accent1"/>
+            </a:fillRef>
+            <a:effectRef idx="0">
+              <a:schemeClr val="accent1"/>
+            </a:effectRef>
+            <a:fontRef idx="minor">
+              <a:schemeClr val="lt1"/>
+            </a:fontRef>
+          </p:style>
+          <p:txBody>
+            <a:bodyPr rtlCol="0" anchor="ctr"/>
+            <a:lstStyle/>
+            <a:p>
+              <a:pPr algn="ctr"/>
+              <a:endParaRPr lang="en-CA"/>
+            </a:p>
+          </p:txBody>
+        </p:sp>
+        <p:sp>
+          <p:nvSpPr>
+            <p:cNvPr id="29" name="TextBox 28"/>
+            <p:cNvSpPr txBox="1"/>
+            <p:nvPr/>
+          </p:nvSpPr>
+          <p:spPr>
+            <a:xfrm>
+              <a:off x="4891518" y="4006064"/>
+              <a:ext cx="1300276" cy="461665"/>
+            </a:xfrm>
+            <a:prstGeom prst="rect">
+              <a:avLst/>
+            </a:prstGeom>
+            <a:noFill/>
+          </p:spPr>
+          <p:txBody>
+            <a:bodyPr wrap="square" rtlCol="0">
+              <a:spAutoFit/>
+            </a:bodyPr>
+            <a:lstStyle/>
+            <a:p>
+              <a:r>
+                <a:rPr lang="en-US" sz="2400" dirty="0" smtClean="0"/>
+                <a:t>Features</a:t>
+              </a:r>
+              <a:endParaRPr lang="en-CA" sz="2400" dirty="0"/>
+            </a:p>
+          </p:txBody>
+        </p:sp>
+        <p:sp>
+          <p:nvSpPr>
+            <p:cNvPr id="2" name="Up Arrow 1"/>
+            <p:cNvSpPr/>
+            <p:nvPr/>
+          </p:nvSpPr>
+          <p:spPr>
+            <a:xfrm>
+              <a:off x="7960715" y="4034905"/>
+              <a:ext cx="357052" cy="902710"/>
+            </a:xfrm>
+            <a:prstGeom prst="upArrow">
+              <a:avLst/>
+            </a:prstGeom>
+            <a:solidFill>
+              <a:schemeClr val="tx1"/>
+            </a:solidFill>
+            <a:ln>
+              <a:solidFill>
+                <a:schemeClr val="tx1"/>
+              </a:solidFill>
+            </a:ln>
+          </p:spPr>
+          <p:style>
+            <a:lnRef idx="2">
+              <a:schemeClr val="accent1">
+                <a:shade val="50000"/>
+              </a:schemeClr>
+            </a:lnRef>
+            <a:fillRef idx="1">
+              <a:schemeClr val="accent1"/>
+            </a:fillRef>
+            <a:effectRef idx="0">
+              <a:schemeClr val="accent1"/>
+            </a:effectRef>
+            <a:fontRef idx="minor">
+              <a:schemeClr val="lt1"/>
+            </a:fontRef>
+          </p:style>
+          <p:txBody>
+            <a:bodyPr rtlCol="0" anchor="ctr"/>
+            <a:lstStyle/>
+            <a:p>
+              <a:pPr algn="ctr"/>
+              <a:endParaRPr lang="en-CA"/>
+            </a:p>
+          </p:txBody>
+        </p:sp>
+        <p:sp>
+          <p:nvSpPr>
+            <p:cNvPr id="32" name="Right Arrow 31"/>
+            <p:cNvSpPr/>
+            <p:nvPr/>
+          </p:nvSpPr>
+          <p:spPr>
+            <a:xfrm>
+              <a:off x="9421338" y="3379284"/>
+              <a:ext cx="1858801" cy="374468"/>
+            </a:xfrm>
+            <a:prstGeom prst="rightArrow">
+              <a:avLst/>
+            </a:prstGeom>
+            <a:solidFill>
+              <a:schemeClr val="tx1"/>
+            </a:solidFill>
+            <a:ln>
+              <a:solidFill>
+                <a:schemeClr val="tx1"/>
+              </a:solidFill>
+            </a:ln>
+          </p:spPr>
+          <p:style>
+            <a:lnRef idx="2">
+              <a:schemeClr val="accent1">
+                <a:shade val="50000"/>
+              </a:schemeClr>
+            </a:lnRef>
+            <a:fillRef idx="1">
+              <a:schemeClr val="accent1"/>
+            </a:fillRef>
+            <a:effectRef idx="0">
+              <a:schemeClr val="accent1"/>
+            </a:effectRef>
+            <a:fontRef idx="minor">
+              <a:schemeClr val="lt1"/>
+            </a:fontRef>
+          </p:style>
+          <p:txBody>
+            <a:bodyPr rtlCol="0" anchor="ctr"/>
+            <a:lstStyle/>
+            <a:p>
+              <a:pPr algn="ctr"/>
+              <a:endParaRPr lang="en-CA"/>
+            </a:p>
+          </p:txBody>
+        </p:sp>
+        <p:sp>
+          <p:nvSpPr>
+            <p:cNvPr id="33" name="TextBox 32"/>
+            <p:cNvSpPr txBox="1"/>
+            <p:nvPr/>
+          </p:nvSpPr>
+          <p:spPr>
+            <a:xfrm>
+              <a:off x="7038275" y="2269243"/>
+              <a:ext cx="1300276" cy="461665"/>
+            </a:xfrm>
+            <a:prstGeom prst="rect">
+              <a:avLst/>
+            </a:prstGeom>
+            <a:noFill/>
+          </p:spPr>
+          <p:txBody>
+            <a:bodyPr wrap="square" rtlCol="0">
+              <a:spAutoFit/>
+            </a:bodyPr>
+            <a:lstStyle/>
+            <a:p>
+              <a:r>
+                <a:rPr lang="en-US" sz="2400" dirty="0" smtClean="0"/>
+                <a:t>Model</a:t>
+              </a:r>
+              <a:endParaRPr lang="en-CA" sz="2400" dirty="0"/>
+            </a:p>
+          </p:txBody>
+        </p:sp>
+        <p:sp>
+          <p:nvSpPr>
+            <p:cNvPr id="34" name="TextBox 33"/>
+            <p:cNvSpPr txBox="1"/>
+            <p:nvPr/>
+          </p:nvSpPr>
+          <p:spPr>
+            <a:xfrm>
+              <a:off x="8277402" y="4013168"/>
+              <a:ext cx="1526450" cy="830997"/>
+            </a:xfrm>
+            <a:prstGeom prst="rect">
+              <a:avLst/>
+            </a:prstGeom>
+            <a:noFill/>
+          </p:spPr>
+          <p:txBody>
+            <a:bodyPr wrap="square" rtlCol="0">
+              <a:spAutoFit/>
+            </a:bodyPr>
+            <a:lstStyle/>
+            <a:p>
+              <a:r>
+                <a:rPr lang="en-US" sz="2400" dirty="0" smtClean="0"/>
+                <a:t>Available behaviors</a:t>
+              </a:r>
+              <a:endParaRPr lang="en-CA" sz="2400" dirty="0"/>
+            </a:p>
+          </p:txBody>
+        </p:sp>
+        <p:sp>
+          <p:nvSpPr>
+            <p:cNvPr id="35" name="Bent-Up Arrow 34"/>
+            <p:cNvSpPr/>
+            <p:nvPr/>
+          </p:nvSpPr>
+          <p:spPr>
+            <a:xfrm rot="10800000" flipH="1">
+              <a:off x="6630483" y="2679494"/>
+              <a:ext cx="1646920" cy="390199"/>
+            </a:xfrm>
+            <a:prstGeom prst="bentUpArrow">
+              <a:avLst>
+                <a:gd name="adj1" fmla="val 41791"/>
+                <a:gd name="adj2" fmla="val 40392"/>
+                <a:gd name="adj3" fmla="val 41791"/>
+              </a:avLst>
+            </a:prstGeom>
+            <a:solidFill>
+              <a:schemeClr val="tx1"/>
+            </a:solidFill>
+            <a:ln>
+              <a:solidFill>
+                <a:schemeClr val="tx1"/>
+              </a:solidFill>
+            </a:ln>
+          </p:spPr>
+          <p:style>
+            <a:lnRef idx="2">
+              <a:schemeClr val="accent1">
+                <a:shade val="50000"/>
+              </a:schemeClr>
+            </a:lnRef>
+            <a:fillRef idx="1">
+              <a:schemeClr val="accent1"/>
+            </a:fillRef>
+            <a:effectRef idx="0">
+              <a:schemeClr val="accent1"/>
+            </a:effectRef>
+            <a:fontRef idx="minor">
+              <a:schemeClr val="lt1"/>
+            </a:fontRef>
+          </p:style>
+          <p:txBody>
+            <a:bodyPr rtlCol="0" anchor="ctr"/>
+            <a:lstStyle/>
+            <a:p>
+              <a:pPr algn="ctr"/>
+              <a:endParaRPr lang="en-CA"/>
+            </a:p>
+          </p:txBody>
+        </p:sp>
+        <p:sp>
+          <p:nvSpPr>
+            <p:cNvPr id="36" name="TextBox 35"/>
+            <p:cNvSpPr txBox="1"/>
+            <p:nvPr/>
+          </p:nvSpPr>
+          <p:spPr>
+            <a:xfrm>
+              <a:off x="9701734" y="2679495"/>
+              <a:ext cx="1526450" cy="830997"/>
+            </a:xfrm>
+            <a:prstGeom prst="rect">
+              <a:avLst/>
+            </a:prstGeom>
+            <a:noFill/>
+          </p:spPr>
+          <p:txBody>
+            <a:bodyPr wrap="square" rtlCol="0">
+              <a:spAutoFit/>
+            </a:bodyPr>
+            <a:lstStyle/>
+            <a:p>
+              <a:r>
+                <a:rPr lang="en-US" sz="2400" dirty="0" smtClean="0"/>
+                <a:t>Output behavior</a:t>
+              </a:r>
+              <a:endParaRPr lang="en-CA" sz="2400" dirty="0"/>
+            </a:p>
+          </p:txBody>
+        </p:sp>
+        <p:sp>
+          <p:nvSpPr>
+            <p:cNvPr id="37" name="Right Arrow 36"/>
+            <p:cNvSpPr/>
+            <p:nvPr/>
+          </p:nvSpPr>
+          <p:spPr>
+            <a:xfrm>
+              <a:off x="-563877" y="2567236"/>
+              <a:ext cx="2434986" cy="374468"/>
+            </a:xfrm>
+            <a:prstGeom prst="rightArrow">
+              <a:avLst/>
+            </a:prstGeom>
+            <a:solidFill>
+              <a:schemeClr val="tx1"/>
+            </a:solidFill>
+            <a:ln>
+              <a:solidFill>
+                <a:schemeClr val="tx1"/>
+              </a:solidFill>
+            </a:ln>
+          </p:spPr>
+          <p:style>
+            <a:lnRef idx="2">
+              <a:schemeClr val="accent1">
+                <a:shade val="50000"/>
+              </a:schemeClr>
+            </a:lnRef>
+            <a:fillRef idx="1">
+              <a:schemeClr val="accent1"/>
+            </a:fillRef>
+            <a:effectRef idx="0">
+              <a:schemeClr val="accent1"/>
+            </a:effectRef>
+            <a:fontRef idx="minor">
+              <a:schemeClr val="lt1"/>
+            </a:fontRef>
+          </p:style>
+          <p:txBody>
+            <a:bodyPr rtlCol="0" anchor="ctr"/>
+            <a:lstStyle/>
+            <a:p>
+              <a:pPr algn="ctr"/>
+              <a:endParaRPr lang="en-CA"/>
+            </a:p>
+          </p:txBody>
+        </p:sp>
+        <p:sp>
+          <p:nvSpPr>
+            <p:cNvPr id="38" name="TextBox 37"/>
+            <p:cNvSpPr txBox="1"/>
+            <p:nvPr/>
+          </p:nvSpPr>
+          <p:spPr>
+            <a:xfrm>
+              <a:off x="-249242" y="1878815"/>
+              <a:ext cx="1893616" cy="830997"/>
+            </a:xfrm>
+            <a:prstGeom prst="rect">
+              <a:avLst/>
+            </a:prstGeom>
+            <a:noFill/>
+          </p:spPr>
+          <p:txBody>
+            <a:bodyPr wrap="square" rtlCol="0">
+              <a:spAutoFit/>
+            </a:bodyPr>
+            <a:lstStyle/>
+            <a:p>
+              <a:r>
+                <a:rPr lang="en-US" sz="2400" dirty="0" smtClean="0"/>
+                <a:t>Environment information</a:t>
+              </a:r>
+              <a:endParaRPr lang="en-CA" sz="2400" dirty="0"/>
+            </a:p>
+          </p:txBody>
+        </p:sp>
+      </p:grpSp>
+    </p:spTree>
+    <p:extLst>
+      <p:ext uri="{BB962C8B-B14F-4D97-AF65-F5344CB8AC3E}">
+        <p14:creationId xmlns:p14="http://schemas.microsoft.com/office/powerpoint/2010/main" val="432915576"/>
+      </p:ext>
+    </p:extLst>
+  </p:cSld>
+  <p:clrMapOvr>
+    <a:masterClrMapping/>
+  </p:clrMapOvr>
+</p:sld>
+</file>
+
+<file path=ppt/slides/slide4.xml><?xml version="1.0" encoding="utf-8"?>
+<p:sld xmlns:a="http://schemas.openxmlformats.org/drawingml/2006/main" xmlns:r="http://schemas.openxmlformats.org/officeDocument/2006/relationships" xmlns:p="http://schemas.openxmlformats.org/presentationml/2006/main">
+  <p:cSld>
+    <p:spTree>
+      <p:nvGrpSpPr>
+        <p:cNvPr id="1" name=""/>
+        <p:cNvGrpSpPr/>
+        <p:nvPr/>
+      </p:nvGrpSpPr>
+      <p:grpSpPr>
+        <a:xfrm>
+          <a:off x="0" y="0"/>
+          <a:ext cx="0" cy="0"/>
+          <a:chOff x="0" y="0"/>
+          <a:chExt cx="0" cy="0"/>
+        </a:xfrm>
+      </p:grpSpPr>
       <p:sp>
         <p:nvSpPr>
-          <p:cNvPr id="3" name="Rounded Rectangle 2"/>
+          <p:cNvPr id="2" name="Rounded Rectangle 1"/>
           <p:cNvSpPr/>
           <p:nvPr/>
         </p:nvSpPr>
         <p:spPr>
           <a:xfrm>
             <a:off x="1497875" y="804870"/>
-            <a:ext cx="8168640" cy="5839769"/>
+            <a:ext cx="9335588" cy="5839769"/>
           </a:xfrm>
           <a:prstGeom prst="roundRect">
             <a:avLst/>
@@ -7085,13 +8388,13 @@
       </p:sp>
       <p:sp>
         <p:nvSpPr>
-          <p:cNvPr id="4" name="TextBox 3"/>
+          <p:cNvPr id="3" name="TextBox 2"/>
           <p:cNvSpPr txBox="1"/>
           <p:nvPr/>
         </p:nvSpPr>
         <p:spPr>
           <a:xfrm>
-            <a:off x="3270068" y="889367"/>
+            <a:off x="3992879" y="871950"/>
             <a:ext cx="4615544" cy="646331"/>
           </a:xfrm>
           <a:prstGeom prst="rect">
@@ -7114,266 +8417,141 @@
           </a:p>
         </p:txBody>
       </p:sp>
-      <p:sp>
-        <p:nvSpPr>
-          <p:cNvPr id="5" name="Rounded Rectangle 4"/>
-          <p:cNvSpPr/>
-          <p:nvPr/>
-        </p:nvSpPr>
-        <p:spPr>
-          <a:xfrm>
-            <a:off x="6932022" y="1698171"/>
-            <a:ext cx="2481943" cy="4659086"/>
-          </a:xfrm>
-          <a:prstGeom prst="roundRect">
-            <a:avLst/>
-          </a:prstGeom>
-          <a:noFill/>
-          <a:ln w="76200">
-            <a:solidFill>
-              <a:schemeClr val="tx1"/>
-            </a:solidFill>
-          </a:ln>
-        </p:spPr>
-        <p:style>
-          <a:lnRef idx="2">
-            <a:schemeClr val="accent1">
-              <a:shade val="50000"/>
-            </a:schemeClr>
-          </a:lnRef>
-          <a:fillRef idx="1">
-            <a:schemeClr val="accent1"/>
-          </a:fillRef>
-          <a:effectRef idx="0">
-            <a:schemeClr val="accent1"/>
-          </a:effectRef>
-          <a:fontRef idx="minor">
-            <a:schemeClr val="lt1"/>
-          </a:fontRef>
-        </p:style>
-        <p:txBody>
-          <a:bodyPr rtlCol="0" anchor="ctr"/>
-          <a:lstStyle/>
-          <a:p>
-            <a:pPr algn="ctr"/>
-            <a:endParaRPr lang="en-CA"/>
-          </a:p>
-        </p:txBody>
-      </p:sp>
-      <p:sp>
-        <p:nvSpPr>
-          <p:cNvPr id="6" name="Rounded Rectangle 5"/>
-          <p:cNvSpPr/>
-          <p:nvPr/>
-        </p:nvSpPr>
-        <p:spPr>
-          <a:xfrm>
-            <a:off x="4397830" y="1698171"/>
-            <a:ext cx="2368728" cy="4659086"/>
-          </a:xfrm>
-          <a:prstGeom prst="roundRect">
-            <a:avLst/>
-          </a:prstGeom>
-          <a:noFill/>
-          <a:ln w="76200">
-            <a:solidFill>
-              <a:schemeClr val="tx1"/>
-            </a:solidFill>
-          </a:ln>
-        </p:spPr>
-        <p:style>
-          <a:lnRef idx="2">
-            <a:schemeClr val="accent1">
-              <a:shade val="50000"/>
-            </a:schemeClr>
-          </a:lnRef>
-          <a:fillRef idx="1">
-            <a:schemeClr val="accent1"/>
-          </a:fillRef>
-          <a:effectRef idx="0">
-            <a:schemeClr val="accent1"/>
-          </a:effectRef>
-          <a:fontRef idx="minor">
-            <a:schemeClr val="lt1"/>
-          </a:fontRef>
-        </p:style>
-        <p:txBody>
-          <a:bodyPr rtlCol="0" anchor="ctr"/>
-          <a:lstStyle/>
-          <a:p>
-            <a:pPr algn="ctr"/>
-            <a:endParaRPr lang="en-CA"/>
-          </a:p>
-        </p:txBody>
-      </p:sp>
-      <p:sp>
-        <p:nvSpPr>
-          <p:cNvPr id="7" name="Rounded Rectangle 6"/>
-          <p:cNvSpPr/>
-          <p:nvPr/>
-        </p:nvSpPr>
-        <p:spPr>
-          <a:xfrm>
-            <a:off x="1863637" y="1698171"/>
-            <a:ext cx="2368728" cy="2072640"/>
-          </a:xfrm>
-          <a:prstGeom prst="roundRect">
-            <a:avLst/>
-          </a:prstGeom>
-          <a:noFill/>
-          <a:ln w="76200">
-            <a:solidFill>
-              <a:schemeClr val="tx1"/>
-            </a:solidFill>
-          </a:ln>
-        </p:spPr>
-        <p:style>
-          <a:lnRef idx="2">
-            <a:schemeClr val="accent1">
-              <a:shade val="50000"/>
-            </a:schemeClr>
-          </a:lnRef>
-          <a:fillRef idx="1">
-            <a:schemeClr val="accent1"/>
-          </a:fillRef>
-          <a:effectRef idx="0">
-            <a:schemeClr val="accent1"/>
-          </a:effectRef>
-          <a:fontRef idx="minor">
-            <a:schemeClr val="lt1"/>
-          </a:fontRef>
-        </p:style>
-        <p:txBody>
-          <a:bodyPr rtlCol="0" anchor="ctr"/>
-          <a:lstStyle/>
-          <a:p>
-            <a:pPr algn="ctr"/>
-            <a:endParaRPr lang="en-CA"/>
-          </a:p>
-        </p:txBody>
-      </p:sp>
-      <p:sp>
-        <p:nvSpPr>
-          <p:cNvPr id="8" name="TextBox 7"/>
-          <p:cNvSpPr txBox="1"/>
-          <p:nvPr/>
-        </p:nvSpPr>
-        <p:spPr>
-          <a:xfrm>
-            <a:off x="1981201" y="1677029"/>
-            <a:ext cx="2133599" cy="584775"/>
-          </a:xfrm>
-          <a:prstGeom prst="rect">
-            <a:avLst/>
-          </a:prstGeom>
-          <a:noFill/>
-        </p:spPr>
-        <p:txBody>
-          <a:bodyPr wrap="square" rtlCol="0" anchor="ctr">
-            <a:spAutoFit/>
-          </a:bodyPr>
-          <a:lstStyle/>
-          <a:p>
-            <a:pPr algn="ctr"/>
-            <a:r>
-              <a:rPr lang="en-US" sz="3200" dirty="0" smtClean="0"/>
-              <a:t>Perception</a:t>
-            </a:r>
-            <a:endParaRPr lang="en-CA" sz="3200" dirty="0"/>
-          </a:p>
-        </p:txBody>
-      </p:sp>
-      <p:sp>
-        <p:nvSpPr>
-          <p:cNvPr id="9" name="TextBox 8"/>
-          <p:cNvSpPr txBox="1"/>
-          <p:nvPr/>
-        </p:nvSpPr>
-        <p:spPr>
-          <a:xfrm>
-            <a:off x="4574177" y="1698171"/>
-            <a:ext cx="2133599" cy="584775"/>
-          </a:xfrm>
-          <a:prstGeom prst="rect">
-            <a:avLst/>
-          </a:prstGeom>
-          <a:noFill/>
-        </p:spPr>
-        <p:txBody>
-          <a:bodyPr wrap="square" rtlCol="0" anchor="ctr">
-            <a:spAutoFit/>
-          </a:bodyPr>
-          <a:lstStyle/>
-          <a:p>
-            <a:pPr algn="ctr"/>
-            <a:r>
-              <a:rPr lang="en-US" sz="3200" dirty="0" smtClean="0"/>
-              <a:t>Modelling</a:t>
-            </a:r>
-            <a:endParaRPr lang="en-CA" sz="3200" dirty="0"/>
-          </a:p>
-        </p:txBody>
-      </p:sp>
-      <p:sp>
-        <p:nvSpPr>
-          <p:cNvPr id="10" name="TextBox 9"/>
-          <p:cNvSpPr txBox="1"/>
-          <p:nvPr/>
-        </p:nvSpPr>
-        <p:spPr>
-          <a:xfrm>
-            <a:off x="7104284" y="1709539"/>
-            <a:ext cx="2133599" cy="584775"/>
-          </a:xfrm>
-          <a:prstGeom prst="rect">
-            <a:avLst/>
-          </a:prstGeom>
-          <a:noFill/>
-        </p:spPr>
-        <p:txBody>
-          <a:bodyPr wrap="square" rtlCol="0" anchor="ctr">
-            <a:spAutoFit/>
-          </a:bodyPr>
-          <a:lstStyle/>
-          <a:p>
-            <a:pPr algn="ctr"/>
-            <a:r>
-              <a:rPr lang="en-US" sz="3200" dirty="0" smtClean="0"/>
-              <a:t>Behavior</a:t>
-            </a:r>
-            <a:endParaRPr lang="en-CA" sz="3200" dirty="0"/>
-          </a:p>
-        </p:txBody>
-      </p:sp>
+    </p:spTree>
+    <p:extLst>
+      <p:ext uri="{BB962C8B-B14F-4D97-AF65-F5344CB8AC3E}">
+        <p14:creationId xmlns:p14="http://schemas.microsoft.com/office/powerpoint/2010/main" val="3270640923"/>
+      </p:ext>
+    </p:extLst>
+  </p:cSld>
+  <p:clrMapOvr>
+    <a:masterClrMapping/>
+  </p:clrMapOvr>
+</p:sld>
+</file>
+
+<file path=ppt/slides/slide5.xml><?xml version="1.0" encoding="utf-8"?>
+<p:sld xmlns:a="http://schemas.openxmlformats.org/drawingml/2006/main" xmlns:r="http://schemas.openxmlformats.org/officeDocument/2006/relationships" xmlns:p="http://schemas.openxmlformats.org/presentationml/2006/main">
+  <p:cSld>
+    <p:spTree>
+      <p:nvGrpSpPr>
+        <p:cNvPr id="1" name=""/>
+        <p:cNvGrpSpPr/>
+        <p:nvPr/>
+      </p:nvGrpSpPr>
+      <p:grpSpPr>
+        <a:xfrm>
+          <a:off x="0" y="0"/>
+          <a:ext cx="0" cy="0"/>
+          <a:chOff x="0" y="0"/>
+          <a:chExt cx="0" cy="0"/>
+        </a:xfrm>
+      </p:grpSpPr>
       <p:grpSp>
         <p:nvGrpSpPr>
-          <p:cNvPr id="11" name="Group 10"/>
+          <p:cNvPr id="38" name="Group 37"/>
           <p:cNvGrpSpPr/>
           <p:nvPr/>
         </p:nvGrpSpPr>
         <p:grpSpPr>
           <a:xfrm>
-            <a:off x="2016033" y="2544904"/>
-            <a:ext cx="2133599" cy="903691"/>
-            <a:chOff x="2016033" y="2544904"/>
-            <a:chExt cx="2133599" cy="903691"/>
+            <a:off x="3975100" y="1117600"/>
+            <a:ext cx="3530600" cy="5334000"/>
+            <a:chOff x="3975100" y="1117600"/>
+            <a:chExt cx="3530600" cy="5334000"/>
           </a:xfrm>
         </p:grpSpPr>
+        <p:cxnSp>
+          <p:nvCxnSpPr>
+            <p:cNvPr id="3" name="Elbow Connector 2"/>
+            <p:cNvCxnSpPr/>
+            <p:nvPr/>
+          </p:nvCxnSpPr>
+          <p:spPr>
+            <a:xfrm rot="5400000" flipH="1" flipV="1">
+              <a:off x="3930650" y="2876550"/>
+              <a:ext cx="5334000" cy="1816100"/>
+            </a:xfrm>
+            <a:prstGeom prst="bentConnector3">
+              <a:avLst>
+                <a:gd name="adj1" fmla="val 45000"/>
+              </a:avLst>
+            </a:prstGeom>
+            <a:ln w="76200">
+              <a:solidFill>
+                <a:schemeClr val="tx1"/>
+              </a:solidFill>
+            </a:ln>
+          </p:spPr>
+          <p:style>
+            <a:lnRef idx="1">
+              <a:schemeClr val="accent1"/>
+            </a:lnRef>
+            <a:fillRef idx="0">
+              <a:schemeClr val="accent1"/>
+            </a:fillRef>
+            <a:effectRef idx="0">
+              <a:schemeClr val="accent1"/>
+            </a:effectRef>
+            <a:fontRef idx="minor">
+              <a:schemeClr val="tx1"/>
+            </a:fontRef>
+          </p:style>
+        </p:cxnSp>
+        <p:cxnSp>
+          <p:nvCxnSpPr>
+            <p:cNvPr id="5" name="Elbow Connector 4"/>
+            <p:cNvCxnSpPr/>
+            <p:nvPr/>
+          </p:nvCxnSpPr>
+          <p:spPr>
+            <a:xfrm rot="5400000" flipH="1" flipV="1">
+              <a:off x="2241550" y="2876550"/>
+              <a:ext cx="5334000" cy="1816100"/>
+            </a:xfrm>
+            <a:prstGeom prst="bentConnector3">
+              <a:avLst>
+                <a:gd name="adj1" fmla="val 69762"/>
+              </a:avLst>
+            </a:prstGeom>
+            <a:ln w="76200">
+              <a:solidFill>
+                <a:schemeClr val="tx1"/>
+              </a:solidFill>
+            </a:ln>
+          </p:spPr>
+          <p:style>
+            <a:lnRef idx="1">
+              <a:schemeClr val="accent1"/>
+            </a:lnRef>
+            <a:fillRef idx="0">
+              <a:schemeClr val="accent1"/>
+            </a:fillRef>
+            <a:effectRef idx="0">
+              <a:schemeClr val="accent1"/>
+            </a:effectRef>
+            <a:fontRef idx="minor">
+              <a:schemeClr val="tx1"/>
+            </a:fontRef>
+          </p:style>
+        </p:cxnSp>
         <p:sp>
           <p:nvSpPr>
-            <p:cNvPr id="24" name="Rounded Rectangle 23"/>
+            <p:cNvPr id="15" name="Smiley Face 14"/>
             <p:cNvSpPr/>
             <p:nvPr/>
           </p:nvSpPr>
           <p:spPr>
-            <a:xfrm>
-              <a:off x="2016033" y="2544905"/>
-              <a:ext cx="2063934" cy="903690"/>
+            <a:xfrm rot="1526515">
+              <a:off x="4483650" y="4254173"/>
+              <a:ext cx="914400" cy="914400"/>
             </a:xfrm>
-            <a:prstGeom prst="roundRect">
+            <a:prstGeom prst="smileyFace">
               <a:avLst/>
             </a:prstGeom>
-            <a:noFill/>
+            <a:solidFill>
+              <a:srgbClr val="FFFF00"/>
+            </a:solidFill>
             <a:ln w="38100">
               <a:solidFill>
                 <a:schemeClr val="tx1"/>
@@ -7401,20 +8579,94 @@
             <a:lstStyle/>
             <a:p>
               <a:pPr algn="ctr"/>
-              <a:endParaRPr lang="en-CA" dirty="0"/>
+              <a:endParaRPr lang="en-CA"/>
             </a:p>
           </p:txBody>
         </p:sp>
+        <p:cxnSp>
+          <p:nvCxnSpPr>
+            <p:cNvPr id="17" name="Straight Connector 16"/>
+            <p:cNvCxnSpPr/>
+            <p:nvPr/>
+          </p:nvCxnSpPr>
+          <p:spPr>
+            <a:xfrm>
+              <a:off x="4908550" y="4762500"/>
+              <a:ext cx="2597150" cy="12700"/>
+            </a:xfrm>
+            <a:prstGeom prst="line">
+              <a:avLst/>
+            </a:prstGeom>
+            <a:ln w="38100">
+              <a:solidFill>
+                <a:schemeClr val="tx1"/>
+              </a:solidFill>
+              <a:prstDash val="sysDot"/>
+            </a:ln>
+          </p:spPr>
+          <p:style>
+            <a:lnRef idx="1">
+              <a:schemeClr val="accent1"/>
+            </a:lnRef>
+            <a:fillRef idx="0">
+              <a:schemeClr val="accent1"/>
+            </a:fillRef>
+            <a:effectRef idx="0">
+              <a:schemeClr val="accent1"/>
+            </a:effectRef>
+            <a:fontRef idx="minor">
+              <a:schemeClr val="tx1"/>
+            </a:fontRef>
+          </p:style>
+        </p:cxnSp>
+        <p:cxnSp>
+          <p:nvCxnSpPr>
+            <p:cNvPr id="18" name="Straight Connector 17"/>
+            <p:cNvCxnSpPr/>
+            <p:nvPr/>
+          </p:nvCxnSpPr>
+          <p:spPr>
+            <a:xfrm flipV="1">
+              <a:off x="6819900" y="4038600"/>
+              <a:ext cx="0" cy="736600"/>
+            </a:xfrm>
+            <a:prstGeom prst="line">
+              <a:avLst/>
+            </a:prstGeom>
+            <a:ln w="38100">
+              <a:solidFill>
+                <a:schemeClr val="tx1"/>
+              </a:solidFill>
+              <a:prstDash val="solid"/>
+              <a:headEnd type="arrow" w="med" len="med"/>
+              <a:tailEnd type="arrow" w="med" len="med"/>
+            </a:ln>
+          </p:spPr>
+          <p:style>
+            <a:lnRef idx="1">
+              <a:schemeClr val="accent1"/>
+            </a:lnRef>
+            <a:fillRef idx="0">
+              <a:schemeClr val="accent1"/>
+            </a:fillRef>
+            <a:effectRef idx="0">
+              <a:schemeClr val="accent1"/>
+            </a:effectRef>
+            <a:fontRef idx="minor">
+              <a:schemeClr val="tx1"/>
+            </a:fontRef>
+          </p:style>
+        </p:cxnSp>
         <p:sp>
           <p:nvSpPr>
-            <p:cNvPr id="25" name="TextBox 24"/>
+            <p:cNvPr id="22" name="TextBox 21"/>
             <p:cNvSpPr txBox="1"/>
             <p:nvPr/>
           </p:nvSpPr>
           <p:spPr>
             <a:xfrm>
-              <a:off x="2016033" y="2544904"/>
-              <a:ext cx="2133599" cy="830997"/>
+              <a:off x="6858000" y="4012874"/>
+              <a:ext cx="609600" cy="646331"/>
             </a:xfrm>
             <a:prstGeom prst="rect">
               <a:avLst/>
@@ -7422,70 +8674,134 @@
             <a:noFill/>
           </p:spPr>
           <p:txBody>
-            <a:bodyPr wrap="square" rtlCol="0" anchor="ctr">
+            <a:bodyPr wrap="square" rtlCol="0">
               <a:spAutoFit/>
             </a:bodyPr>
             <a:lstStyle/>
             <a:p>
-              <a:pPr algn="ctr"/>
               <a:r>
-                <a:rPr lang="en-US" sz="2400" dirty="0"/>
-                <a:t>Measurement type</a:t>
+                <a:rPr lang="en-US" sz="3600" dirty="0" smtClean="0"/>
+                <a:t>x</a:t>
               </a:r>
-              <a:endParaRPr lang="en-CA" sz="2400" dirty="0"/>
+              <a:r>
+                <a:rPr lang="en-US" sz="3600" baseline="-25000" dirty="0" smtClean="0"/>
+                <a:t>1</a:t>
+              </a:r>
+              <a:endParaRPr lang="en-CA" dirty="0"/>
             </a:p>
           </p:txBody>
         </p:sp>
-      </p:grpSp>
-      <p:grpSp>
-        <p:nvGrpSpPr>
-          <p:cNvPr id="12" name="Group 11"/>
-          <p:cNvGrpSpPr/>
-          <p:nvPr/>
-        </p:nvGrpSpPr>
-        <p:grpSpPr>
-          <a:xfrm>
-            <a:off x="4428313" y="2390775"/>
-            <a:ext cx="2279463" cy="894075"/>
-            <a:chOff x="1928952" y="2512682"/>
-            <a:chExt cx="2279463" cy="631384"/>
-          </a:xfrm>
-        </p:grpSpPr>
-        <p:sp>
-          <p:nvSpPr>
-            <p:cNvPr id="22" name="Rounded Rectangle 21"/>
-            <p:cNvSpPr/>
+        <p:cxnSp>
+          <p:nvCxnSpPr>
+            <p:cNvPr id="23" name="Straight Connector 22"/>
+            <p:cNvCxnSpPr/>
             <p:nvPr/>
-          </p:nvSpPr>
+          </p:nvCxnSpPr>
           <p:spPr>
-            <a:xfrm>
-              <a:off x="2020388" y="2512682"/>
-              <a:ext cx="2124892" cy="631384"/>
+            <a:xfrm flipV="1">
+              <a:off x="4908550" y="2730500"/>
+              <a:ext cx="19050" cy="3270577"/>
             </a:xfrm>
-            <a:prstGeom prst="roundRect">
+            <a:prstGeom prst="line">
               <a:avLst/>
             </a:prstGeom>
-            <a:noFill/>
             <a:ln w="38100">
               <a:solidFill>
                 <a:schemeClr val="tx1"/>
               </a:solidFill>
+              <a:prstDash val="sysDot"/>
             </a:ln>
           </p:spPr>
           <p:style>
-            <a:lnRef idx="2">
-              <a:schemeClr val="accent1">
-                <a:shade val="50000"/>
-              </a:schemeClr>
+            <a:lnRef idx="1">
+              <a:schemeClr val="accent1"/>
             </a:lnRef>
-            <a:fillRef idx="1">
+            <a:fillRef idx="0">
               <a:schemeClr val="accent1"/>
             </a:fillRef>
             <a:effectRef idx="0">
               <a:schemeClr val="accent1"/>
             </a:effectRef>
             <a:fontRef idx="minor">
-              <a:schemeClr val="lt1"/>
+              <a:schemeClr val="tx1"/>
+            </a:fontRef>
+          </p:style>
+        </p:cxnSp>
+        <p:cxnSp>
+          <p:nvCxnSpPr>
+            <p:cNvPr id="26" name="Straight Connector 25"/>
+            <p:cNvCxnSpPr/>
+            <p:nvPr/>
+          </p:nvCxnSpPr>
+          <p:spPr>
+            <a:xfrm flipV="1">
+              <a:off x="4965699" y="2971146"/>
+              <a:ext cx="915501" cy="1740228"/>
+            </a:xfrm>
+            <a:prstGeom prst="line">
+              <a:avLst/>
+            </a:prstGeom>
+            <a:ln w="38100">
+              <a:solidFill>
+                <a:schemeClr val="tx1"/>
+              </a:solidFill>
+              <a:prstDash val="sysDot"/>
+              <a:headEnd type="none" w="med" len="med"/>
+              <a:tailEnd type="triangle" w="lg" len="lg"/>
+            </a:ln>
+          </p:spPr>
+          <p:style>
+            <a:lnRef idx="1">
+              <a:schemeClr val="accent1"/>
+            </a:lnRef>
+            <a:fillRef idx="0">
+              <a:schemeClr val="accent1"/>
+            </a:fillRef>
+            <a:effectRef idx="0">
+              <a:schemeClr val="accent1"/>
+            </a:effectRef>
+            <a:fontRef idx="minor">
+              <a:schemeClr val="tx1"/>
+            </a:fontRef>
+          </p:style>
+        </p:cxnSp>
+        <p:sp>
+          <p:nvSpPr>
+            <p:cNvPr id="29" name="Arc 28"/>
+            <p:cNvSpPr/>
+            <p:nvPr/>
+          </p:nvSpPr>
+          <p:spPr>
+            <a:xfrm rot="21076896">
+              <a:off x="4522512" y="3227698"/>
+              <a:ext cx="1042634" cy="869218"/>
+            </a:xfrm>
+            <a:prstGeom prst="arc">
+              <a:avLst>
+                <a:gd name="adj1" fmla="val 16200000"/>
+                <a:gd name="adj2" fmla="val 77202"/>
+              </a:avLst>
+            </a:prstGeom>
+            <a:ln w="38100">
+              <a:solidFill>
+                <a:schemeClr val="tx1"/>
+              </a:solidFill>
+              <a:headEnd type="arrow" w="med" len="med"/>
+              <a:tailEnd type="arrow" w="med" len="med"/>
+            </a:ln>
+          </p:spPr>
+          <p:style>
+            <a:lnRef idx="1">
+              <a:schemeClr val="accent1"/>
+            </a:lnRef>
+            <a:fillRef idx="0">
+              <a:schemeClr val="accent1"/>
+            </a:fillRef>
+            <a:effectRef idx="0">
+              <a:schemeClr val="accent1"/>
+            </a:effectRef>
+            <a:fontRef idx="minor">
+              <a:schemeClr val="tx1"/>
             </a:fontRef>
           </p:style>
           <p:txBody>
@@ -7493,20 +8809,20 @@
             <a:lstStyle/>
             <a:p>
               <a:pPr algn="ctr"/>
-              <a:endParaRPr lang="en-CA" dirty="0"/>
+              <a:endParaRPr lang="en-CA"/>
             </a:p>
           </p:txBody>
         </p:sp>
         <p:sp>
           <p:nvSpPr>
-            <p:cNvPr id="23" name="TextBox 22"/>
+            <p:cNvPr id="30" name="TextBox 29"/>
             <p:cNvSpPr txBox="1"/>
             <p:nvPr/>
           </p:nvSpPr>
           <p:spPr>
             <a:xfrm>
-              <a:off x="1928952" y="2673159"/>
-              <a:ext cx="2279463" cy="241786"/>
+              <a:off x="5130250" y="2616885"/>
+              <a:ext cx="609600" cy="646331"/>
             </a:xfrm>
             <a:prstGeom prst="rect">
               <a:avLst/>
@@ -7514,91 +8830,107 @@
             <a:noFill/>
           </p:spPr>
           <p:txBody>
-            <a:bodyPr wrap="square" rtlCol="0" anchor="ctr">
+            <a:bodyPr wrap="square" rtlCol="0">
               <a:spAutoFit/>
             </a:bodyPr>
             <a:lstStyle/>
             <a:p>
-              <a:pPr algn="ctr"/>
               <a:r>
-                <a:rPr lang="en-US" sz="2400" dirty="0" smtClean="0"/>
-                <a:t>Features to model method</a:t>
+                <a:rPr lang="en-US" sz="3600" dirty="0" smtClean="0"/>
+                <a:t>x</a:t>
               </a:r>
-              <a:endParaRPr lang="en-CA" sz="2400" dirty="0"/>
+              <a:r>
+                <a:rPr lang="en-US" sz="3600" baseline="-25000" dirty="0"/>
+                <a:t>3</a:t>
+              </a:r>
+              <a:endParaRPr lang="en-CA" dirty="0"/>
             </a:p>
           </p:txBody>
         </p:sp>
-      </p:grpSp>
-      <p:grpSp>
-        <p:nvGrpSpPr>
-          <p:cNvPr id="13" name="Group 12"/>
-          <p:cNvGrpSpPr/>
-          <p:nvPr/>
-        </p:nvGrpSpPr>
-        <p:grpSpPr>
-          <a:xfrm>
-            <a:off x="4501244" y="4531792"/>
-            <a:ext cx="2133599" cy="1252920"/>
-            <a:chOff x="1968138" y="3606408"/>
-            <a:chExt cx="2133599" cy="1209677"/>
-          </a:xfrm>
-        </p:grpSpPr>
-        <p:sp>
-          <p:nvSpPr>
-            <p:cNvPr id="20" name="Rounded Rectangle 19"/>
-            <p:cNvSpPr/>
+        <p:cxnSp>
+          <p:nvCxnSpPr>
+            <p:cNvPr id="33" name="Straight Arrow Connector 32"/>
+            <p:cNvCxnSpPr/>
             <p:nvPr/>
-          </p:nvSpPr>
+          </p:nvCxnSpPr>
           <p:spPr>
             <a:xfrm>
-              <a:off x="2037637" y="3615756"/>
-              <a:ext cx="1994600" cy="1200329"/>
+              <a:off x="4927600" y="5727700"/>
+              <a:ext cx="762000" cy="0"/>
             </a:xfrm>
-            <a:prstGeom prst="roundRect">
+            <a:prstGeom prst="straightConnector1">
               <a:avLst/>
             </a:prstGeom>
-            <a:noFill/>
             <a:ln w="38100">
               <a:solidFill>
                 <a:schemeClr val="tx1"/>
               </a:solidFill>
+              <a:headEnd type="arrow" w="med" len="med"/>
+              <a:tailEnd type="arrow" w="med" len="med"/>
             </a:ln>
           </p:spPr>
           <p:style>
-            <a:lnRef idx="2">
-              <a:schemeClr val="accent1">
-                <a:shade val="50000"/>
-              </a:schemeClr>
+            <a:lnRef idx="1">
+              <a:schemeClr val="accent1"/>
             </a:lnRef>
-            <a:fillRef idx="1">
+            <a:fillRef idx="0">
               <a:schemeClr val="accent1"/>
             </a:fillRef>
             <a:effectRef idx="0">
               <a:schemeClr val="accent1"/>
             </a:effectRef>
             <a:fontRef idx="minor">
-              <a:schemeClr val="lt1"/>
+              <a:schemeClr val="tx1"/>
             </a:fontRef>
           </p:style>
-          <p:txBody>
-            <a:bodyPr rtlCol="0" anchor="ctr"/>
-            <a:lstStyle/>
-            <a:p>
-              <a:pPr algn="ctr"/>
-              <a:endParaRPr lang="en-CA" dirty="0"/>
-            </a:p>
-          </p:txBody>
-        </p:sp>
+        </p:cxnSp>
+        <p:cxnSp>
+          <p:nvCxnSpPr>
+            <p:cNvPr id="34" name="Straight Arrow Connector 33"/>
+            <p:cNvCxnSpPr/>
+            <p:nvPr/>
+          </p:nvCxnSpPr>
+          <p:spPr>
+            <a:xfrm>
+              <a:off x="3975100" y="5715000"/>
+              <a:ext cx="952500" cy="0"/>
+            </a:xfrm>
+            <a:prstGeom prst="straightConnector1">
+              <a:avLst/>
+            </a:prstGeom>
+            <a:ln w="38100">
+              <a:solidFill>
+                <a:schemeClr val="tx1"/>
+              </a:solidFill>
+              <a:headEnd type="arrow" w="med" len="med"/>
+              <a:tailEnd type="arrow" w="med" len="med"/>
+            </a:ln>
+          </p:spPr>
+          <p:style>
+            <a:lnRef idx="1">
+              <a:schemeClr val="accent1"/>
+            </a:lnRef>
+            <a:fillRef idx="0">
+              <a:schemeClr val="accent1"/>
+            </a:fillRef>
+            <a:effectRef idx="0">
+              <a:schemeClr val="accent1"/>
+            </a:effectRef>
+            <a:fontRef idx="minor">
+              <a:schemeClr val="tx1"/>
+            </a:fontRef>
+          </p:style>
+        </p:cxnSp>
         <p:sp>
           <p:nvSpPr>
-            <p:cNvPr id="21" name="TextBox 20"/>
+            <p:cNvPr id="36" name="TextBox 35"/>
             <p:cNvSpPr txBox="1"/>
             <p:nvPr/>
           </p:nvSpPr>
           <p:spPr>
             <a:xfrm>
-              <a:off x="1968138" y="3606408"/>
-              <a:ext cx="2133599" cy="1200329"/>
+              <a:off x="5041848" y="5059940"/>
+              <a:ext cx="609600" cy="646331"/>
             </a:xfrm>
             <a:prstGeom prst="rect">
               <a:avLst/>
@@ -7606,91 +8938,33 @@
             <a:noFill/>
           </p:spPr>
           <p:txBody>
-            <a:bodyPr wrap="square" rtlCol="0" anchor="ctr">
+            <a:bodyPr wrap="square" rtlCol="0">
               <a:spAutoFit/>
             </a:bodyPr>
             <a:lstStyle/>
             <a:p>
-              <a:pPr algn="ctr"/>
               <a:r>
-                <a:rPr lang="en-US" sz="2400" dirty="0" smtClean="0"/>
-                <a:t>Measurement to features method</a:t>
+                <a:rPr lang="en-US" sz="3600" dirty="0" smtClean="0"/>
+                <a:t>x</a:t>
               </a:r>
-              <a:endParaRPr lang="en-CA" sz="2400" dirty="0"/>
-            </a:p>
-          </p:txBody>
-        </p:sp>
-      </p:grpSp>
-      <p:grpSp>
-        <p:nvGrpSpPr>
-          <p:cNvPr id="14" name="Group 13"/>
-          <p:cNvGrpSpPr/>
-          <p:nvPr/>
-        </p:nvGrpSpPr>
-        <p:grpSpPr>
-          <a:xfrm>
-            <a:off x="7138576" y="4716895"/>
-            <a:ext cx="2065013" cy="1200329"/>
-            <a:chOff x="7138578" y="3456446"/>
-            <a:chExt cx="2065013" cy="1134654"/>
-          </a:xfrm>
-        </p:grpSpPr>
-        <p:sp>
-          <p:nvSpPr>
-            <p:cNvPr id="18" name="Rounded Rectangle 17"/>
-            <p:cNvSpPr/>
-            <p:nvPr/>
-          </p:nvSpPr>
-          <p:spPr>
-            <a:xfrm>
-              <a:off x="7138578" y="3456446"/>
-              <a:ext cx="2065013" cy="1134654"/>
-            </a:xfrm>
-            <a:prstGeom prst="roundRect">
-              <a:avLst/>
-            </a:prstGeom>
-            <a:noFill/>
-            <a:ln w="38100">
-              <a:solidFill>
-                <a:schemeClr val="tx1"/>
-              </a:solidFill>
-            </a:ln>
-          </p:spPr>
-          <p:style>
-            <a:lnRef idx="2">
-              <a:schemeClr val="accent1">
-                <a:shade val="50000"/>
-              </a:schemeClr>
-            </a:lnRef>
-            <a:fillRef idx="1">
-              <a:schemeClr val="accent1"/>
-            </a:fillRef>
-            <a:effectRef idx="0">
-              <a:schemeClr val="accent1"/>
-            </a:effectRef>
-            <a:fontRef idx="minor">
-              <a:schemeClr val="lt1"/>
-            </a:fontRef>
-          </p:style>
-          <p:txBody>
-            <a:bodyPr rtlCol="0" anchor="ctr"/>
-            <a:lstStyle/>
-            <a:p>
-              <a:pPr algn="ctr"/>
+              <a:r>
+                <a:rPr lang="en-US" sz="3600" baseline="-25000" dirty="0"/>
+                <a:t>2</a:t>
+              </a:r>
               <a:endParaRPr lang="en-CA" dirty="0"/>
             </a:p>
           </p:txBody>
         </p:sp>
         <p:sp>
           <p:nvSpPr>
-            <p:cNvPr id="19" name="TextBox 18"/>
+            <p:cNvPr id="37" name="TextBox 36"/>
             <p:cNvSpPr txBox="1"/>
             <p:nvPr/>
           </p:nvSpPr>
           <p:spPr>
             <a:xfrm>
-              <a:off x="7138578" y="3456446"/>
-              <a:ext cx="2049824" cy="1134654"/>
+              <a:off x="4191825" y="5059940"/>
+              <a:ext cx="609600" cy="646331"/>
             </a:xfrm>
             <a:prstGeom prst="rect">
               <a:avLst/>
@@ -7698,277 +8972,28 @@
             <a:noFill/>
           </p:spPr>
           <p:txBody>
-            <a:bodyPr wrap="square" rtlCol="0" anchor="ctr">
+            <a:bodyPr wrap="square" rtlCol="0">
               <a:spAutoFit/>
             </a:bodyPr>
             <a:lstStyle/>
             <a:p>
-              <a:pPr algn="ctr"/>
               <a:r>
-                <a:rPr lang="en-US" sz="2400" dirty="0" smtClean="0"/>
-                <a:t>Behaviors implementing functionality</a:t>
+                <a:rPr lang="en-US" sz="3600" dirty="0" smtClean="0"/>
+                <a:t>x</a:t>
               </a:r>
-              <a:endParaRPr lang="en-CA" sz="2400" dirty="0"/>
+              <a:r>
+                <a:rPr lang="en-US" sz="3600" baseline="-25000" dirty="0" smtClean="0"/>
+                <a:t>4</a:t>
+              </a:r>
+              <a:endParaRPr lang="en-CA" dirty="0"/>
             </a:p>
           </p:txBody>
         </p:sp>
       </p:grpSp>
-      <p:grpSp>
-        <p:nvGrpSpPr>
-          <p:cNvPr id="15" name="Group 14"/>
-          <p:cNvGrpSpPr/>
-          <p:nvPr/>
-        </p:nvGrpSpPr>
-        <p:grpSpPr>
-          <a:xfrm>
-            <a:off x="7012836" y="3023000"/>
-            <a:ext cx="2351328" cy="965209"/>
-            <a:chOff x="1994503" y="1843918"/>
-            <a:chExt cx="2351328" cy="965209"/>
-          </a:xfrm>
-        </p:grpSpPr>
-        <p:sp>
-          <p:nvSpPr>
-            <p:cNvPr id="16" name="Rounded Rectangle 15"/>
-            <p:cNvSpPr/>
-            <p:nvPr/>
-          </p:nvSpPr>
-          <p:spPr>
-            <a:xfrm>
-              <a:off x="2032908" y="1843918"/>
-              <a:ext cx="2259331" cy="965209"/>
-            </a:xfrm>
-            <a:prstGeom prst="roundRect">
-              <a:avLst/>
-            </a:prstGeom>
-            <a:noFill/>
-            <a:ln w="38100">
-              <a:solidFill>
-                <a:schemeClr val="tx1"/>
-              </a:solidFill>
-            </a:ln>
-          </p:spPr>
-          <p:style>
-            <a:lnRef idx="2">
-              <a:schemeClr val="accent1">
-                <a:shade val="50000"/>
-              </a:schemeClr>
-            </a:lnRef>
-            <a:fillRef idx="1">
-              <a:schemeClr val="accent1"/>
-            </a:fillRef>
-            <a:effectRef idx="0">
-              <a:schemeClr val="accent1"/>
-            </a:effectRef>
-            <a:fontRef idx="minor">
-              <a:schemeClr val="lt1"/>
-            </a:fontRef>
-          </p:style>
-          <p:txBody>
-            <a:bodyPr rtlCol="0" anchor="ctr"/>
-            <a:lstStyle/>
-            <a:p>
-              <a:pPr algn="ctr"/>
-              <a:endParaRPr lang="en-CA" dirty="0"/>
-            </a:p>
-          </p:txBody>
-        </p:sp>
-        <p:sp>
-          <p:nvSpPr>
-            <p:cNvPr id="17" name="TextBox 16"/>
-            <p:cNvSpPr txBox="1"/>
-            <p:nvPr/>
-          </p:nvSpPr>
-          <p:spPr>
-            <a:xfrm>
-              <a:off x="1994503" y="1887079"/>
-              <a:ext cx="2351328" cy="830997"/>
-            </a:xfrm>
-            <a:prstGeom prst="rect">
-              <a:avLst/>
-            </a:prstGeom>
-            <a:noFill/>
-          </p:spPr>
-          <p:txBody>
-            <a:bodyPr wrap="square" rtlCol="0" anchor="ctr">
-              <a:spAutoFit/>
-            </a:bodyPr>
-            <a:lstStyle/>
-            <a:p>
-              <a:pPr algn="ctr"/>
-              <a:r>
-                <a:rPr lang="en-US" sz="2400" dirty="0" smtClean="0"/>
-                <a:t>Model to behavior control</a:t>
-              </a:r>
-              <a:endParaRPr lang="en-CA" sz="2400" dirty="0"/>
-            </a:p>
-          </p:txBody>
-        </p:sp>
-      </p:grpSp>
-      <p:sp>
-        <p:nvSpPr>
-          <p:cNvPr id="26" name="Bent-Up Arrow 25"/>
-          <p:cNvSpPr/>
-          <p:nvPr/>
-        </p:nvSpPr>
-        <p:spPr>
-          <a:xfrm rot="5400000">
-            <a:off x="2715809" y="3648885"/>
-            <a:ext cx="2056494" cy="1653371"/>
-          </a:xfrm>
-          <a:prstGeom prst="bentUpArrow">
-            <a:avLst>
-              <a:gd name="adj1" fmla="val 12085"/>
-              <a:gd name="adj2" fmla="val 25000"/>
-              <a:gd name="adj3" fmla="val 21296"/>
-            </a:avLst>
-          </a:prstGeom>
-          <a:solidFill>
-            <a:schemeClr val="tx1"/>
-          </a:solidFill>
-          <a:ln>
-            <a:solidFill>
-              <a:schemeClr val="tx1"/>
-            </a:solidFill>
-          </a:ln>
-        </p:spPr>
-        <p:style>
-          <a:lnRef idx="2">
-            <a:schemeClr val="accent1">
-              <a:shade val="50000"/>
-            </a:schemeClr>
-          </a:lnRef>
-          <a:fillRef idx="1">
-            <a:schemeClr val="accent1"/>
-          </a:fillRef>
-          <a:effectRef idx="0">
-            <a:schemeClr val="accent1"/>
-          </a:effectRef>
-          <a:fontRef idx="minor">
-            <a:schemeClr val="lt1"/>
-          </a:fontRef>
-        </p:style>
-        <p:txBody>
-          <a:bodyPr rtlCol="0" anchor="ctr"/>
-          <a:lstStyle/>
-          <a:p>
-            <a:pPr algn="ctr"/>
-            <a:endParaRPr lang="en-CA"/>
-          </a:p>
-        </p:txBody>
-      </p:sp>
-      <p:sp>
-        <p:nvSpPr>
-          <p:cNvPr id="27" name="TextBox 26"/>
-          <p:cNvSpPr txBox="1"/>
-          <p:nvPr/>
-        </p:nvSpPr>
-        <p:spPr>
-          <a:xfrm>
-            <a:off x="1985265" y="5204624"/>
-            <a:ext cx="2211350" cy="461665"/>
-          </a:xfrm>
-          <a:prstGeom prst="rect">
-            <a:avLst/>
-          </a:prstGeom>
-          <a:noFill/>
-        </p:spPr>
-        <p:txBody>
-          <a:bodyPr wrap="square" rtlCol="0">
-            <a:spAutoFit/>
-          </a:bodyPr>
-          <a:lstStyle/>
-          <a:p>
-            <a:r>
-              <a:rPr lang="en-US" sz="2400" dirty="0" smtClean="0"/>
-              <a:t>Measurements</a:t>
-            </a:r>
-            <a:endParaRPr lang="en-CA" sz="2400" dirty="0"/>
-          </a:p>
-        </p:txBody>
-      </p:sp>
-      <p:sp>
-        <p:nvSpPr>
-          <p:cNvPr id="28" name="Up Arrow 27"/>
-          <p:cNvSpPr/>
-          <p:nvPr/>
-        </p:nvSpPr>
-        <p:spPr>
-          <a:xfrm>
-            <a:off x="6017623" y="3284850"/>
-            <a:ext cx="348343" cy="1246942"/>
-          </a:xfrm>
-          <a:prstGeom prst="upArrow">
-            <a:avLst/>
-          </a:prstGeom>
-          <a:solidFill>
-            <a:schemeClr val="tx1"/>
-          </a:solidFill>
-          <a:ln>
-            <a:solidFill>
-              <a:schemeClr val="tx1"/>
-            </a:solidFill>
-          </a:ln>
-        </p:spPr>
-        <p:style>
-          <a:lnRef idx="2">
-            <a:schemeClr val="accent1">
-              <a:shade val="50000"/>
-            </a:schemeClr>
-          </a:lnRef>
-          <a:fillRef idx="1">
-            <a:schemeClr val="accent1"/>
-          </a:fillRef>
-          <a:effectRef idx="0">
-            <a:schemeClr val="accent1"/>
-          </a:effectRef>
-          <a:fontRef idx="minor">
-            <a:schemeClr val="lt1"/>
-          </a:fontRef>
-        </p:style>
-        <p:txBody>
-          <a:bodyPr rtlCol="0" anchor="ctr"/>
-          <a:lstStyle/>
-          <a:p>
-            <a:pPr algn="ctr"/>
-            <a:endParaRPr lang="en-CA"/>
-          </a:p>
-        </p:txBody>
-      </p:sp>
-      <p:sp>
-        <p:nvSpPr>
-          <p:cNvPr id="29" name="TextBox 28"/>
-          <p:cNvSpPr txBox="1"/>
-          <p:nvPr/>
-        </p:nvSpPr>
-        <p:spPr>
-          <a:xfrm>
-            <a:off x="4881553" y="3649416"/>
-            <a:ext cx="1300276" cy="461665"/>
-          </a:xfrm>
-          <a:prstGeom prst="rect">
-            <a:avLst/>
-          </a:prstGeom>
-          <a:noFill/>
-        </p:spPr>
-        <p:txBody>
-          <a:bodyPr wrap="square" rtlCol="0">
-            <a:spAutoFit/>
-          </a:bodyPr>
-          <a:lstStyle/>
-          <a:p>
-            <a:r>
-              <a:rPr lang="en-US" sz="2400" dirty="0" smtClean="0"/>
-              <a:t>Features</a:t>
-            </a:r>
-            <a:endParaRPr lang="en-CA" sz="2400" dirty="0"/>
-          </a:p>
-        </p:txBody>
-      </p:sp>
     </p:spTree>
     <p:extLst>
       <p:ext uri="{BB962C8B-B14F-4D97-AF65-F5344CB8AC3E}">
-        <p14:creationId xmlns:p14="http://schemas.microsoft.com/office/powerpoint/2010/main" val="432915576"/>
+        <p14:creationId xmlns:p14="http://schemas.microsoft.com/office/powerpoint/2010/main" val="4038908149"/>
       </p:ext>
     </p:extLst>
   </p:cSld>
@@ -7978,7 +9003,7 @@
 </p:sld>
 </file>
 
-<file path=ppt/slides/slide4.xml><?xml version="1.0" encoding="utf-8"?>
+<file path=ppt/slides/slide6.xml><?xml version="1.0" encoding="utf-8"?>
 <p:sld xmlns:a="http://schemas.openxmlformats.org/drawingml/2006/main" xmlns:r="http://schemas.openxmlformats.org/officeDocument/2006/relationships" xmlns:p="http://schemas.openxmlformats.org/presentationml/2006/main">
   <p:cSld>
     <p:spTree>

</xml_diff>

<commit_message>
CISC 870 Paper at 4000 words, assignment complete
</commit_message>
<xml_diff>
--- a/CISC870/Paper/FigureCreation.pptx
+++ b/CISC870/Paper/FigureCreation.pptx
@@ -5,7 +5,7 @@
     <p:sldMasterId id="2147483648" r:id="rId1"/>
   </p:sldMasterIdLst>
   <p:notesMasterIdLst>
-    <p:notesMasterId r:id="rId9"/>
+    <p:notesMasterId r:id="rId11"/>
   </p:notesMasterIdLst>
   <p:sldIdLst>
     <p:sldId id="256" r:id="rId2"/>
@@ -14,7 +14,9 @@
     <p:sldId id="261" r:id="rId5"/>
     <p:sldId id="262" r:id="rId6"/>
     <p:sldId id="263" r:id="rId7"/>
-    <p:sldId id="258" r:id="rId8"/>
+    <p:sldId id="264" r:id="rId8"/>
+    <p:sldId id="265" r:id="rId9"/>
+    <p:sldId id="258" r:id="rId10"/>
   </p:sldIdLst>
   <p:sldSz cx="12192000" cy="6858000"/>
   <p:notesSz cx="6858000" cy="9144000"/>
@@ -3223,7 +3225,7 @@
           <a:p>
             <a:fld id="{28CF0C2E-4A98-4521-9983-6C8A16919F1D}" type="datetimeFigureOut">
               <a:rPr lang="en-CA" smtClean="0"/>
-              <a:t>2017-04-11</a:t>
+              <a:t>2017-04-13</a:t>
             </a:fld>
             <a:endParaRPr lang="en-CA"/>
           </a:p>
@@ -3706,7 +3708,7 @@
           <a:p>
             <a:fld id="{E3F1F95A-29A3-4187-BF3A-74A3882354E7}" type="datetimeFigureOut">
               <a:rPr lang="en-US" smtClean="0"/>
-              <a:t>4/11/2017</a:t>
+              <a:t>4/13/2017</a:t>
             </a:fld>
             <a:endParaRPr lang="en-US"/>
           </a:p>
@@ -3876,7 +3878,7 @@
           <a:p>
             <a:fld id="{E3F1F95A-29A3-4187-BF3A-74A3882354E7}" type="datetimeFigureOut">
               <a:rPr lang="en-US" smtClean="0"/>
-              <a:t>4/11/2017</a:t>
+              <a:t>4/13/2017</a:t>
             </a:fld>
             <a:endParaRPr lang="en-US"/>
           </a:p>
@@ -4056,7 +4058,7 @@
           <a:p>
             <a:fld id="{E3F1F95A-29A3-4187-BF3A-74A3882354E7}" type="datetimeFigureOut">
               <a:rPr lang="en-US" smtClean="0"/>
-              <a:t>4/11/2017</a:t>
+              <a:t>4/13/2017</a:t>
             </a:fld>
             <a:endParaRPr lang="en-US"/>
           </a:p>
@@ -4226,7 +4228,7 @@
           <a:p>
             <a:fld id="{E3F1F95A-29A3-4187-BF3A-74A3882354E7}" type="datetimeFigureOut">
               <a:rPr lang="en-US" smtClean="0"/>
-              <a:t>4/11/2017</a:t>
+              <a:t>4/13/2017</a:t>
             </a:fld>
             <a:endParaRPr lang="en-US"/>
           </a:p>
@@ -4472,7 +4474,7 @@
           <a:p>
             <a:fld id="{E3F1F95A-29A3-4187-BF3A-74A3882354E7}" type="datetimeFigureOut">
               <a:rPr lang="en-US" smtClean="0"/>
-              <a:t>4/11/2017</a:t>
+              <a:t>4/13/2017</a:t>
             </a:fld>
             <a:endParaRPr lang="en-US"/>
           </a:p>
@@ -4704,7 +4706,7 @@
           <a:p>
             <a:fld id="{E3F1F95A-29A3-4187-BF3A-74A3882354E7}" type="datetimeFigureOut">
               <a:rPr lang="en-US" smtClean="0"/>
-              <a:t>4/11/2017</a:t>
+              <a:t>4/13/2017</a:t>
             </a:fld>
             <a:endParaRPr lang="en-US"/>
           </a:p>
@@ -5071,7 +5073,7 @@
           <a:p>
             <a:fld id="{E3F1F95A-29A3-4187-BF3A-74A3882354E7}" type="datetimeFigureOut">
               <a:rPr lang="en-US" smtClean="0"/>
-              <a:t>4/11/2017</a:t>
+              <a:t>4/13/2017</a:t>
             </a:fld>
             <a:endParaRPr lang="en-US"/>
           </a:p>
@@ -5189,7 +5191,7 @@
           <a:p>
             <a:fld id="{E3F1F95A-29A3-4187-BF3A-74A3882354E7}" type="datetimeFigureOut">
               <a:rPr lang="en-US" smtClean="0"/>
-              <a:t>4/11/2017</a:t>
+              <a:t>4/13/2017</a:t>
             </a:fld>
             <a:endParaRPr lang="en-US"/>
           </a:p>
@@ -5284,7 +5286,7 @@
           <a:p>
             <a:fld id="{E3F1F95A-29A3-4187-BF3A-74A3882354E7}" type="datetimeFigureOut">
               <a:rPr lang="en-US" smtClean="0"/>
-              <a:t>4/11/2017</a:t>
+              <a:t>4/13/2017</a:t>
             </a:fld>
             <a:endParaRPr lang="en-US"/>
           </a:p>
@@ -5561,7 +5563,7 @@
           <a:p>
             <a:fld id="{E3F1F95A-29A3-4187-BF3A-74A3882354E7}" type="datetimeFigureOut">
               <a:rPr lang="en-US" smtClean="0"/>
-              <a:t>4/11/2017</a:t>
+              <a:t>4/13/2017</a:t>
             </a:fld>
             <a:endParaRPr lang="en-US"/>
           </a:p>
@@ -5814,7 +5816,7 @@
           <a:p>
             <a:fld id="{E3F1F95A-29A3-4187-BF3A-74A3882354E7}" type="datetimeFigureOut">
               <a:rPr lang="en-US" smtClean="0"/>
-              <a:t>4/11/2017</a:t>
+              <a:t>4/13/2017</a:t>
             </a:fld>
             <a:endParaRPr lang="en-US"/>
           </a:p>
@@ -6027,7 +6029,7 @@
           <a:p>
             <a:fld id="{E3F1F95A-29A3-4187-BF3A-74A3882354E7}" type="datetimeFigureOut">
               <a:rPr lang="en-US" smtClean="0"/>
-              <a:t>4/11/2017</a:t>
+              <a:t>4/13/2017</a:t>
             </a:fld>
             <a:endParaRPr lang="en-US"/>
           </a:p>
@@ -13829,6 +13831,1409 @@
           <a:chExt cx="0" cy="0"/>
         </a:xfrm>
       </p:grpSpPr>
+      <p:grpSp>
+        <p:nvGrpSpPr>
+          <p:cNvPr id="2" name="Group 1"/>
+          <p:cNvGrpSpPr/>
+          <p:nvPr/>
+        </p:nvGrpSpPr>
+        <p:grpSpPr>
+          <a:xfrm>
+            <a:off x="3022619" y="2220686"/>
+            <a:ext cx="4153244" cy="2639608"/>
+            <a:chOff x="3022619" y="2220686"/>
+            <a:chExt cx="4153244" cy="2639608"/>
+          </a:xfrm>
+        </p:grpSpPr>
+        <p:sp>
+          <p:nvSpPr>
+            <p:cNvPr id="10" name="Rectangle 9"/>
+            <p:cNvSpPr/>
+            <p:nvPr/>
+          </p:nvSpPr>
+          <p:spPr>
+            <a:xfrm>
+              <a:off x="4594127" y="3666764"/>
+              <a:ext cx="148045" cy="383177"/>
+            </a:xfrm>
+            <a:prstGeom prst="rect">
+              <a:avLst/>
+            </a:prstGeom>
+            <a:solidFill>
+              <a:schemeClr val="tx1"/>
+            </a:solidFill>
+            <a:ln>
+              <a:solidFill>
+                <a:schemeClr val="tx1"/>
+              </a:solidFill>
+            </a:ln>
+          </p:spPr>
+          <p:style>
+            <a:lnRef idx="2">
+              <a:schemeClr val="accent1">
+                <a:shade val="50000"/>
+              </a:schemeClr>
+            </a:lnRef>
+            <a:fillRef idx="1">
+              <a:schemeClr val="accent1"/>
+            </a:fillRef>
+            <a:effectRef idx="0">
+              <a:schemeClr val="accent1"/>
+            </a:effectRef>
+            <a:fontRef idx="minor">
+              <a:schemeClr val="lt1"/>
+            </a:fontRef>
+          </p:style>
+          <p:txBody>
+            <a:bodyPr rtlCol="0" anchor="ctr"/>
+            <a:lstStyle/>
+            <a:p>
+              <a:pPr algn="ctr"/>
+              <a:endParaRPr lang="en-CA"/>
+            </a:p>
+          </p:txBody>
+        </p:sp>
+        <p:sp>
+          <p:nvSpPr>
+            <p:cNvPr id="11" name="Rectangle 10"/>
+            <p:cNvSpPr/>
+            <p:nvPr/>
+          </p:nvSpPr>
+          <p:spPr>
+            <a:xfrm>
+              <a:off x="4594127" y="4476206"/>
+              <a:ext cx="148045" cy="383177"/>
+            </a:xfrm>
+            <a:prstGeom prst="rect">
+              <a:avLst/>
+            </a:prstGeom>
+            <a:solidFill>
+              <a:schemeClr val="tx1"/>
+            </a:solidFill>
+            <a:ln>
+              <a:solidFill>
+                <a:schemeClr val="tx1"/>
+              </a:solidFill>
+            </a:ln>
+          </p:spPr>
+          <p:style>
+            <a:lnRef idx="2">
+              <a:schemeClr val="accent1">
+                <a:shade val="50000"/>
+              </a:schemeClr>
+            </a:lnRef>
+            <a:fillRef idx="1">
+              <a:schemeClr val="accent1"/>
+            </a:fillRef>
+            <a:effectRef idx="0">
+              <a:schemeClr val="accent1"/>
+            </a:effectRef>
+            <a:fontRef idx="minor">
+              <a:schemeClr val="lt1"/>
+            </a:fontRef>
+          </p:style>
+          <p:txBody>
+            <a:bodyPr rtlCol="0" anchor="ctr"/>
+            <a:lstStyle/>
+            <a:p>
+              <a:pPr algn="ctr"/>
+              <a:endParaRPr lang="en-CA"/>
+            </a:p>
+          </p:txBody>
+        </p:sp>
+        <p:sp>
+          <p:nvSpPr>
+            <p:cNvPr id="9" name="Rectangle 8"/>
+            <p:cNvSpPr/>
+            <p:nvPr/>
+          </p:nvSpPr>
+          <p:spPr>
+            <a:xfrm>
+              <a:off x="5495109" y="3666764"/>
+              <a:ext cx="148045" cy="383177"/>
+            </a:xfrm>
+            <a:prstGeom prst="rect">
+              <a:avLst/>
+            </a:prstGeom>
+            <a:solidFill>
+              <a:schemeClr val="tx1"/>
+            </a:solidFill>
+            <a:ln>
+              <a:solidFill>
+                <a:schemeClr val="tx1"/>
+              </a:solidFill>
+            </a:ln>
+          </p:spPr>
+          <p:style>
+            <a:lnRef idx="2">
+              <a:schemeClr val="accent1">
+                <a:shade val="50000"/>
+              </a:schemeClr>
+            </a:lnRef>
+            <a:fillRef idx="1">
+              <a:schemeClr val="accent1"/>
+            </a:fillRef>
+            <a:effectRef idx="0">
+              <a:schemeClr val="accent1"/>
+            </a:effectRef>
+            <a:fontRef idx="minor">
+              <a:schemeClr val="lt1"/>
+            </a:fontRef>
+          </p:style>
+          <p:txBody>
+            <a:bodyPr rtlCol="0" anchor="ctr"/>
+            <a:lstStyle/>
+            <a:p>
+              <a:pPr algn="ctr"/>
+              <a:endParaRPr lang="en-CA"/>
+            </a:p>
+          </p:txBody>
+        </p:sp>
+        <p:sp>
+          <p:nvSpPr>
+            <p:cNvPr id="8" name="Rectangle 7"/>
+            <p:cNvSpPr/>
+            <p:nvPr/>
+          </p:nvSpPr>
+          <p:spPr>
+            <a:xfrm>
+              <a:off x="5495109" y="4476206"/>
+              <a:ext cx="148045" cy="383177"/>
+            </a:xfrm>
+            <a:prstGeom prst="rect">
+              <a:avLst/>
+            </a:prstGeom>
+            <a:solidFill>
+              <a:schemeClr val="tx1"/>
+            </a:solidFill>
+            <a:ln>
+              <a:solidFill>
+                <a:schemeClr val="tx1"/>
+              </a:solidFill>
+            </a:ln>
+          </p:spPr>
+          <p:style>
+            <a:lnRef idx="2">
+              <a:schemeClr val="accent1">
+                <a:shade val="50000"/>
+              </a:schemeClr>
+            </a:lnRef>
+            <a:fillRef idx="1">
+              <a:schemeClr val="accent1"/>
+            </a:fillRef>
+            <a:effectRef idx="0">
+              <a:schemeClr val="accent1"/>
+            </a:effectRef>
+            <a:fontRef idx="minor">
+              <a:schemeClr val="lt1"/>
+            </a:fontRef>
+          </p:style>
+          <p:txBody>
+            <a:bodyPr rtlCol="0" anchor="ctr"/>
+            <a:lstStyle/>
+            <a:p>
+              <a:pPr algn="ctr"/>
+              <a:endParaRPr lang="en-CA"/>
+            </a:p>
+          </p:txBody>
+        </p:sp>
+        <p:sp>
+          <p:nvSpPr>
+            <p:cNvPr id="12" name="Oval 11"/>
+            <p:cNvSpPr/>
+            <p:nvPr/>
+          </p:nvSpPr>
+          <p:spPr>
+            <a:xfrm>
+              <a:off x="4775623" y="3540718"/>
+              <a:ext cx="326217" cy="165918"/>
+            </a:xfrm>
+            <a:prstGeom prst="ellipse">
+              <a:avLst/>
+            </a:prstGeom>
+            <a:solidFill>
+              <a:srgbClr val="FFC000"/>
+            </a:solidFill>
+            <a:ln w="19050">
+              <a:solidFill>
+                <a:schemeClr val="tx1"/>
+              </a:solidFill>
+            </a:ln>
+          </p:spPr>
+          <p:style>
+            <a:lnRef idx="2">
+              <a:schemeClr val="accent1">
+                <a:shade val="50000"/>
+              </a:schemeClr>
+            </a:lnRef>
+            <a:fillRef idx="1">
+              <a:schemeClr val="accent1"/>
+            </a:fillRef>
+            <a:effectRef idx="0">
+              <a:schemeClr val="accent1"/>
+            </a:effectRef>
+            <a:fontRef idx="minor">
+              <a:schemeClr val="lt1"/>
+            </a:fontRef>
+          </p:style>
+          <p:txBody>
+            <a:bodyPr rtlCol="0" anchor="ctr"/>
+            <a:lstStyle/>
+            <a:p>
+              <a:pPr algn="ctr"/>
+              <a:endParaRPr lang="en-CA"/>
+            </a:p>
+          </p:txBody>
+        </p:sp>
+        <p:sp>
+          <p:nvSpPr>
+            <p:cNvPr id="13" name="Oval 12"/>
+            <p:cNvSpPr/>
+            <p:nvPr/>
+          </p:nvSpPr>
+          <p:spPr>
+            <a:xfrm>
+              <a:off x="5137793" y="3540718"/>
+              <a:ext cx="326217" cy="165918"/>
+            </a:xfrm>
+            <a:prstGeom prst="ellipse">
+              <a:avLst/>
+            </a:prstGeom>
+            <a:solidFill>
+              <a:srgbClr val="FFC000"/>
+            </a:solidFill>
+            <a:ln w="19050">
+              <a:solidFill>
+                <a:schemeClr val="tx1"/>
+              </a:solidFill>
+            </a:ln>
+          </p:spPr>
+          <p:style>
+            <a:lnRef idx="2">
+              <a:schemeClr val="accent1">
+                <a:shade val="50000"/>
+              </a:schemeClr>
+            </a:lnRef>
+            <a:fillRef idx="1">
+              <a:schemeClr val="accent1"/>
+            </a:fillRef>
+            <a:effectRef idx="0">
+              <a:schemeClr val="accent1"/>
+            </a:effectRef>
+            <a:fontRef idx="minor">
+              <a:schemeClr val="lt1"/>
+            </a:fontRef>
+          </p:style>
+          <p:txBody>
+            <a:bodyPr rtlCol="0" anchor="ctr"/>
+            <a:lstStyle/>
+            <a:p>
+              <a:pPr algn="ctr"/>
+              <a:endParaRPr lang="en-CA"/>
+            </a:p>
+          </p:txBody>
+        </p:sp>
+        <p:sp>
+          <p:nvSpPr>
+            <p:cNvPr id="7" name="Rectangle 6"/>
+            <p:cNvSpPr/>
+            <p:nvPr/>
+          </p:nvSpPr>
+          <p:spPr>
+            <a:xfrm>
+              <a:off x="4687566" y="3623677"/>
+              <a:ext cx="862149" cy="1236617"/>
+            </a:xfrm>
+            <a:prstGeom prst="rect">
+              <a:avLst/>
+            </a:prstGeom>
+            <a:solidFill>
+              <a:srgbClr val="00B0F0"/>
+            </a:solidFill>
+            <a:ln w="28575">
+              <a:solidFill>
+                <a:schemeClr val="tx1"/>
+              </a:solidFill>
+            </a:ln>
+          </p:spPr>
+          <p:style>
+            <a:lnRef idx="2">
+              <a:schemeClr val="accent1">
+                <a:shade val="50000"/>
+              </a:schemeClr>
+            </a:lnRef>
+            <a:fillRef idx="1">
+              <a:schemeClr val="accent1"/>
+            </a:fillRef>
+            <a:effectRef idx="0">
+              <a:schemeClr val="accent1"/>
+            </a:effectRef>
+            <a:fontRef idx="minor">
+              <a:schemeClr val="lt1"/>
+            </a:fontRef>
+          </p:style>
+          <p:txBody>
+            <a:bodyPr rtlCol="0" anchor="ctr"/>
+            <a:lstStyle/>
+            <a:p>
+              <a:pPr algn="ctr"/>
+              <a:endParaRPr lang="en-CA"/>
+            </a:p>
+          </p:txBody>
+        </p:sp>
+        <p:cxnSp>
+          <p:nvCxnSpPr>
+            <p:cNvPr id="15" name="Straight Connector 14"/>
+            <p:cNvCxnSpPr/>
+            <p:nvPr/>
+          </p:nvCxnSpPr>
+          <p:spPr>
+            <a:xfrm flipH="1" flipV="1">
+              <a:off x="4668149" y="2220686"/>
+              <a:ext cx="19417" cy="1402991"/>
+            </a:xfrm>
+            <a:prstGeom prst="line">
+              <a:avLst/>
+            </a:prstGeom>
+            <a:ln w="38100">
+              <a:solidFill>
+                <a:schemeClr val="tx1"/>
+              </a:solidFill>
+              <a:prstDash val="sysDot"/>
+            </a:ln>
+          </p:spPr>
+          <p:style>
+            <a:lnRef idx="1">
+              <a:schemeClr val="accent1"/>
+            </a:lnRef>
+            <a:fillRef idx="0">
+              <a:schemeClr val="accent1"/>
+            </a:fillRef>
+            <a:effectRef idx="0">
+              <a:schemeClr val="accent1"/>
+            </a:effectRef>
+            <a:fontRef idx="minor">
+              <a:schemeClr val="tx1"/>
+            </a:fontRef>
+          </p:style>
+        </p:cxnSp>
+        <p:cxnSp>
+          <p:nvCxnSpPr>
+            <p:cNvPr id="16" name="Straight Connector 15"/>
+            <p:cNvCxnSpPr/>
+            <p:nvPr/>
+          </p:nvCxnSpPr>
+          <p:spPr>
+            <a:xfrm flipH="1" flipV="1">
+              <a:off x="5538651" y="2220686"/>
+              <a:ext cx="11064" cy="1402991"/>
+            </a:xfrm>
+            <a:prstGeom prst="line">
+              <a:avLst/>
+            </a:prstGeom>
+            <a:ln w="38100">
+              <a:solidFill>
+                <a:schemeClr val="tx1"/>
+              </a:solidFill>
+              <a:prstDash val="sysDot"/>
+            </a:ln>
+          </p:spPr>
+          <p:style>
+            <a:lnRef idx="1">
+              <a:schemeClr val="accent1"/>
+            </a:lnRef>
+            <a:fillRef idx="0">
+              <a:schemeClr val="accent1"/>
+            </a:fillRef>
+            <a:effectRef idx="0">
+              <a:schemeClr val="accent1"/>
+            </a:effectRef>
+            <a:fontRef idx="minor">
+              <a:schemeClr val="tx1"/>
+            </a:fontRef>
+          </p:style>
+        </p:cxnSp>
+        <p:cxnSp>
+          <p:nvCxnSpPr>
+            <p:cNvPr id="17" name="Straight Connector 16"/>
+            <p:cNvCxnSpPr/>
+            <p:nvPr/>
+          </p:nvCxnSpPr>
+          <p:spPr>
+            <a:xfrm flipV="1">
+              <a:off x="5549715" y="2365516"/>
+              <a:ext cx="851084" cy="1258162"/>
+            </a:xfrm>
+            <a:prstGeom prst="line">
+              <a:avLst/>
+            </a:prstGeom>
+            <a:ln w="38100">
+              <a:solidFill>
+                <a:schemeClr val="tx1"/>
+              </a:solidFill>
+              <a:prstDash val="sysDot"/>
+            </a:ln>
+          </p:spPr>
+          <p:style>
+            <a:lnRef idx="1">
+              <a:schemeClr val="accent1"/>
+            </a:lnRef>
+            <a:fillRef idx="0">
+              <a:schemeClr val="accent1"/>
+            </a:fillRef>
+            <a:effectRef idx="0">
+              <a:schemeClr val="accent1"/>
+            </a:effectRef>
+            <a:fontRef idx="minor">
+              <a:schemeClr val="tx1"/>
+            </a:fontRef>
+          </p:style>
+        </p:cxnSp>
+        <p:cxnSp>
+          <p:nvCxnSpPr>
+            <p:cNvPr id="20" name="Straight Connector 19"/>
+            <p:cNvCxnSpPr/>
+            <p:nvPr/>
+          </p:nvCxnSpPr>
+          <p:spPr>
+            <a:xfrm flipV="1">
+              <a:off x="5549714" y="2823896"/>
+              <a:ext cx="1524354" cy="799782"/>
+            </a:xfrm>
+            <a:prstGeom prst="line">
+              <a:avLst/>
+            </a:prstGeom>
+            <a:ln w="38100">
+              <a:solidFill>
+                <a:schemeClr val="tx1"/>
+              </a:solidFill>
+              <a:prstDash val="sysDot"/>
+            </a:ln>
+          </p:spPr>
+          <p:style>
+            <a:lnRef idx="1">
+              <a:schemeClr val="accent1"/>
+            </a:lnRef>
+            <a:fillRef idx="0">
+              <a:schemeClr val="accent1"/>
+            </a:fillRef>
+            <a:effectRef idx="0">
+              <a:schemeClr val="accent1"/>
+            </a:effectRef>
+            <a:fontRef idx="minor">
+              <a:schemeClr val="tx1"/>
+            </a:fontRef>
+          </p:style>
+        </p:cxnSp>
+        <p:cxnSp>
+          <p:nvCxnSpPr>
+            <p:cNvPr id="23" name="Straight Connector 22"/>
+            <p:cNvCxnSpPr/>
+            <p:nvPr/>
+          </p:nvCxnSpPr>
+          <p:spPr>
+            <a:xfrm flipV="1">
+              <a:off x="5549713" y="3616917"/>
+              <a:ext cx="1626150" cy="6761"/>
+            </a:xfrm>
+            <a:prstGeom prst="line">
+              <a:avLst/>
+            </a:prstGeom>
+            <a:ln w="38100">
+              <a:solidFill>
+                <a:schemeClr val="tx1"/>
+              </a:solidFill>
+              <a:prstDash val="sysDot"/>
+            </a:ln>
+          </p:spPr>
+          <p:style>
+            <a:lnRef idx="1">
+              <a:schemeClr val="accent1"/>
+            </a:lnRef>
+            <a:fillRef idx="0">
+              <a:schemeClr val="accent1"/>
+            </a:fillRef>
+            <a:effectRef idx="0">
+              <a:schemeClr val="accent1"/>
+            </a:effectRef>
+            <a:fontRef idx="minor">
+              <a:schemeClr val="tx1"/>
+            </a:fontRef>
+          </p:style>
+        </p:cxnSp>
+        <p:cxnSp>
+          <p:nvCxnSpPr>
+            <p:cNvPr id="28" name="Straight Connector 27"/>
+            <p:cNvCxnSpPr>
+              <a:stCxn id="10" idx="0"/>
+            </p:cNvCxnSpPr>
+            <p:nvPr/>
+          </p:nvCxnSpPr>
+          <p:spPr>
+            <a:xfrm flipH="1" flipV="1">
+              <a:off x="3917360" y="2365516"/>
+              <a:ext cx="750790" cy="1301248"/>
+            </a:xfrm>
+            <a:prstGeom prst="line">
+              <a:avLst/>
+            </a:prstGeom>
+            <a:ln w="38100">
+              <a:solidFill>
+                <a:schemeClr val="tx1"/>
+              </a:solidFill>
+              <a:prstDash val="sysDot"/>
+            </a:ln>
+          </p:spPr>
+          <p:style>
+            <a:lnRef idx="1">
+              <a:schemeClr val="accent1"/>
+            </a:lnRef>
+            <a:fillRef idx="0">
+              <a:schemeClr val="accent1"/>
+            </a:fillRef>
+            <a:effectRef idx="0">
+              <a:schemeClr val="accent1"/>
+            </a:effectRef>
+            <a:fontRef idx="minor">
+              <a:schemeClr val="tx1"/>
+            </a:fontRef>
+          </p:style>
+        </p:cxnSp>
+        <p:cxnSp>
+          <p:nvCxnSpPr>
+            <p:cNvPr id="29" name="Straight Connector 28"/>
+            <p:cNvCxnSpPr/>
+            <p:nvPr/>
+          </p:nvCxnSpPr>
+          <p:spPr>
+            <a:xfrm flipH="1" flipV="1">
+              <a:off x="3206212" y="2853911"/>
+              <a:ext cx="1461938" cy="794982"/>
+            </a:xfrm>
+            <a:prstGeom prst="line">
+              <a:avLst/>
+            </a:prstGeom>
+            <a:ln w="38100">
+              <a:solidFill>
+                <a:schemeClr val="tx1"/>
+              </a:solidFill>
+              <a:prstDash val="sysDot"/>
+            </a:ln>
+          </p:spPr>
+          <p:style>
+            <a:lnRef idx="1">
+              <a:schemeClr val="accent1"/>
+            </a:lnRef>
+            <a:fillRef idx="0">
+              <a:schemeClr val="accent1"/>
+            </a:fillRef>
+            <a:effectRef idx="0">
+              <a:schemeClr val="accent1"/>
+            </a:effectRef>
+            <a:fontRef idx="minor">
+              <a:schemeClr val="tx1"/>
+            </a:fontRef>
+          </p:style>
+        </p:cxnSp>
+        <p:cxnSp>
+          <p:nvCxnSpPr>
+            <p:cNvPr id="30" name="Straight Connector 29"/>
+            <p:cNvCxnSpPr/>
+            <p:nvPr/>
+          </p:nvCxnSpPr>
+          <p:spPr>
+            <a:xfrm flipH="1" flipV="1">
+              <a:off x="3022619" y="3616917"/>
+              <a:ext cx="1646971" cy="14786"/>
+            </a:xfrm>
+            <a:prstGeom prst="line">
+              <a:avLst/>
+            </a:prstGeom>
+            <a:ln w="38100">
+              <a:solidFill>
+                <a:schemeClr val="tx1"/>
+              </a:solidFill>
+              <a:prstDash val="sysDot"/>
+            </a:ln>
+          </p:spPr>
+          <p:style>
+            <a:lnRef idx="1">
+              <a:schemeClr val="accent1"/>
+            </a:lnRef>
+            <a:fillRef idx="0">
+              <a:schemeClr val="accent1"/>
+            </a:fillRef>
+            <a:effectRef idx="0">
+              <a:schemeClr val="accent1"/>
+            </a:effectRef>
+            <a:fontRef idx="minor">
+              <a:schemeClr val="tx1"/>
+            </a:fontRef>
+          </p:style>
+        </p:cxnSp>
+        <p:cxnSp>
+          <p:nvCxnSpPr>
+            <p:cNvPr id="39" name="Straight Arrow Connector 38"/>
+            <p:cNvCxnSpPr>
+              <a:stCxn id="7" idx="0"/>
+            </p:cNvCxnSpPr>
+            <p:nvPr/>
+          </p:nvCxnSpPr>
+          <p:spPr>
+            <a:xfrm flipV="1">
+              <a:off x="5118641" y="3100251"/>
+              <a:ext cx="1999" cy="523426"/>
+            </a:xfrm>
+            <a:prstGeom prst="straightConnector1">
+              <a:avLst/>
+            </a:prstGeom>
+            <a:ln w="38100">
+              <a:solidFill>
+                <a:schemeClr val="tx1"/>
+              </a:solidFill>
+              <a:tailEnd type="triangle"/>
+            </a:ln>
+          </p:spPr>
+          <p:style>
+            <a:lnRef idx="1">
+              <a:schemeClr val="accent1"/>
+            </a:lnRef>
+            <a:fillRef idx="0">
+              <a:schemeClr val="accent1"/>
+            </a:fillRef>
+            <a:effectRef idx="0">
+              <a:schemeClr val="accent1"/>
+            </a:effectRef>
+            <a:fontRef idx="minor">
+              <a:schemeClr val="tx1"/>
+            </a:fontRef>
+          </p:style>
+        </p:cxnSp>
+        <p:cxnSp>
+          <p:nvCxnSpPr>
+            <p:cNvPr id="40" name="Straight Arrow Connector 39"/>
+            <p:cNvCxnSpPr/>
+            <p:nvPr/>
+          </p:nvCxnSpPr>
+          <p:spPr>
+            <a:xfrm flipV="1">
+              <a:off x="5550066" y="3100251"/>
+              <a:ext cx="127923" cy="536717"/>
+            </a:xfrm>
+            <a:prstGeom prst="straightConnector1">
+              <a:avLst/>
+            </a:prstGeom>
+            <a:ln w="38100">
+              <a:solidFill>
+                <a:schemeClr val="tx1"/>
+              </a:solidFill>
+              <a:tailEnd type="triangle"/>
+            </a:ln>
+          </p:spPr>
+          <p:style>
+            <a:lnRef idx="1">
+              <a:schemeClr val="accent1"/>
+            </a:lnRef>
+            <a:fillRef idx="0">
+              <a:schemeClr val="accent1"/>
+            </a:fillRef>
+            <a:effectRef idx="0">
+              <a:schemeClr val="accent1"/>
+            </a:effectRef>
+            <a:fontRef idx="minor">
+              <a:schemeClr val="tx1"/>
+            </a:fontRef>
+          </p:style>
+        </p:cxnSp>
+        <p:cxnSp>
+          <p:nvCxnSpPr>
+            <p:cNvPr id="42" name="Straight Arrow Connector 41"/>
+            <p:cNvCxnSpPr/>
+            <p:nvPr/>
+          </p:nvCxnSpPr>
+          <p:spPr>
+            <a:xfrm flipV="1">
+              <a:off x="5538651" y="3204754"/>
+              <a:ext cx="461555" cy="426722"/>
+            </a:xfrm>
+            <a:prstGeom prst="straightConnector1">
+              <a:avLst/>
+            </a:prstGeom>
+            <a:ln w="38100">
+              <a:solidFill>
+                <a:schemeClr val="tx1"/>
+              </a:solidFill>
+              <a:tailEnd type="triangle"/>
+            </a:ln>
+          </p:spPr>
+          <p:style>
+            <a:lnRef idx="1">
+              <a:schemeClr val="accent1"/>
+            </a:lnRef>
+            <a:fillRef idx="0">
+              <a:schemeClr val="accent1"/>
+            </a:fillRef>
+            <a:effectRef idx="0">
+              <a:schemeClr val="accent1"/>
+            </a:effectRef>
+            <a:fontRef idx="minor">
+              <a:schemeClr val="tx1"/>
+            </a:fontRef>
+          </p:style>
+        </p:cxnSp>
+        <p:cxnSp>
+          <p:nvCxnSpPr>
+            <p:cNvPr id="45" name="Straight Arrow Connector 44"/>
+            <p:cNvCxnSpPr/>
+            <p:nvPr/>
+          </p:nvCxnSpPr>
+          <p:spPr>
+            <a:xfrm flipV="1">
+              <a:off x="5556069" y="3492137"/>
+              <a:ext cx="592182" cy="130630"/>
+            </a:xfrm>
+            <a:prstGeom prst="straightConnector1">
+              <a:avLst/>
+            </a:prstGeom>
+            <a:ln w="38100">
+              <a:solidFill>
+                <a:schemeClr val="tx1"/>
+              </a:solidFill>
+              <a:tailEnd type="triangle"/>
+            </a:ln>
+          </p:spPr>
+          <p:style>
+            <a:lnRef idx="1">
+              <a:schemeClr val="accent1"/>
+            </a:lnRef>
+            <a:fillRef idx="0">
+              <a:schemeClr val="accent1"/>
+            </a:fillRef>
+            <a:effectRef idx="0">
+              <a:schemeClr val="accent1"/>
+            </a:effectRef>
+            <a:fontRef idx="minor">
+              <a:schemeClr val="tx1"/>
+            </a:fontRef>
+          </p:style>
+        </p:cxnSp>
+        <p:cxnSp>
+          <p:nvCxnSpPr>
+            <p:cNvPr id="53" name="Straight Arrow Connector 52"/>
+            <p:cNvCxnSpPr/>
+            <p:nvPr/>
+          </p:nvCxnSpPr>
+          <p:spPr>
+            <a:xfrm flipH="1" flipV="1">
+              <a:off x="4511041" y="3100252"/>
+              <a:ext cx="174170" cy="522514"/>
+            </a:xfrm>
+            <a:prstGeom prst="straightConnector1">
+              <a:avLst/>
+            </a:prstGeom>
+            <a:ln w="38100">
+              <a:solidFill>
+                <a:schemeClr val="tx1"/>
+              </a:solidFill>
+              <a:tailEnd type="triangle"/>
+            </a:ln>
+          </p:spPr>
+          <p:style>
+            <a:lnRef idx="1">
+              <a:schemeClr val="accent1"/>
+            </a:lnRef>
+            <a:fillRef idx="0">
+              <a:schemeClr val="accent1"/>
+            </a:fillRef>
+            <a:effectRef idx="0">
+              <a:schemeClr val="accent1"/>
+            </a:effectRef>
+            <a:fontRef idx="minor">
+              <a:schemeClr val="tx1"/>
+            </a:fontRef>
+          </p:style>
+        </p:cxnSp>
+        <p:cxnSp>
+          <p:nvCxnSpPr>
+            <p:cNvPr id="55" name="Straight Arrow Connector 54"/>
+            <p:cNvCxnSpPr/>
+            <p:nvPr/>
+          </p:nvCxnSpPr>
+          <p:spPr>
+            <a:xfrm flipH="1" flipV="1">
+              <a:off x="4237075" y="3225488"/>
+              <a:ext cx="413302" cy="423403"/>
+            </a:xfrm>
+            <a:prstGeom prst="straightConnector1">
+              <a:avLst/>
+            </a:prstGeom>
+            <a:ln w="38100">
+              <a:solidFill>
+                <a:schemeClr val="tx1"/>
+              </a:solidFill>
+              <a:tailEnd type="triangle"/>
+            </a:ln>
+          </p:spPr>
+          <p:style>
+            <a:lnRef idx="1">
+              <a:schemeClr val="accent1"/>
+            </a:lnRef>
+            <a:fillRef idx="0">
+              <a:schemeClr val="accent1"/>
+            </a:fillRef>
+            <a:effectRef idx="0">
+              <a:schemeClr val="accent1"/>
+            </a:effectRef>
+            <a:fontRef idx="minor">
+              <a:schemeClr val="tx1"/>
+            </a:fontRef>
+          </p:style>
+        </p:cxnSp>
+        <p:cxnSp>
+          <p:nvCxnSpPr>
+            <p:cNvPr id="59" name="Straight Arrow Connector 58"/>
+            <p:cNvCxnSpPr/>
+            <p:nvPr/>
+          </p:nvCxnSpPr>
+          <p:spPr>
+            <a:xfrm flipH="1" flipV="1">
+              <a:off x="4089030" y="3491392"/>
+              <a:ext cx="607423" cy="149247"/>
+            </a:xfrm>
+            <a:prstGeom prst="straightConnector1">
+              <a:avLst/>
+            </a:prstGeom>
+            <a:ln w="38100">
+              <a:solidFill>
+                <a:schemeClr val="tx1"/>
+              </a:solidFill>
+              <a:tailEnd type="triangle"/>
+            </a:ln>
+          </p:spPr>
+          <p:style>
+            <a:lnRef idx="1">
+              <a:schemeClr val="accent1"/>
+            </a:lnRef>
+            <a:fillRef idx="0">
+              <a:schemeClr val="accent1"/>
+            </a:fillRef>
+            <a:effectRef idx="0">
+              <a:schemeClr val="accent1"/>
+            </a:effectRef>
+            <a:fontRef idx="minor">
+              <a:schemeClr val="tx1"/>
+            </a:fontRef>
+          </p:style>
+        </p:cxnSp>
+        <p:sp>
+          <p:nvSpPr>
+            <p:cNvPr id="62" name="TextBox 61"/>
+            <p:cNvSpPr txBox="1"/>
+            <p:nvPr/>
+          </p:nvSpPr>
+          <p:spPr>
+            <a:xfrm>
+              <a:off x="5101840" y="2885298"/>
+              <a:ext cx="504834" cy="400110"/>
+            </a:xfrm>
+            <a:prstGeom prst="rect">
+              <a:avLst/>
+            </a:prstGeom>
+            <a:noFill/>
+          </p:spPr>
+          <p:txBody>
+            <a:bodyPr wrap="square" rtlCol="0">
+              <a:spAutoFit/>
+            </a:bodyPr>
+            <a:lstStyle/>
+            <a:p>
+              <a:r>
+                <a:rPr lang="en-CA" sz="2000" dirty="0" smtClean="0"/>
+                <a:t>0°</a:t>
+              </a:r>
+              <a:endParaRPr lang="en-CA" sz="2000" dirty="0"/>
+            </a:p>
+          </p:txBody>
+        </p:sp>
+        <p:sp>
+          <p:nvSpPr>
+            <p:cNvPr id="63" name="TextBox 62"/>
+            <p:cNvSpPr txBox="1"/>
+            <p:nvPr/>
+          </p:nvSpPr>
+          <p:spPr>
+            <a:xfrm>
+              <a:off x="5471692" y="2603179"/>
+              <a:ext cx="740228" cy="400110"/>
+            </a:xfrm>
+            <a:prstGeom prst="rect">
+              <a:avLst/>
+            </a:prstGeom>
+            <a:noFill/>
+          </p:spPr>
+          <p:txBody>
+            <a:bodyPr wrap="square" rtlCol="0">
+              <a:spAutoFit/>
+            </a:bodyPr>
+            <a:lstStyle/>
+            <a:p>
+              <a:r>
+                <a:rPr lang="en-CA" sz="2000" dirty="0" smtClean="0"/>
+                <a:t>+15°</a:t>
+              </a:r>
+              <a:endParaRPr lang="en-CA" sz="2000" dirty="0"/>
+            </a:p>
+          </p:txBody>
+        </p:sp>
+        <p:sp>
+          <p:nvSpPr>
+            <p:cNvPr id="26" name="TextBox 25"/>
+            <p:cNvSpPr txBox="1"/>
+            <p:nvPr/>
+          </p:nvSpPr>
+          <p:spPr>
+            <a:xfrm>
+              <a:off x="5853599" y="2869488"/>
+              <a:ext cx="709486" cy="400110"/>
+            </a:xfrm>
+            <a:prstGeom prst="rect">
+              <a:avLst/>
+            </a:prstGeom>
+            <a:noFill/>
+          </p:spPr>
+          <p:txBody>
+            <a:bodyPr wrap="square" rtlCol="0">
+              <a:spAutoFit/>
+            </a:bodyPr>
+            <a:lstStyle/>
+            <a:p>
+              <a:r>
+                <a:rPr lang="en-CA" sz="2000" dirty="0" smtClean="0"/>
+                <a:t>+45°</a:t>
+              </a:r>
+              <a:endParaRPr lang="en-CA" sz="2000" dirty="0"/>
+            </a:p>
+          </p:txBody>
+        </p:sp>
+        <p:sp>
+          <p:nvSpPr>
+            <p:cNvPr id="27" name="TextBox 26"/>
+            <p:cNvSpPr txBox="1"/>
+            <p:nvPr/>
+          </p:nvSpPr>
+          <p:spPr>
+            <a:xfrm>
+              <a:off x="6085246" y="3250161"/>
+              <a:ext cx="709486" cy="400110"/>
+            </a:xfrm>
+            <a:prstGeom prst="rect">
+              <a:avLst/>
+            </a:prstGeom>
+            <a:noFill/>
+          </p:spPr>
+          <p:txBody>
+            <a:bodyPr wrap="square" rtlCol="0">
+              <a:spAutoFit/>
+            </a:bodyPr>
+            <a:lstStyle/>
+            <a:p>
+              <a:r>
+                <a:rPr lang="en-CA" sz="2000" dirty="0" smtClean="0"/>
+                <a:t>+75°</a:t>
+              </a:r>
+              <a:endParaRPr lang="en-CA" sz="2000" dirty="0"/>
+            </a:p>
+          </p:txBody>
+        </p:sp>
+        <p:sp>
+          <p:nvSpPr>
+            <p:cNvPr id="31" name="TextBox 30"/>
+            <p:cNvSpPr txBox="1"/>
+            <p:nvPr/>
+          </p:nvSpPr>
+          <p:spPr>
+            <a:xfrm>
+              <a:off x="3344555" y="3210048"/>
+              <a:ext cx="709486" cy="400110"/>
+            </a:xfrm>
+            <a:prstGeom prst="rect">
+              <a:avLst/>
+            </a:prstGeom>
+            <a:noFill/>
+          </p:spPr>
+          <p:txBody>
+            <a:bodyPr wrap="square" rtlCol="0">
+              <a:spAutoFit/>
+            </a:bodyPr>
+            <a:lstStyle/>
+            <a:p>
+              <a:r>
+                <a:rPr lang="en-CA" sz="2000" dirty="0" smtClean="0"/>
+                <a:t>-75°</a:t>
+              </a:r>
+              <a:endParaRPr lang="en-CA" sz="2000" dirty="0"/>
+            </a:p>
+          </p:txBody>
+        </p:sp>
+        <p:sp>
+          <p:nvSpPr>
+            <p:cNvPr id="32" name="TextBox 31"/>
+            <p:cNvSpPr txBox="1"/>
+            <p:nvPr/>
+          </p:nvSpPr>
+          <p:spPr>
+            <a:xfrm>
+              <a:off x="3697406" y="2839351"/>
+              <a:ext cx="709486" cy="400110"/>
+            </a:xfrm>
+            <a:prstGeom prst="rect">
+              <a:avLst/>
+            </a:prstGeom>
+            <a:noFill/>
+          </p:spPr>
+          <p:txBody>
+            <a:bodyPr wrap="square" rtlCol="0">
+              <a:spAutoFit/>
+            </a:bodyPr>
+            <a:lstStyle/>
+            <a:p>
+              <a:r>
+                <a:rPr lang="en-CA" sz="2000" dirty="0" smtClean="0"/>
+                <a:t>-45°</a:t>
+              </a:r>
+              <a:endParaRPr lang="en-CA" sz="2000" dirty="0"/>
+            </a:p>
+          </p:txBody>
+        </p:sp>
+        <p:sp>
+          <p:nvSpPr>
+            <p:cNvPr id="33" name="TextBox 32"/>
+            <p:cNvSpPr txBox="1"/>
+            <p:nvPr/>
+          </p:nvSpPr>
+          <p:spPr>
+            <a:xfrm>
+              <a:off x="4106239" y="2532551"/>
+              <a:ext cx="740228" cy="400110"/>
+            </a:xfrm>
+            <a:prstGeom prst="rect">
+              <a:avLst/>
+            </a:prstGeom>
+            <a:noFill/>
+          </p:spPr>
+          <p:txBody>
+            <a:bodyPr wrap="square" rtlCol="0">
+              <a:spAutoFit/>
+            </a:bodyPr>
+            <a:lstStyle/>
+            <a:p>
+              <a:r>
+                <a:rPr lang="en-CA" sz="2000" dirty="0" smtClean="0"/>
+                <a:t>-15°</a:t>
+              </a:r>
+              <a:endParaRPr lang="en-CA" sz="2000" dirty="0"/>
+            </a:p>
+          </p:txBody>
+        </p:sp>
+      </p:grpSp>
+    </p:spTree>
+    <p:extLst>
+      <p:ext uri="{BB962C8B-B14F-4D97-AF65-F5344CB8AC3E}">
+        <p14:creationId xmlns:p14="http://schemas.microsoft.com/office/powerpoint/2010/main" val="418568801"/>
+      </p:ext>
+    </p:extLst>
+  </p:cSld>
+  <p:clrMapOvr>
+    <a:masterClrMapping/>
+  </p:clrMapOvr>
+</p:sld>
+</file>
+
+<file path=ppt/slides/slide8.xml><?xml version="1.0" encoding="utf-8"?>
+<p:sld xmlns:a="http://schemas.openxmlformats.org/drawingml/2006/main" xmlns:r="http://schemas.openxmlformats.org/officeDocument/2006/relationships" xmlns:p="http://schemas.openxmlformats.org/presentationml/2006/main">
+  <p:cSld>
+    <p:spTree>
+      <p:nvGrpSpPr>
+        <p:cNvPr id="1" name=""/>
+        <p:cNvGrpSpPr/>
+        <p:nvPr/>
+      </p:nvGrpSpPr>
+      <p:grpSpPr>
+        <a:xfrm>
+          <a:off x="0" y="0"/>
+          <a:ext cx="0" cy="0"/>
+          <a:chOff x="0" y="0"/>
+          <a:chExt cx="0" cy="0"/>
+        </a:xfrm>
+      </p:grpSpPr>
+      <p:grpSp>
+        <p:nvGrpSpPr>
+          <p:cNvPr id="15" name="Group 14"/>
+          <p:cNvGrpSpPr/>
+          <p:nvPr/>
+        </p:nvGrpSpPr>
+        <p:grpSpPr>
+          <a:xfrm>
+            <a:off x="3596640" y="3413760"/>
+            <a:ext cx="2791098" cy="2216367"/>
+            <a:chOff x="3596640" y="3413760"/>
+            <a:chExt cx="2791098" cy="2216367"/>
+          </a:xfrm>
+        </p:grpSpPr>
+        <p:sp>
+          <p:nvSpPr>
+            <p:cNvPr id="2" name="Smiley Face 1"/>
+            <p:cNvSpPr/>
+            <p:nvPr/>
+          </p:nvSpPr>
+          <p:spPr>
+            <a:xfrm>
+              <a:off x="4548051" y="4064743"/>
+              <a:ext cx="914400" cy="914400"/>
+            </a:xfrm>
+            <a:prstGeom prst="smileyFace">
+              <a:avLst/>
+            </a:prstGeom>
+            <a:solidFill>
+              <a:srgbClr val="FFFF00"/>
+            </a:solidFill>
+            <a:ln w="38100">
+              <a:solidFill>
+                <a:schemeClr val="tx1"/>
+              </a:solidFill>
+            </a:ln>
+          </p:spPr>
+          <p:style>
+            <a:lnRef idx="2">
+              <a:schemeClr val="accent1">
+                <a:shade val="50000"/>
+              </a:schemeClr>
+            </a:lnRef>
+            <a:fillRef idx="1">
+              <a:schemeClr val="accent1"/>
+            </a:fillRef>
+            <a:effectRef idx="0">
+              <a:schemeClr val="accent1"/>
+            </a:effectRef>
+            <a:fontRef idx="minor">
+              <a:schemeClr val="lt1"/>
+            </a:fontRef>
+          </p:style>
+          <p:txBody>
+            <a:bodyPr rtlCol="0" anchor="ctr"/>
+            <a:lstStyle/>
+            <a:p>
+              <a:pPr algn="ctr"/>
+              <a:endParaRPr lang="en-CA"/>
+            </a:p>
+          </p:txBody>
+        </p:sp>
+        <p:cxnSp>
+          <p:nvCxnSpPr>
+            <p:cNvPr id="4" name="Straight Connector 3"/>
+            <p:cNvCxnSpPr/>
+            <p:nvPr/>
+          </p:nvCxnSpPr>
+          <p:spPr>
+            <a:xfrm flipH="1" flipV="1">
+              <a:off x="4188823" y="3413760"/>
+              <a:ext cx="8708" cy="2216367"/>
+            </a:xfrm>
+            <a:prstGeom prst="line">
+              <a:avLst/>
+            </a:prstGeom>
+            <a:ln w="57150">
+              <a:solidFill>
+                <a:schemeClr val="tx1"/>
+              </a:solidFill>
+            </a:ln>
+          </p:spPr>
+          <p:style>
+            <a:lnRef idx="1">
+              <a:schemeClr val="accent1"/>
+            </a:lnRef>
+            <a:fillRef idx="0">
+              <a:schemeClr val="accent1"/>
+            </a:fillRef>
+            <a:effectRef idx="0">
+              <a:schemeClr val="accent1"/>
+            </a:effectRef>
+            <a:fontRef idx="minor">
+              <a:schemeClr val="tx1"/>
+            </a:fontRef>
+          </p:style>
+        </p:cxnSp>
+        <p:cxnSp>
+          <p:nvCxnSpPr>
+            <p:cNvPr id="5" name="Straight Connector 4"/>
+            <p:cNvCxnSpPr/>
+            <p:nvPr/>
+          </p:nvCxnSpPr>
+          <p:spPr>
+            <a:xfrm flipV="1">
+              <a:off x="5812971" y="3431177"/>
+              <a:ext cx="0" cy="2198950"/>
+            </a:xfrm>
+            <a:prstGeom prst="line">
+              <a:avLst/>
+            </a:prstGeom>
+            <a:ln w="57150">
+              <a:solidFill>
+                <a:schemeClr val="tx1"/>
+              </a:solidFill>
+            </a:ln>
+          </p:spPr>
+          <p:style>
+            <a:lnRef idx="1">
+              <a:schemeClr val="accent1"/>
+            </a:lnRef>
+            <a:fillRef idx="0">
+              <a:schemeClr val="accent1"/>
+            </a:fillRef>
+            <a:effectRef idx="0">
+              <a:schemeClr val="accent1"/>
+            </a:effectRef>
+            <a:fontRef idx="minor">
+              <a:schemeClr val="tx1"/>
+            </a:fontRef>
+          </p:style>
+        </p:cxnSp>
+        <p:cxnSp>
+          <p:nvCxnSpPr>
+            <p:cNvPr id="9" name="Straight Connector 8"/>
+            <p:cNvCxnSpPr/>
+            <p:nvPr/>
+          </p:nvCxnSpPr>
+          <p:spPr>
+            <a:xfrm>
+              <a:off x="4197531" y="3413760"/>
+              <a:ext cx="1615440" cy="17417"/>
+            </a:xfrm>
+            <a:prstGeom prst="line">
+              <a:avLst/>
+            </a:prstGeom>
+            <a:ln w="57150">
+              <a:solidFill>
+                <a:schemeClr val="tx1"/>
+              </a:solidFill>
+            </a:ln>
+          </p:spPr>
+          <p:style>
+            <a:lnRef idx="1">
+              <a:schemeClr val="accent1"/>
+            </a:lnRef>
+            <a:fillRef idx="0">
+              <a:schemeClr val="accent1"/>
+            </a:fillRef>
+            <a:effectRef idx="0">
+              <a:schemeClr val="accent1"/>
+            </a:effectRef>
+            <a:fontRef idx="minor">
+              <a:schemeClr val="tx1"/>
+            </a:fontRef>
+          </p:style>
+        </p:cxnSp>
+        <p:cxnSp>
+          <p:nvCxnSpPr>
+            <p:cNvPr id="13" name="Straight Connector 12"/>
+            <p:cNvCxnSpPr/>
+            <p:nvPr/>
+          </p:nvCxnSpPr>
+          <p:spPr>
+            <a:xfrm flipH="1">
+              <a:off x="3596640" y="5612709"/>
+              <a:ext cx="609600" cy="0"/>
+            </a:xfrm>
+            <a:prstGeom prst="line">
+              <a:avLst/>
+            </a:prstGeom>
+            <a:ln w="57150">
+              <a:solidFill>
+                <a:schemeClr val="tx1"/>
+              </a:solidFill>
+            </a:ln>
+          </p:spPr>
+          <p:style>
+            <a:lnRef idx="1">
+              <a:schemeClr val="accent1"/>
+            </a:lnRef>
+            <a:fillRef idx="0">
+              <a:schemeClr val="accent1"/>
+            </a:fillRef>
+            <a:effectRef idx="0">
+              <a:schemeClr val="accent1"/>
+            </a:effectRef>
+            <a:fontRef idx="minor">
+              <a:schemeClr val="tx1"/>
+            </a:fontRef>
+          </p:style>
+        </p:cxnSp>
+        <p:cxnSp>
+          <p:nvCxnSpPr>
+            <p:cNvPr id="14" name="Straight Connector 13"/>
+            <p:cNvCxnSpPr/>
+            <p:nvPr/>
+          </p:nvCxnSpPr>
+          <p:spPr>
+            <a:xfrm flipH="1">
+              <a:off x="5778138" y="5608356"/>
+              <a:ext cx="609600" cy="0"/>
+            </a:xfrm>
+            <a:prstGeom prst="line">
+              <a:avLst/>
+            </a:prstGeom>
+            <a:ln w="57150">
+              <a:solidFill>
+                <a:schemeClr val="tx1"/>
+              </a:solidFill>
+            </a:ln>
+          </p:spPr>
+          <p:style>
+            <a:lnRef idx="1">
+              <a:schemeClr val="accent1"/>
+            </a:lnRef>
+            <a:fillRef idx="0">
+              <a:schemeClr val="accent1"/>
+            </a:fillRef>
+            <a:effectRef idx="0">
+              <a:schemeClr val="accent1"/>
+            </a:effectRef>
+            <a:fontRef idx="minor">
+              <a:schemeClr val="tx1"/>
+            </a:fontRef>
+          </p:style>
+        </p:cxnSp>
+      </p:grpSp>
+    </p:spTree>
+    <p:extLst>
+      <p:ext uri="{BB962C8B-B14F-4D97-AF65-F5344CB8AC3E}">
+        <p14:creationId xmlns:p14="http://schemas.microsoft.com/office/powerpoint/2010/main" val="2531865292"/>
+      </p:ext>
+    </p:extLst>
+  </p:cSld>
+  <p:clrMapOvr>
+    <a:masterClrMapping/>
+  </p:clrMapOvr>
+</p:sld>
+</file>
+
+<file path=ppt/slides/slide9.xml><?xml version="1.0" encoding="utf-8"?>
+<p:sld xmlns:a="http://schemas.openxmlformats.org/drawingml/2006/main" xmlns:r="http://schemas.openxmlformats.org/officeDocument/2006/relationships" xmlns:p="http://schemas.openxmlformats.org/presentationml/2006/main">
+  <p:cSld>
+    <p:spTree>
+      <p:nvGrpSpPr>
+        <p:cNvPr id="1" name=""/>
+        <p:cNvGrpSpPr/>
+        <p:nvPr/>
+      </p:nvGrpSpPr>
+      <p:grpSpPr>
+        <a:xfrm>
+          <a:off x="0" y="0"/>
+          <a:ext cx="0" cy="0"/>
+          <a:chOff x="0" y="0"/>
+          <a:chExt cx="0" cy="0"/>
+        </a:xfrm>
+      </p:grpSpPr>
       <p:sp>
         <p:nvSpPr>
           <p:cNvPr id="2" name="TextBox 1"/>

</xml_diff>

<commit_message>
CISC 870 Paper - 4500 words, practically done
</commit_message>
<xml_diff>
--- a/CISC870/Paper/FigureCreation.pptx
+++ b/CISC870/Paper/FigureCreation.pptx
@@ -5,7 +5,7 @@
     <p:sldMasterId id="2147483648" r:id="rId1"/>
   </p:sldMasterIdLst>
   <p:notesMasterIdLst>
-    <p:notesMasterId r:id="rId11"/>
+    <p:notesMasterId r:id="rId12"/>
   </p:notesMasterIdLst>
   <p:sldIdLst>
     <p:sldId id="256" r:id="rId2"/>
@@ -16,7 +16,8 @@
     <p:sldId id="263" r:id="rId7"/>
     <p:sldId id="264" r:id="rId8"/>
     <p:sldId id="265" r:id="rId9"/>
-    <p:sldId id="258" r:id="rId10"/>
+    <p:sldId id="266" r:id="rId10"/>
+    <p:sldId id="258" r:id="rId11"/>
   </p:sldIdLst>
   <p:sldSz cx="12192000" cy="6858000"/>
   <p:notesSz cx="6858000" cy="9144000"/>
@@ -6649,6 +6650,333 @@
 </p:sld>
 </file>
 
+<file path=ppt/slides/slide10.xml><?xml version="1.0" encoding="utf-8"?>
+<p:sld xmlns:a="http://schemas.openxmlformats.org/drawingml/2006/main" xmlns:r="http://schemas.openxmlformats.org/officeDocument/2006/relationships" xmlns:p="http://schemas.openxmlformats.org/presentationml/2006/main">
+  <p:cSld>
+    <p:spTree>
+      <p:nvGrpSpPr>
+        <p:cNvPr id="1" name=""/>
+        <p:cNvGrpSpPr/>
+        <p:nvPr/>
+      </p:nvGrpSpPr>
+      <p:grpSpPr>
+        <a:xfrm>
+          <a:off x="0" y="0"/>
+          <a:ext cx="0" cy="0"/>
+          <a:chOff x="0" y="0"/>
+          <a:chExt cx="0" cy="0"/>
+        </a:xfrm>
+      </p:grpSpPr>
+      <p:sp>
+        <p:nvSpPr>
+          <p:cNvPr id="2" name="TextBox 1"/>
+          <p:cNvSpPr txBox="1"/>
+          <p:nvPr/>
+        </p:nvSpPr>
+        <p:spPr>
+          <a:xfrm>
+            <a:off x="1071155" y="3204754"/>
+            <a:ext cx="1445623" cy="715089"/>
+          </a:xfrm>
+          <a:prstGeom prst="roundRect">
+            <a:avLst/>
+          </a:prstGeom>
+          <a:noFill/>
+          <a:ln w="28575">
+            <a:solidFill>
+              <a:schemeClr val="tx1"/>
+            </a:solidFill>
+          </a:ln>
+        </p:spPr>
+        <p:txBody>
+          <a:bodyPr wrap="square" rtlCol="0">
+            <a:spAutoFit/>
+          </a:bodyPr>
+          <a:lstStyle/>
+          <a:p>
+            <a:pPr algn="ctr"/>
+            <a:r>
+              <a:rPr lang="en-US" dirty="0" smtClean="0"/>
+              <a:t>Overall functionality</a:t>
+            </a:r>
+            <a:endParaRPr lang="en-CA" dirty="0"/>
+          </a:p>
+        </p:txBody>
+      </p:sp>
+      <p:sp>
+        <p:nvSpPr>
+          <p:cNvPr id="3" name="TextBox 2"/>
+          <p:cNvSpPr txBox="1"/>
+          <p:nvPr/>
+        </p:nvSpPr>
+        <p:spPr>
+          <a:xfrm>
+            <a:off x="3513909" y="4476204"/>
+            <a:ext cx="1445623" cy="408623"/>
+          </a:xfrm>
+          <a:prstGeom prst="roundRect">
+            <a:avLst/>
+          </a:prstGeom>
+          <a:noFill/>
+          <a:ln w="28575">
+            <a:solidFill>
+              <a:schemeClr val="tx1"/>
+            </a:solidFill>
+          </a:ln>
+        </p:spPr>
+        <p:txBody>
+          <a:bodyPr wrap="square" rtlCol="0">
+            <a:spAutoFit/>
+          </a:bodyPr>
+          <a:lstStyle/>
+          <a:p>
+            <a:pPr algn="ctr"/>
+            <a:r>
+              <a:rPr lang="en-US" dirty="0" smtClean="0"/>
+              <a:t>Perception</a:t>
+            </a:r>
+            <a:endParaRPr lang="en-CA" dirty="0"/>
+          </a:p>
+        </p:txBody>
+      </p:sp>
+      <p:sp>
+        <p:nvSpPr>
+          <p:cNvPr id="4" name="TextBox 3"/>
+          <p:cNvSpPr txBox="1"/>
+          <p:nvPr/>
+        </p:nvSpPr>
+        <p:spPr>
+          <a:xfrm>
+            <a:off x="3513909" y="3357986"/>
+            <a:ext cx="1445623" cy="408623"/>
+          </a:xfrm>
+          <a:prstGeom prst="roundRect">
+            <a:avLst/>
+          </a:prstGeom>
+          <a:noFill/>
+          <a:ln w="28575">
+            <a:solidFill>
+              <a:schemeClr val="tx1"/>
+            </a:solidFill>
+          </a:ln>
+        </p:spPr>
+        <p:txBody>
+          <a:bodyPr wrap="square" rtlCol="0">
+            <a:spAutoFit/>
+          </a:bodyPr>
+          <a:lstStyle/>
+          <a:p>
+            <a:pPr algn="ctr"/>
+            <a:r>
+              <a:rPr lang="en-US" dirty="0" smtClean="0"/>
+              <a:t>Modelling</a:t>
+            </a:r>
+            <a:endParaRPr lang="en-CA" dirty="0"/>
+          </a:p>
+        </p:txBody>
+      </p:sp>
+      <p:sp>
+        <p:nvSpPr>
+          <p:cNvPr id="5" name="TextBox 4"/>
+          <p:cNvSpPr txBox="1"/>
+          <p:nvPr/>
+        </p:nvSpPr>
+        <p:spPr>
+          <a:xfrm>
+            <a:off x="3513909" y="2239768"/>
+            <a:ext cx="1445623" cy="408623"/>
+          </a:xfrm>
+          <a:prstGeom prst="roundRect">
+            <a:avLst/>
+          </a:prstGeom>
+          <a:noFill/>
+          <a:ln w="28575">
+            <a:solidFill>
+              <a:schemeClr val="tx1"/>
+            </a:solidFill>
+          </a:ln>
+        </p:spPr>
+        <p:txBody>
+          <a:bodyPr wrap="square" rtlCol="0">
+            <a:spAutoFit/>
+          </a:bodyPr>
+          <a:lstStyle/>
+          <a:p>
+            <a:pPr algn="ctr"/>
+            <a:r>
+              <a:rPr lang="en-US" dirty="0" smtClean="0"/>
+              <a:t>Behavior</a:t>
+            </a:r>
+            <a:endParaRPr lang="en-CA" dirty="0"/>
+          </a:p>
+        </p:txBody>
+      </p:sp>
+      <p:cxnSp>
+        <p:nvCxnSpPr>
+          <p:cNvPr id="7" name="Straight Arrow Connector 6"/>
+          <p:cNvCxnSpPr>
+            <a:stCxn id="2" idx="3"/>
+            <a:endCxn id="4" idx="1"/>
+          </p:cNvCxnSpPr>
+          <p:nvPr/>
+        </p:nvCxnSpPr>
+        <p:spPr>
+          <a:xfrm flipV="1">
+            <a:off x="2516778" y="3562298"/>
+            <a:ext cx="997131" cy="1"/>
+          </a:xfrm>
+          <a:prstGeom prst="straightConnector1">
+            <a:avLst/>
+          </a:prstGeom>
+          <a:ln w="38100">
+            <a:solidFill>
+              <a:schemeClr val="tx1"/>
+            </a:solidFill>
+            <a:tailEnd type="triangle"/>
+          </a:ln>
+        </p:spPr>
+        <p:style>
+          <a:lnRef idx="1">
+            <a:schemeClr val="accent1"/>
+          </a:lnRef>
+          <a:fillRef idx="0">
+            <a:schemeClr val="accent1"/>
+          </a:fillRef>
+          <a:effectRef idx="0">
+            <a:schemeClr val="accent1"/>
+          </a:effectRef>
+          <a:fontRef idx="minor">
+            <a:schemeClr val="tx1"/>
+          </a:fontRef>
+        </p:style>
+      </p:cxnSp>
+      <p:cxnSp>
+        <p:nvCxnSpPr>
+          <p:cNvPr id="9" name="Elbow Connector 8"/>
+          <p:cNvCxnSpPr>
+            <a:stCxn id="2" idx="3"/>
+            <a:endCxn id="3" idx="1"/>
+          </p:cNvCxnSpPr>
+          <p:nvPr/>
+        </p:nvCxnSpPr>
+        <p:spPr>
+          <a:xfrm>
+            <a:off x="2516778" y="3562299"/>
+            <a:ext cx="997131" cy="1118217"/>
+          </a:xfrm>
+          <a:prstGeom prst="bentConnector3">
+            <a:avLst/>
+          </a:prstGeom>
+          <a:ln w="38100">
+            <a:solidFill>
+              <a:schemeClr val="tx1"/>
+            </a:solidFill>
+            <a:tailEnd type="triangle"/>
+          </a:ln>
+        </p:spPr>
+        <p:style>
+          <a:lnRef idx="1">
+            <a:schemeClr val="accent1"/>
+          </a:lnRef>
+          <a:fillRef idx="0">
+            <a:schemeClr val="accent1"/>
+          </a:fillRef>
+          <a:effectRef idx="0">
+            <a:schemeClr val="accent1"/>
+          </a:effectRef>
+          <a:fontRef idx="minor">
+            <a:schemeClr val="tx1"/>
+          </a:fontRef>
+        </p:style>
+      </p:cxnSp>
+      <p:cxnSp>
+        <p:nvCxnSpPr>
+          <p:cNvPr id="11" name="Elbow Connector 10"/>
+          <p:cNvCxnSpPr>
+            <a:stCxn id="2" idx="3"/>
+            <a:endCxn id="5" idx="1"/>
+          </p:cNvCxnSpPr>
+          <p:nvPr/>
+        </p:nvCxnSpPr>
+        <p:spPr>
+          <a:xfrm flipV="1">
+            <a:off x="2516778" y="2444080"/>
+            <a:ext cx="997131" cy="1118219"/>
+          </a:xfrm>
+          <a:prstGeom prst="bentConnector3">
+            <a:avLst/>
+          </a:prstGeom>
+          <a:ln w="38100">
+            <a:solidFill>
+              <a:schemeClr val="tx1"/>
+            </a:solidFill>
+            <a:tailEnd type="triangle"/>
+          </a:ln>
+        </p:spPr>
+        <p:style>
+          <a:lnRef idx="1">
+            <a:schemeClr val="accent1"/>
+          </a:lnRef>
+          <a:fillRef idx="0">
+            <a:schemeClr val="accent1"/>
+          </a:fillRef>
+          <a:effectRef idx="0">
+            <a:schemeClr val="accent1"/>
+          </a:effectRef>
+          <a:fontRef idx="minor">
+            <a:schemeClr val="tx1"/>
+          </a:fontRef>
+        </p:style>
+      </p:cxnSp>
+      <p:sp>
+        <p:nvSpPr>
+          <p:cNvPr id="12" name="TextBox 11"/>
+          <p:cNvSpPr txBox="1"/>
+          <p:nvPr/>
+        </p:nvSpPr>
+        <p:spPr>
+          <a:xfrm>
+            <a:off x="5956663" y="4476204"/>
+            <a:ext cx="1672046" cy="715089"/>
+          </a:xfrm>
+          <a:prstGeom prst="roundRect">
+            <a:avLst/>
+          </a:prstGeom>
+          <a:noFill/>
+          <a:ln w="28575">
+            <a:solidFill>
+              <a:schemeClr val="tx1"/>
+            </a:solidFill>
+          </a:ln>
+        </p:spPr>
+        <p:txBody>
+          <a:bodyPr wrap="square" rtlCol="0">
+            <a:spAutoFit/>
+          </a:bodyPr>
+          <a:lstStyle/>
+          <a:p>
+            <a:pPr algn="ctr"/>
+            <a:r>
+              <a:rPr lang="en-US" dirty="0" smtClean="0"/>
+              <a:t>Measurement types</a:t>
+            </a:r>
+            <a:endParaRPr lang="en-CA" dirty="0"/>
+          </a:p>
+        </p:txBody>
+      </p:sp>
+    </p:spTree>
+    <p:extLst>
+      <p:ext uri="{BB962C8B-B14F-4D97-AF65-F5344CB8AC3E}">
+        <p14:creationId xmlns:p14="http://schemas.microsoft.com/office/powerpoint/2010/main" val="157938821"/>
+      </p:ext>
+    </p:extLst>
+  </p:cSld>
+  <p:clrMapOvr>
+    <a:masterClrMapping/>
+  </p:clrMapOvr>
+</p:sld>
+</file>
+
 <file path=ppt/slides/slide2.xml><?xml version="1.0" encoding="utf-8"?>
 <p:sld xmlns:a="http://schemas.openxmlformats.org/drawingml/2006/main" xmlns:r="http://schemas.openxmlformats.org/officeDocument/2006/relationships" xmlns:p="http://schemas.openxmlformats.org/presentationml/2006/main">
   <p:cSld>
@@ -15236,305 +15564,534 @@
       </p:grpSpPr>
       <p:sp>
         <p:nvSpPr>
-          <p:cNvPr id="2" name="TextBox 1"/>
-          <p:cNvSpPr txBox="1"/>
+          <p:cNvPr id="2" name="Oval 1"/>
+          <p:cNvSpPr/>
           <p:nvPr/>
         </p:nvSpPr>
         <p:spPr>
           <a:xfrm>
-            <a:off x="1071155" y="3204754"/>
-            <a:ext cx="1445623" cy="715089"/>
+            <a:off x="722811" y="1463040"/>
+            <a:ext cx="661852" cy="836023"/>
           </a:xfrm>
-          <a:prstGeom prst="roundRect">
+          <a:prstGeom prst="ellipse">
             <a:avLst/>
           </a:prstGeom>
           <a:noFill/>
-          <a:ln w="28575">
+          <a:ln w="38100">
             <a:solidFill>
               <a:schemeClr val="tx1"/>
             </a:solidFill>
           </a:ln>
         </p:spPr>
-        <p:txBody>
-          <a:bodyPr wrap="square" rtlCol="0">
-            <a:spAutoFit/>
-          </a:bodyPr>
-          <a:lstStyle/>
-          <a:p>
-            <a:pPr algn="ctr"/>
-            <a:r>
-              <a:rPr lang="en-US" dirty="0" smtClean="0"/>
-              <a:t>Overall functionality</a:t>
-            </a:r>
-            <a:endParaRPr lang="en-CA" dirty="0"/>
-          </a:p>
-        </p:txBody>
-      </p:sp>
-      <p:sp>
-        <p:nvSpPr>
-          <p:cNvPr id="3" name="TextBox 2"/>
-          <p:cNvSpPr txBox="1"/>
-          <p:nvPr/>
-        </p:nvSpPr>
-        <p:spPr>
-          <a:xfrm>
-            <a:off x="3513909" y="4476204"/>
-            <a:ext cx="1445623" cy="408623"/>
-          </a:xfrm>
-          <a:prstGeom prst="roundRect">
-            <a:avLst/>
-          </a:prstGeom>
-          <a:noFill/>
-          <a:ln w="28575">
-            <a:solidFill>
-              <a:schemeClr val="tx1"/>
-            </a:solidFill>
-          </a:ln>
-        </p:spPr>
-        <p:txBody>
-          <a:bodyPr wrap="square" rtlCol="0">
-            <a:spAutoFit/>
-          </a:bodyPr>
-          <a:lstStyle/>
-          <a:p>
-            <a:pPr algn="ctr"/>
-            <a:r>
-              <a:rPr lang="en-US" dirty="0" smtClean="0"/>
-              <a:t>Perception</a:t>
-            </a:r>
-            <a:endParaRPr lang="en-CA" dirty="0"/>
-          </a:p>
-        </p:txBody>
-      </p:sp>
-      <p:sp>
-        <p:nvSpPr>
-          <p:cNvPr id="4" name="TextBox 3"/>
-          <p:cNvSpPr txBox="1"/>
-          <p:nvPr/>
-        </p:nvSpPr>
-        <p:spPr>
-          <a:xfrm>
-            <a:off x="3513909" y="3357986"/>
-            <a:ext cx="1445623" cy="408623"/>
-          </a:xfrm>
-          <a:prstGeom prst="roundRect">
-            <a:avLst/>
-          </a:prstGeom>
-          <a:noFill/>
-          <a:ln w="28575">
-            <a:solidFill>
-              <a:schemeClr val="tx1"/>
-            </a:solidFill>
-          </a:ln>
-        </p:spPr>
-        <p:txBody>
-          <a:bodyPr wrap="square" rtlCol="0">
-            <a:spAutoFit/>
-          </a:bodyPr>
-          <a:lstStyle/>
-          <a:p>
-            <a:pPr algn="ctr"/>
-            <a:r>
-              <a:rPr lang="en-US" dirty="0" smtClean="0"/>
-              <a:t>Modelling</a:t>
-            </a:r>
-            <a:endParaRPr lang="en-CA" dirty="0"/>
-          </a:p>
-        </p:txBody>
-      </p:sp>
-      <p:sp>
-        <p:nvSpPr>
-          <p:cNvPr id="5" name="TextBox 4"/>
-          <p:cNvSpPr txBox="1"/>
-          <p:nvPr/>
-        </p:nvSpPr>
-        <p:spPr>
-          <a:xfrm>
-            <a:off x="3513909" y="2239768"/>
-            <a:ext cx="1445623" cy="408623"/>
-          </a:xfrm>
-          <a:prstGeom prst="roundRect">
-            <a:avLst/>
-          </a:prstGeom>
-          <a:noFill/>
-          <a:ln w="28575">
-            <a:solidFill>
-              <a:schemeClr val="tx1"/>
-            </a:solidFill>
-          </a:ln>
-        </p:spPr>
-        <p:txBody>
-          <a:bodyPr wrap="square" rtlCol="0">
-            <a:spAutoFit/>
-          </a:bodyPr>
-          <a:lstStyle/>
-          <a:p>
-            <a:pPr algn="ctr"/>
-            <a:r>
-              <a:rPr lang="en-US" dirty="0" smtClean="0"/>
-              <a:t>Behavior</a:t>
-            </a:r>
-            <a:endParaRPr lang="en-CA" dirty="0"/>
-          </a:p>
-        </p:txBody>
-      </p:sp>
-      <p:cxnSp>
-        <p:nvCxnSpPr>
-          <p:cNvPr id="7" name="Straight Arrow Connector 6"/>
-          <p:cNvCxnSpPr>
-            <a:stCxn id="2" idx="3"/>
-            <a:endCxn id="4" idx="1"/>
-          </p:cNvCxnSpPr>
-          <p:nvPr/>
-        </p:nvCxnSpPr>
-        <p:spPr>
-          <a:xfrm flipV="1">
-            <a:off x="2516778" y="3562298"/>
-            <a:ext cx="997131" cy="1"/>
-          </a:xfrm>
-          <a:prstGeom prst="straightConnector1">
-            <a:avLst/>
-          </a:prstGeom>
-          <a:ln w="38100">
-            <a:solidFill>
-              <a:schemeClr val="tx1"/>
-            </a:solidFill>
-            <a:tailEnd type="triangle"/>
-          </a:ln>
-        </p:spPr>
         <p:style>
-          <a:lnRef idx="1">
-            <a:schemeClr val="accent1"/>
+          <a:lnRef idx="2">
+            <a:schemeClr val="accent1">
+              <a:shade val="50000"/>
+            </a:schemeClr>
           </a:lnRef>
-          <a:fillRef idx="0">
+          <a:fillRef idx="1">
             <a:schemeClr val="accent1"/>
           </a:fillRef>
           <a:effectRef idx="0">
             <a:schemeClr val="accent1"/>
           </a:effectRef>
           <a:fontRef idx="minor">
-            <a:schemeClr val="tx1"/>
+            <a:schemeClr val="lt1"/>
           </a:fontRef>
         </p:style>
-      </p:cxnSp>
-      <p:cxnSp>
-        <p:nvCxnSpPr>
-          <p:cNvPr id="9" name="Elbow Connector 8"/>
-          <p:cNvCxnSpPr>
-            <a:stCxn id="2" idx="3"/>
-            <a:endCxn id="3" idx="1"/>
-          </p:cNvCxnSpPr>
-          <p:nvPr/>
-        </p:nvCxnSpPr>
-        <p:spPr>
-          <a:xfrm>
-            <a:off x="2516778" y="3562299"/>
-            <a:ext cx="997131" cy="1118217"/>
-          </a:xfrm>
-          <a:prstGeom prst="bentConnector3">
-            <a:avLst/>
-          </a:prstGeom>
-          <a:ln w="38100">
-            <a:solidFill>
-              <a:schemeClr val="tx1"/>
-            </a:solidFill>
-            <a:tailEnd type="triangle"/>
-          </a:ln>
-        </p:spPr>
-        <p:style>
-          <a:lnRef idx="1">
-            <a:schemeClr val="accent1"/>
-          </a:lnRef>
-          <a:fillRef idx="0">
-            <a:schemeClr val="accent1"/>
-          </a:fillRef>
-          <a:effectRef idx="0">
-            <a:schemeClr val="accent1"/>
-          </a:effectRef>
-          <a:fontRef idx="minor">
-            <a:schemeClr val="tx1"/>
-          </a:fontRef>
-        </p:style>
-      </p:cxnSp>
-      <p:cxnSp>
-        <p:nvCxnSpPr>
-          <p:cNvPr id="11" name="Elbow Connector 10"/>
-          <p:cNvCxnSpPr>
-            <a:stCxn id="2" idx="3"/>
-            <a:endCxn id="5" idx="1"/>
-          </p:cNvCxnSpPr>
-          <p:nvPr/>
-        </p:nvCxnSpPr>
-        <p:spPr>
-          <a:xfrm flipV="1">
-            <a:off x="2516778" y="2444080"/>
-            <a:ext cx="997131" cy="1118219"/>
-          </a:xfrm>
-          <a:prstGeom prst="bentConnector3">
-            <a:avLst/>
-          </a:prstGeom>
-          <a:ln w="38100">
-            <a:solidFill>
-              <a:schemeClr val="tx1"/>
-            </a:solidFill>
-            <a:tailEnd type="triangle"/>
-          </a:ln>
-        </p:spPr>
-        <p:style>
-          <a:lnRef idx="1">
-            <a:schemeClr val="accent1"/>
-          </a:lnRef>
-          <a:fillRef idx="0">
-            <a:schemeClr val="accent1"/>
-          </a:fillRef>
-          <a:effectRef idx="0">
-            <a:schemeClr val="accent1"/>
-          </a:effectRef>
-          <a:fontRef idx="minor">
-            <a:schemeClr val="tx1"/>
-          </a:fontRef>
-        </p:style>
-      </p:cxnSp>
-      <p:sp>
-        <p:nvSpPr>
-          <p:cNvPr id="12" name="TextBox 11"/>
-          <p:cNvSpPr txBox="1"/>
-          <p:nvPr/>
-        </p:nvSpPr>
-        <p:spPr>
-          <a:xfrm>
-            <a:off x="5956663" y="4476204"/>
-            <a:ext cx="1672046" cy="715089"/>
-          </a:xfrm>
-          <a:prstGeom prst="roundRect">
-            <a:avLst/>
-          </a:prstGeom>
-          <a:noFill/>
-          <a:ln w="28575">
-            <a:solidFill>
-              <a:schemeClr val="tx1"/>
-            </a:solidFill>
-          </a:ln>
-        </p:spPr>
         <p:txBody>
-          <a:bodyPr wrap="square" rtlCol="0">
-            <a:spAutoFit/>
-          </a:bodyPr>
+          <a:bodyPr rtlCol="0" anchor="ctr"/>
           <a:lstStyle/>
           <a:p>
             <a:pPr algn="ctr"/>
-            <a:r>
-              <a:rPr lang="en-US" dirty="0" smtClean="0"/>
-              <a:t>Measurement types</a:t>
-            </a:r>
-            <a:endParaRPr lang="en-CA" dirty="0"/>
+            <a:endParaRPr lang="en-CA"/>
           </a:p>
         </p:txBody>
       </p:sp>
+      <p:grpSp>
+        <p:nvGrpSpPr>
+          <p:cNvPr id="18" name="Group 17"/>
+          <p:cNvGrpSpPr/>
+          <p:nvPr/>
+        </p:nvGrpSpPr>
+        <p:grpSpPr>
+          <a:xfrm>
+            <a:off x="3344091" y="992777"/>
+            <a:ext cx="936172" cy="1393372"/>
+            <a:chOff x="3344091" y="992777"/>
+            <a:chExt cx="936172" cy="1393372"/>
+          </a:xfrm>
+        </p:grpSpPr>
+        <p:sp>
+          <p:nvSpPr>
+            <p:cNvPr id="3" name="Oval 2"/>
+            <p:cNvSpPr/>
+            <p:nvPr/>
+          </p:nvSpPr>
+          <p:spPr>
+            <a:xfrm>
+              <a:off x="3618411" y="1463040"/>
+              <a:ext cx="661852" cy="836023"/>
+            </a:xfrm>
+            <a:prstGeom prst="ellipse">
+              <a:avLst/>
+            </a:prstGeom>
+            <a:noFill/>
+            <a:ln w="38100">
+              <a:solidFill>
+                <a:schemeClr val="tx1"/>
+              </a:solidFill>
+            </a:ln>
+          </p:spPr>
+          <p:style>
+            <a:lnRef idx="2">
+              <a:schemeClr val="accent1">
+                <a:shade val="50000"/>
+              </a:schemeClr>
+            </a:lnRef>
+            <a:fillRef idx="1">
+              <a:schemeClr val="accent1"/>
+            </a:fillRef>
+            <a:effectRef idx="0">
+              <a:schemeClr val="accent1"/>
+            </a:effectRef>
+            <a:fontRef idx="minor">
+              <a:schemeClr val="lt1"/>
+            </a:fontRef>
+          </p:style>
+          <p:txBody>
+            <a:bodyPr rtlCol="0" anchor="ctr"/>
+            <a:lstStyle/>
+            <a:p>
+              <a:pPr algn="ctr"/>
+              <a:endParaRPr lang="en-CA"/>
+            </a:p>
+          </p:txBody>
+        </p:sp>
+        <p:cxnSp>
+          <p:nvCxnSpPr>
+            <p:cNvPr id="9" name="Straight Connector 8"/>
+            <p:cNvCxnSpPr/>
+            <p:nvPr/>
+          </p:nvCxnSpPr>
+          <p:spPr>
+            <a:xfrm flipH="1" flipV="1">
+              <a:off x="3344091" y="992777"/>
+              <a:ext cx="8709" cy="1393372"/>
+            </a:xfrm>
+            <a:prstGeom prst="line">
+              <a:avLst/>
+            </a:prstGeom>
+            <a:ln w="76200">
+              <a:solidFill>
+                <a:schemeClr val="tx1"/>
+              </a:solidFill>
+            </a:ln>
+          </p:spPr>
+          <p:style>
+            <a:lnRef idx="1">
+              <a:schemeClr val="accent1"/>
+            </a:lnRef>
+            <a:fillRef idx="0">
+              <a:schemeClr val="accent1"/>
+            </a:fillRef>
+            <a:effectRef idx="0">
+              <a:schemeClr val="accent1"/>
+            </a:effectRef>
+            <a:fontRef idx="minor">
+              <a:schemeClr val="tx1"/>
+            </a:fontRef>
+          </p:style>
+        </p:cxnSp>
+      </p:grpSp>
+      <p:grpSp>
+        <p:nvGrpSpPr>
+          <p:cNvPr id="19" name="Group 18"/>
+          <p:cNvGrpSpPr/>
+          <p:nvPr/>
+        </p:nvGrpSpPr>
+        <p:grpSpPr>
+          <a:xfrm>
+            <a:off x="6553200" y="1223555"/>
+            <a:ext cx="1110343" cy="1084217"/>
+            <a:chOff x="6553200" y="1223555"/>
+            <a:chExt cx="1110343" cy="1084217"/>
+          </a:xfrm>
+        </p:grpSpPr>
+        <p:sp>
+          <p:nvSpPr>
+            <p:cNvPr id="4" name="Oval 3"/>
+            <p:cNvSpPr/>
+            <p:nvPr/>
+          </p:nvSpPr>
+          <p:spPr>
+            <a:xfrm>
+              <a:off x="6757851" y="1471749"/>
+              <a:ext cx="661852" cy="836023"/>
+            </a:xfrm>
+            <a:prstGeom prst="ellipse">
+              <a:avLst/>
+            </a:prstGeom>
+            <a:noFill/>
+            <a:ln w="38100">
+              <a:solidFill>
+                <a:schemeClr val="tx1"/>
+              </a:solidFill>
+            </a:ln>
+          </p:spPr>
+          <p:style>
+            <a:lnRef idx="2">
+              <a:schemeClr val="accent1">
+                <a:shade val="50000"/>
+              </a:schemeClr>
+            </a:lnRef>
+            <a:fillRef idx="1">
+              <a:schemeClr val="accent1"/>
+            </a:fillRef>
+            <a:effectRef idx="0">
+              <a:schemeClr val="accent1"/>
+            </a:effectRef>
+            <a:fontRef idx="minor">
+              <a:schemeClr val="lt1"/>
+            </a:fontRef>
+          </p:style>
+          <p:txBody>
+            <a:bodyPr rtlCol="0" anchor="ctr"/>
+            <a:lstStyle/>
+            <a:p>
+              <a:pPr algn="ctr"/>
+              <a:endParaRPr lang="en-CA"/>
+            </a:p>
+          </p:txBody>
+        </p:sp>
+        <p:cxnSp>
+          <p:nvCxnSpPr>
+            <p:cNvPr id="10" name="Straight Connector 9"/>
+            <p:cNvCxnSpPr/>
+            <p:nvPr/>
+          </p:nvCxnSpPr>
+          <p:spPr>
+            <a:xfrm>
+              <a:off x="6553200" y="1223555"/>
+              <a:ext cx="1110343" cy="4354"/>
+            </a:xfrm>
+            <a:prstGeom prst="line">
+              <a:avLst/>
+            </a:prstGeom>
+            <a:ln w="76200">
+              <a:solidFill>
+                <a:schemeClr val="tx1"/>
+              </a:solidFill>
+            </a:ln>
+          </p:spPr>
+          <p:style>
+            <a:lnRef idx="1">
+              <a:schemeClr val="accent1"/>
+            </a:lnRef>
+            <a:fillRef idx="0">
+              <a:schemeClr val="accent1"/>
+            </a:fillRef>
+            <a:effectRef idx="0">
+              <a:schemeClr val="accent1"/>
+            </a:effectRef>
+            <a:fontRef idx="minor">
+              <a:schemeClr val="tx1"/>
+            </a:fontRef>
+          </p:style>
+        </p:cxnSp>
+      </p:grpSp>
+      <p:grpSp>
+        <p:nvGrpSpPr>
+          <p:cNvPr id="22" name="Group 21"/>
+          <p:cNvGrpSpPr/>
+          <p:nvPr/>
+        </p:nvGrpSpPr>
+        <p:grpSpPr>
+          <a:xfrm>
+            <a:off x="722811" y="3866606"/>
+            <a:ext cx="896983" cy="2029096"/>
+            <a:chOff x="722811" y="3866606"/>
+            <a:chExt cx="896983" cy="2029096"/>
+          </a:xfrm>
+        </p:grpSpPr>
+        <p:sp>
+          <p:nvSpPr>
+            <p:cNvPr id="5" name="Oval 4"/>
+            <p:cNvSpPr/>
+            <p:nvPr/>
+          </p:nvSpPr>
+          <p:spPr>
+            <a:xfrm>
+              <a:off x="722811" y="4463144"/>
+              <a:ext cx="661852" cy="836023"/>
+            </a:xfrm>
+            <a:prstGeom prst="ellipse">
+              <a:avLst/>
+            </a:prstGeom>
+            <a:noFill/>
+            <a:ln w="38100">
+              <a:solidFill>
+                <a:schemeClr val="tx1"/>
+              </a:solidFill>
+            </a:ln>
+          </p:spPr>
+          <p:style>
+            <a:lnRef idx="2">
+              <a:schemeClr val="accent1">
+                <a:shade val="50000"/>
+              </a:schemeClr>
+            </a:lnRef>
+            <a:fillRef idx="1">
+              <a:schemeClr val="accent1"/>
+            </a:fillRef>
+            <a:effectRef idx="0">
+              <a:schemeClr val="accent1"/>
+            </a:effectRef>
+            <a:fontRef idx="minor">
+              <a:schemeClr val="lt1"/>
+            </a:fontRef>
+          </p:style>
+          <p:txBody>
+            <a:bodyPr rtlCol="0" anchor="ctr"/>
+            <a:lstStyle/>
+            <a:p>
+              <a:pPr algn="ctr"/>
+              <a:endParaRPr lang="en-CA"/>
+            </a:p>
+          </p:txBody>
+        </p:sp>
+        <p:cxnSp>
+          <p:nvCxnSpPr>
+            <p:cNvPr id="13" name="Straight Connector 12"/>
+            <p:cNvCxnSpPr/>
+            <p:nvPr/>
+          </p:nvCxnSpPr>
+          <p:spPr>
+            <a:xfrm flipH="1">
+              <a:off x="1593668" y="3866606"/>
+              <a:ext cx="26126" cy="2029096"/>
+            </a:xfrm>
+            <a:prstGeom prst="line">
+              <a:avLst/>
+            </a:prstGeom>
+            <a:ln w="76200">
+              <a:solidFill>
+                <a:schemeClr val="tx1"/>
+              </a:solidFill>
+            </a:ln>
+          </p:spPr>
+          <p:style>
+            <a:lnRef idx="1">
+              <a:schemeClr val="accent1"/>
+            </a:lnRef>
+            <a:fillRef idx="0">
+              <a:schemeClr val="accent1"/>
+            </a:fillRef>
+            <a:effectRef idx="0">
+              <a:schemeClr val="accent1"/>
+            </a:effectRef>
+            <a:fontRef idx="minor">
+              <a:schemeClr val="tx1"/>
+            </a:fontRef>
+          </p:style>
+        </p:cxnSp>
+      </p:grpSp>
+      <p:grpSp>
+        <p:nvGrpSpPr>
+          <p:cNvPr id="21" name="Group 20"/>
+          <p:cNvGrpSpPr/>
+          <p:nvPr/>
+        </p:nvGrpSpPr>
+        <p:grpSpPr>
+          <a:xfrm>
+            <a:off x="3618411" y="3984172"/>
+            <a:ext cx="1145178" cy="1793964"/>
+            <a:chOff x="3618411" y="3984172"/>
+            <a:chExt cx="1145178" cy="1793964"/>
+          </a:xfrm>
+        </p:grpSpPr>
+        <p:sp>
+          <p:nvSpPr>
+            <p:cNvPr id="6" name="Oval 5"/>
+            <p:cNvSpPr/>
+            <p:nvPr/>
+          </p:nvSpPr>
+          <p:spPr>
+            <a:xfrm>
+              <a:off x="3618411" y="4463143"/>
+              <a:ext cx="661852" cy="836023"/>
+            </a:xfrm>
+            <a:prstGeom prst="ellipse">
+              <a:avLst/>
+            </a:prstGeom>
+            <a:noFill/>
+            <a:ln w="38100">
+              <a:solidFill>
+                <a:schemeClr val="tx1"/>
+              </a:solidFill>
+            </a:ln>
+          </p:spPr>
+          <p:style>
+            <a:lnRef idx="2">
+              <a:schemeClr val="accent1">
+                <a:shade val="50000"/>
+              </a:schemeClr>
+            </a:lnRef>
+            <a:fillRef idx="1">
+              <a:schemeClr val="accent1"/>
+            </a:fillRef>
+            <a:effectRef idx="0">
+              <a:schemeClr val="accent1"/>
+            </a:effectRef>
+            <a:fontRef idx="minor">
+              <a:schemeClr val="lt1"/>
+            </a:fontRef>
+          </p:style>
+          <p:txBody>
+            <a:bodyPr rtlCol="0" anchor="ctr"/>
+            <a:lstStyle/>
+            <a:p>
+              <a:pPr algn="ctr"/>
+              <a:endParaRPr lang="en-CA"/>
+            </a:p>
+          </p:txBody>
+        </p:sp>
+        <p:cxnSp>
+          <p:nvCxnSpPr>
+            <p:cNvPr id="15" name="Straight Connector 14"/>
+            <p:cNvCxnSpPr/>
+            <p:nvPr/>
+          </p:nvCxnSpPr>
+          <p:spPr>
+            <a:xfrm flipH="1">
+              <a:off x="4741817" y="3984172"/>
+              <a:ext cx="21772" cy="1793964"/>
+            </a:xfrm>
+            <a:prstGeom prst="line">
+              <a:avLst/>
+            </a:prstGeom>
+            <a:ln w="76200">
+              <a:solidFill>
+                <a:schemeClr val="tx1"/>
+              </a:solidFill>
+            </a:ln>
+          </p:spPr>
+          <p:style>
+            <a:lnRef idx="1">
+              <a:schemeClr val="accent1"/>
+            </a:lnRef>
+            <a:fillRef idx="0">
+              <a:schemeClr val="accent1"/>
+            </a:fillRef>
+            <a:effectRef idx="0">
+              <a:schemeClr val="accent1"/>
+            </a:effectRef>
+            <a:fontRef idx="minor">
+              <a:schemeClr val="tx1"/>
+            </a:fontRef>
+          </p:style>
+        </p:cxnSp>
+      </p:grpSp>
+      <p:grpSp>
+        <p:nvGrpSpPr>
+          <p:cNvPr id="20" name="Group 19"/>
+          <p:cNvGrpSpPr/>
+          <p:nvPr/>
+        </p:nvGrpSpPr>
+        <p:grpSpPr>
+          <a:xfrm>
+            <a:off x="6274525" y="3657601"/>
+            <a:ext cx="1145178" cy="1793964"/>
+            <a:chOff x="6274525" y="3657601"/>
+            <a:chExt cx="1145178" cy="1793964"/>
+          </a:xfrm>
+        </p:grpSpPr>
+        <p:sp>
+          <p:nvSpPr>
+            <p:cNvPr id="7" name="Oval 6"/>
+            <p:cNvSpPr/>
+            <p:nvPr/>
+          </p:nvSpPr>
+          <p:spPr>
+            <a:xfrm>
+              <a:off x="6757851" y="4463143"/>
+              <a:ext cx="661852" cy="836023"/>
+            </a:xfrm>
+            <a:prstGeom prst="ellipse">
+              <a:avLst/>
+            </a:prstGeom>
+            <a:noFill/>
+            <a:ln w="38100">
+              <a:solidFill>
+                <a:schemeClr val="tx1"/>
+              </a:solidFill>
+            </a:ln>
+          </p:spPr>
+          <p:style>
+            <a:lnRef idx="2">
+              <a:schemeClr val="accent1">
+                <a:shade val="50000"/>
+              </a:schemeClr>
+            </a:lnRef>
+            <a:fillRef idx="1">
+              <a:schemeClr val="accent1"/>
+            </a:fillRef>
+            <a:effectRef idx="0">
+              <a:schemeClr val="accent1"/>
+            </a:effectRef>
+            <a:fontRef idx="minor">
+              <a:schemeClr val="lt1"/>
+            </a:fontRef>
+          </p:style>
+          <p:txBody>
+            <a:bodyPr rtlCol="0" anchor="ctr"/>
+            <a:lstStyle/>
+            <a:p>
+              <a:pPr algn="ctr"/>
+              <a:endParaRPr lang="en-CA"/>
+            </a:p>
+          </p:txBody>
+        </p:sp>
+        <p:cxnSp>
+          <p:nvCxnSpPr>
+            <p:cNvPr id="17" name="Straight Connector 16"/>
+            <p:cNvCxnSpPr/>
+            <p:nvPr/>
+          </p:nvCxnSpPr>
+          <p:spPr>
+            <a:xfrm flipH="1">
+              <a:off x="6274525" y="3657601"/>
+              <a:ext cx="21772" cy="1793964"/>
+            </a:xfrm>
+            <a:prstGeom prst="line">
+              <a:avLst/>
+            </a:prstGeom>
+            <a:ln w="76200">
+              <a:solidFill>
+                <a:schemeClr val="tx1"/>
+              </a:solidFill>
+            </a:ln>
+          </p:spPr>
+          <p:style>
+            <a:lnRef idx="1">
+              <a:schemeClr val="accent1"/>
+            </a:lnRef>
+            <a:fillRef idx="0">
+              <a:schemeClr val="accent1"/>
+            </a:fillRef>
+            <a:effectRef idx="0">
+              <a:schemeClr val="accent1"/>
+            </a:effectRef>
+            <a:fontRef idx="minor">
+              <a:schemeClr val="tx1"/>
+            </a:fontRef>
+          </p:style>
+        </p:cxnSp>
+      </p:grpSp>
     </p:spTree>
     <p:extLst>
       <p:ext uri="{BB962C8B-B14F-4D97-AF65-F5344CB8AC3E}">
-        <p14:creationId xmlns:p14="http://schemas.microsoft.com/office/powerpoint/2010/main" val="157938821"/>
+        <p14:creationId xmlns:p14="http://schemas.microsoft.com/office/powerpoint/2010/main" val="857143944"/>
       </p:ext>
     </p:extLst>
   </p:cSld>

</xml_diff>